<commit_message>
have not changed anything since last meeting
</commit_message>
<xml_diff>
--- a/manuals/desReview.pptx
+++ b/manuals/desReview.pptx
@@ -4,6 +4,9 @@
   <p:sldMasterIdLst>
     <p:sldMasterId id="2147483648" r:id="rId1"/>
   </p:sldMasterIdLst>
+  <p:notesMasterIdLst>
+    <p:notesMasterId r:id="rId23"/>
+  </p:notesMasterIdLst>
   <p:sldIdLst>
     <p:sldId id="256" r:id="rId2"/>
     <p:sldId id="265" r:id="rId3"/>
@@ -11,18 +14,21 @@
     <p:sldId id="263" r:id="rId5"/>
     <p:sldId id="258" r:id="rId6"/>
     <p:sldId id="266" r:id="rId7"/>
-    <p:sldId id="267" r:id="rId8"/>
-    <p:sldId id="269" r:id="rId9"/>
-    <p:sldId id="271" r:id="rId10"/>
-    <p:sldId id="270" r:id="rId11"/>
-    <p:sldId id="276" r:id="rId12"/>
-    <p:sldId id="277" r:id="rId13"/>
-    <p:sldId id="272" r:id="rId14"/>
-    <p:sldId id="273" r:id="rId15"/>
-    <p:sldId id="275" r:id="rId16"/>
-    <p:sldId id="260" r:id="rId17"/>
+    <p:sldId id="271" r:id="rId8"/>
+    <p:sldId id="270" r:id="rId9"/>
+    <p:sldId id="276" r:id="rId10"/>
+    <p:sldId id="277" r:id="rId11"/>
+    <p:sldId id="272" r:id="rId12"/>
+    <p:sldId id="273" r:id="rId13"/>
+    <p:sldId id="275" r:id="rId14"/>
+    <p:sldId id="260" r:id="rId15"/>
+    <p:sldId id="282" r:id="rId16"/>
+    <p:sldId id="283" r:id="rId17"/>
     <p:sldId id="261" r:id="rId18"/>
-    <p:sldId id="262" r:id="rId19"/>
+    <p:sldId id="279" r:id="rId19"/>
+    <p:sldId id="280" r:id="rId20"/>
+    <p:sldId id="262" r:id="rId21"/>
+    <p:sldId id="284" r:id="rId22"/>
   </p:sldIdLst>
   <p:sldSz cx="9144000" cy="6858000" type="screen4x3"/>
   <p:notesSz cx="6858000" cy="9144000"/>
@@ -124,6 +130,442 @@
 </p:presentation>
 </file>
 
+<file path=ppt/notesMasters/notesMaster1.xml><?xml version="1.0" encoding="utf-8"?>
+<p:notesMaster xmlns:a="http://schemas.openxmlformats.org/drawingml/2006/main" xmlns:r="http://schemas.openxmlformats.org/officeDocument/2006/relationships" xmlns:p="http://schemas.openxmlformats.org/presentationml/2006/main">
+  <p:cSld>
+    <p:bg>
+      <p:bgRef idx="1001">
+        <a:schemeClr val="bg1"/>
+      </p:bgRef>
+    </p:bg>
+    <p:spTree>
+      <p:nvGrpSpPr>
+        <p:cNvPr id="1" name=""/>
+        <p:cNvGrpSpPr/>
+        <p:nvPr/>
+      </p:nvGrpSpPr>
+      <p:grpSpPr>
+        <a:xfrm>
+          <a:off x="0" y="0"/>
+          <a:ext cx="0" cy="0"/>
+          <a:chOff x="0" y="0"/>
+          <a:chExt cx="0" cy="0"/>
+        </a:xfrm>
+      </p:grpSpPr>
+      <p:sp>
+        <p:nvSpPr>
+          <p:cNvPr id="2" name="Header Placeholder 1"/>
+          <p:cNvSpPr>
+            <a:spLocks noGrp="1"/>
+          </p:cNvSpPr>
+          <p:nvPr>
+            <p:ph type="hdr" sz="quarter"/>
+          </p:nvPr>
+        </p:nvSpPr>
+        <p:spPr>
+          <a:xfrm>
+            <a:off x="0" y="0"/>
+            <a:ext cx="2971800" cy="457200"/>
+          </a:xfrm>
+          <a:prstGeom prst="rect">
+            <a:avLst/>
+          </a:prstGeom>
+        </p:spPr>
+        <p:txBody>
+          <a:bodyPr vert="horz" lIns="91440" tIns="45720" rIns="91440" bIns="45720" rtlCol="0"/>
+          <a:lstStyle>
+            <a:lvl1pPr algn="l">
+              <a:defRPr sz="1200"/>
+            </a:lvl1pPr>
+          </a:lstStyle>
+          <a:p>
+            <a:endParaRPr lang="en-US"/>
+          </a:p>
+        </p:txBody>
+      </p:sp>
+      <p:sp>
+        <p:nvSpPr>
+          <p:cNvPr id="3" name="Date Placeholder 2"/>
+          <p:cNvSpPr>
+            <a:spLocks noGrp="1"/>
+          </p:cNvSpPr>
+          <p:nvPr>
+            <p:ph type="dt" idx="1"/>
+          </p:nvPr>
+        </p:nvSpPr>
+        <p:spPr>
+          <a:xfrm>
+            <a:off x="3884613" y="0"/>
+            <a:ext cx="2971800" cy="457200"/>
+          </a:xfrm>
+          <a:prstGeom prst="rect">
+            <a:avLst/>
+          </a:prstGeom>
+        </p:spPr>
+        <p:txBody>
+          <a:bodyPr vert="horz" lIns="91440" tIns="45720" rIns="91440" bIns="45720" rtlCol="0"/>
+          <a:lstStyle>
+            <a:lvl1pPr algn="r">
+              <a:defRPr sz="1200"/>
+            </a:lvl1pPr>
+          </a:lstStyle>
+          <a:p>
+            <a:fld id="{CB2197D3-4F6A-46CD-BD4E-581AC88253CE}" type="datetimeFigureOut">
+              <a:rPr lang="en-US" smtClean="0"/>
+              <a:t>3/14/2012</a:t>
+            </a:fld>
+            <a:endParaRPr lang="en-US"/>
+          </a:p>
+        </p:txBody>
+      </p:sp>
+      <p:sp>
+        <p:nvSpPr>
+          <p:cNvPr id="4" name="Slide Image Placeholder 3"/>
+          <p:cNvSpPr>
+            <a:spLocks noGrp="1" noRot="1" noChangeAspect="1"/>
+          </p:cNvSpPr>
+          <p:nvPr>
+            <p:ph type="sldImg" idx="2"/>
+          </p:nvPr>
+        </p:nvSpPr>
+        <p:spPr>
+          <a:xfrm>
+            <a:off x="1143000" y="685800"/>
+            <a:ext cx="4572000" cy="3429000"/>
+          </a:xfrm>
+          <a:prstGeom prst="rect">
+            <a:avLst/>
+          </a:prstGeom>
+          <a:noFill/>
+          <a:ln w="12700">
+            <a:solidFill>
+              <a:prstClr val="black"/>
+            </a:solidFill>
+          </a:ln>
+        </p:spPr>
+        <p:txBody>
+          <a:bodyPr vert="horz" lIns="91440" tIns="45720" rIns="91440" bIns="45720" rtlCol="0" anchor="ctr"/>
+          <a:lstStyle/>
+          <a:p>
+            <a:endParaRPr lang="en-US"/>
+          </a:p>
+        </p:txBody>
+      </p:sp>
+      <p:sp>
+        <p:nvSpPr>
+          <p:cNvPr id="5" name="Notes Placeholder 4"/>
+          <p:cNvSpPr>
+            <a:spLocks noGrp="1"/>
+          </p:cNvSpPr>
+          <p:nvPr>
+            <p:ph type="body" sz="quarter" idx="3"/>
+          </p:nvPr>
+        </p:nvSpPr>
+        <p:spPr>
+          <a:xfrm>
+            <a:off x="685800" y="4343400"/>
+            <a:ext cx="5486400" cy="4114800"/>
+          </a:xfrm>
+          <a:prstGeom prst="rect">
+            <a:avLst/>
+          </a:prstGeom>
+        </p:spPr>
+        <p:txBody>
+          <a:bodyPr vert="horz" lIns="91440" tIns="45720" rIns="91440" bIns="45720" rtlCol="0">
+            <a:normAutofit/>
+          </a:bodyPr>
+          <a:lstStyle/>
+          <a:p>
+            <a:pPr lvl="0"/>
+            <a:r>
+              <a:rPr lang="en-US" smtClean="0"/>
+              <a:t>Click to edit Master text styles</a:t>
+            </a:r>
+          </a:p>
+          <a:p>
+            <a:pPr lvl="1"/>
+            <a:r>
+              <a:rPr lang="en-US" smtClean="0"/>
+              <a:t>Second level</a:t>
+            </a:r>
+          </a:p>
+          <a:p>
+            <a:pPr lvl="2"/>
+            <a:r>
+              <a:rPr lang="en-US" smtClean="0"/>
+              <a:t>Third level</a:t>
+            </a:r>
+          </a:p>
+          <a:p>
+            <a:pPr lvl="3"/>
+            <a:r>
+              <a:rPr lang="en-US" smtClean="0"/>
+              <a:t>Fourth level</a:t>
+            </a:r>
+          </a:p>
+          <a:p>
+            <a:pPr lvl="4"/>
+            <a:r>
+              <a:rPr lang="en-US" smtClean="0"/>
+              <a:t>Fifth level</a:t>
+            </a:r>
+            <a:endParaRPr lang="en-US"/>
+          </a:p>
+        </p:txBody>
+      </p:sp>
+      <p:sp>
+        <p:nvSpPr>
+          <p:cNvPr id="6" name="Footer Placeholder 5"/>
+          <p:cNvSpPr>
+            <a:spLocks noGrp="1"/>
+          </p:cNvSpPr>
+          <p:nvPr>
+            <p:ph type="ftr" sz="quarter" idx="4"/>
+          </p:nvPr>
+        </p:nvSpPr>
+        <p:spPr>
+          <a:xfrm>
+            <a:off x="0" y="8685213"/>
+            <a:ext cx="2971800" cy="457200"/>
+          </a:xfrm>
+          <a:prstGeom prst="rect">
+            <a:avLst/>
+          </a:prstGeom>
+        </p:spPr>
+        <p:txBody>
+          <a:bodyPr vert="horz" lIns="91440" tIns="45720" rIns="91440" bIns="45720" rtlCol="0" anchor="b"/>
+          <a:lstStyle>
+            <a:lvl1pPr algn="l">
+              <a:defRPr sz="1200"/>
+            </a:lvl1pPr>
+          </a:lstStyle>
+          <a:p>
+            <a:endParaRPr lang="en-US"/>
+          </a:p>
+        </p:txBody>
+      </p:sp>
+      <p:sp>
+        <p:nvSpPr>
+          <p:cNvPr id="7" name="Slide Number Placeholder 6"/>
+          <p:cNvSpPr>
+            <a:spLocks noGrp="1"/>
+          </p:cNvSpPr>
+          <p:nvPr>
+            <p:ph type="sldNum" sz="quarter" idx="5"/>
+          </p:nvPr>
+        </p:nvSpPr>
+        <p:spPr>
+          <a:xfrm>
+            <a:off x="3884613" y="8685213"/>
+            <a:ext cx="2971800" cy="457200"/>
+          </a:xfrm>
+          <a:prstGeom prst="rect">
+            <a:avLst/>
+          </a:prstGeom>
+        </p:spPr>
+        <p:txBody>
+          <a:bodyPr vert="horz" lIns="91440" tIns="45720" rIns="91440" bIns="45720" rtlCol="0" anchor="b"/>
+          <a:lstStyle>
+            <a:lvl1pPr algn="r">
+              <a:defRPr sz="1200"/>
+            </a:lvl1pPr>
+          </a:lstStyle>
+          <a:p>
+            <a:fld id="{D105E240-18B0-4627-A85D-DFCD14AFC886}" type="slidenum">
+              <a:rPr lang="en-US" smtClean="0"/>
+              <a:t>‹#›</a:t>
+            </a:fld>
+            <a:endParaRPr lang="en-US"/>
+          </a:p>
+        </p:txBody>
+      </p:sp>
+    </p:spTree>
+  </p:cSld>
+  <p:clrMap bg1="lt1" tx1="dk1" bg2="lt2" tx2="dk2" accent1="accent1" accent2="accent2" accent3="accent3" accent4="accent4" accent5="accent5" accent6="accent6" hlink="hlink" folHlink="folHlink"/>
+  <p:notesStyle>
+    <a:lvl1pPr marL="0" algn="l" defTabSz="914400" rtl="0" eaLnBrk="1" latinLnBrk="0" hangingPunct="1">
+      <a:defRPr sz="1200" kern="1200">
+        <a:solidFill>
+          <a:schemeClr val="tx1"/>
+        </a:solidFill>
+        <a:latin typeface="+mn-lt"/>
+        <a:ea typeface="+mn-ea"/>
+        <a:cs typeface="+mn-cs"/>
+      </a:defRPr>
+    </a:lvl1pPr>
+    <a:lvl2pPr marL="457200" algn="l" defTabSz="914400" rtl="0" eaLnBrk="1" latinLnBrk="0" hangingPunct="1">
+      <a:defRPr sz="1200" kern="1200">
+        <a:solidFill>
+          <a:schemeClr val="tx1"/>
+        </a:solidFill>
+        <a:latin typeface="+mn-lt"/>
+        <a:ea typeface="+mn-ea"/>
+        <a:cs typeface="+mn-cs"/>
+      </a:defRPr>
+    </a:lvl2pPr>
+    <a:lvl3pPr marL="914400" algn="l" defTabSz="914400" rtl="0" eaLnBrk="1" latinLnBrk="0" hangingPunct="1">
+      <a:defRPr sz="1200" kern="1200">
+        <a:solidFill>
+          <a:schemeClr val="tx1"/>
+        </a:solidFill>
+        <a:latin typeface="+mn-lt"/>
+        <a:ea typeface="+mn-ea"/>
+        <a:cs typeface="+mn-cs"/>
+      </a:defRPr>
+    </a:lvl3pPr>
+    <a:lvl4pPr marL="1371600" algn="l" defTabSz="914400" rtl="0" eaLnBrk="1" latinLnBrk="0" hangingPunct="1">
+      <a:defRPr sz="1200" kern="1200">
+        <a:solidFill>
+          <a:schemeClr val="tx1"/>
+        </a:solidFill>
+        <a:latin typeface="+mn-lt"/>
+        <a:ea typeface="+mn-ea"/>
+        <a:cs typeface="+mn-cs"/>
+      </a:defRPr>
+    </a:lvl4pPr>
+    <a:lvl5pPr marL="1828800" algn="l" defTabSz="914400" rtl="0" eaLnBrk="1" latinLnBrk="0" hangingPunct="1">
+      <a:defRPr sz="1200" kern="1200">
+        <a:solidFill>
+          <a:schemeClr val="tx1"/>
+        </a:solidFill>
+        <a:latin typeface="+mn-lt"/>
+        <a:ea typeface="+mn-ea"/>
+        <a:cs typeface="+mn-cs"/>
+      </a:defRPr>
+    </a:lvl5pPr>
+    <a:lvl6pPr marL="2286000" algn="l" defTabSz="914400" rtl="0" eaLnBrk="1" latinLnBrk="0" hangingPunct="1">
+      <a:defRPr sz="1200" kern="1200">
+        <a:solidFill>
+          <a:schemeClr val="tx1"/>
+        </a:solidFill>
+        <a:latin typeface="+mn-lt"/>
+        <a:ea typeface="+mn-ea"/>
+        <a:cs typeface="+mn-cs"/>
+      </a:defRPr>
+    </a:lvl6pPr>
+    <a:lvl7pPr marL="2743200" algn="l" defTabSz="914400" rtl="0" eaLnBrk="1" latinLnBrk="0" hangingPunct="1">
+      <a:defRPr sz="1200" kern="1200">
+        <a:solidFill>
+          <a:schemeClr val="tx1"/>
+        </a:solidFill>
+        <a:latin typeface="+mn-lt"/>
+        <a:ea typeface="+mn-ea"/>
+        <a:cs typeface="+mn-cs"/>
+      </a:defRPr>
+    </a:lvl7pPr>
+    <a:lvl8pPr marL="3200400" algn="l" defTabSz="914400" rtl="0" eaLnBrk="1" latinLnBrk="0" hangingPunct="1">
+      <a:defRPr sz="1200" kern="1200">
+        <a:solidFill>
+          <a:schemeClr val="tx1"/>
+        </a:solidFill>
+        <a:latin typeface="+mn-lt"/>
+        <a:ea typeface="+mn-ea"/>
+        <a:cs typeface="+mn-cs"/>
+      </a:defRPr>
+    </a:lvl8pPr>
+    <a:lvl9pPr marL="3657600" algn="l" defTabSz="914400" rtl="0" eaLnBrk="1" latinLnBrk="0" hangingPunct="1">
+      <a:defRPr sz="1200" kern="1200">
+        <a:solidFill>
+          <a:schemeClr val="tx1"/>
+        </a:solidFill>
+        <a:latin typeface="+mn-lt"/>
+        <a:ea typeface="+mn-ea"/>
+        <a:cs typeface="+mn-cs"/>
+      </a:defRPr>
+    </a:lvl9pPr>
+  </p:notesStyle>
+</p:notesMaster>
+</file>
+
+<file path=ppt/notesSlides/notesSlide1.xml><?xml version="1.0" encoding="utf-8"?>
+<p:notes xmlns:a="http://schemas.openxmlformats.org/drawingml/2006/main" xmlns:r="http://schemas.openxmlformats.org/officeDocument/2006/relationships" xmlns:p="http://schemas.openxmlformats.org/presentationml/2006/main">
+  <p:cSld>
+    <p:spTree>
+      <p:nvGrpSpPr>
+        <p:cNvPr id="1" name=""/>
+        <p:cNvGrpSpPr/>
+        <p:nvPr/>
+      </p:nvGrpSpPr>
+      <p:grpSpPr>
+        <a:xfrm>
+          <a:off x="0" y="0"/>
+          <a:ext cx="0" cy="0"/>
+          <a:chOff x="0" y="0"/>
+          <a:chExt cx="0" cy="0"/>
+        </a:xfrm>
+      </p:grpSpPr>
+      <p:sp>
+        <p:nvSpPr>
+          <p:cNvPr id="2" name="Slide Image Placeholder 1"/>
+          <p:cNvSpPr>
+            <a:spLocks noGrp="1" noRot="1" noChangeAspect="1"/>
+          </p:cNvSpPr>
+          <p:nvPr>
+            <p:ph type="sldImg"/>
+          </p:nvPr>
+        </p:nvSpPr>
+        <p:spPr/>
+      </p:sp>
+      <p:sp>
+        <p:nvSpPr>
+          <p:cNvPr id="3" name="Notes Placeholder 2"/>
+          <p:cNvSpPr>
+            <a:spLocks noGrp="1"/>
+          </p:cNvSpPr>
+          <p:nvPr>
+            <p:ph type="body" idx="1"/>
+          </p:nvPr>
+        </p:nvSpPr>
+        <p:spPr/>
+        <p:txBody>
+          <a:bodyPr>
+            <a:normAutofit/>
+          </a:bodyPr>
+          <a:lstStyle/>
+          <a:p>
+            <a:r>
+              <a:rPr lang="en-US" dirty="0" smtClean="0"/>
+              <a:t>Specified</a:t>
+            </a:r>
+            <a:r>
+              <a:rPr lang="en-US" baseline="0" dirty="0" smtClean="0"/>
+              <a:t> choices of the users</a:t>
+            </a:r>
+            <a:endParaRPr lang="en-US" dirty="0"/>
+          </a:p>
+        </p:txBody>
+      </p:sp>
+      <p:sp>
+        <p:nvSpPr>
+          <p:cNvPr id="4" name="Slide Number Placeholder 3"/>
+          <p:cNvSpPr>
+            <a:spLocks noGrp="1"/>
+          </p:cNvSpPr>
+          <p:nvPr>
+            <p:ph type="sldNum" sz="quarter" idx="10"/>
+          </p:nvPr>
+        </p:nvSpPr>
+        <p:spPr/>
+        <p:txBody>
+          <a:bodyPr/>
+          <a:lstStyle/>
+          <a:p>
+            <a:fld id="{D105E240-18B0-4627-A85D-DFCD14AFC886}" type="slidenum">
+              <a:rPr lang="en-US" smtClean="0"/>
+              <a:t>17</a:t>
+            </a:fld>
+            <a:endParaRPr lang="en-US"/>
+          </a:p>
+        </p:txBody>
+      </p:sp>
+    </p:spTree>
+  </p:cSld>
+  <p:clrMapOvr>
+    <a:masterClrMapping/>
+  </p:clrMapOvr>
+</p:notes>
+</file>
+
 <file path=ppt/slideLayouts/slideLayout1.xml><?xml version="1.0" encoding="utf-8"?>
 <p:sldLayout xmlns:a="http://schemas.openxmlformats.org/drawingml/2006/main" xmlns:r="http://schemas.openxmlformats.org/officeDocument/2006/relationships" xmlns:p="http://schemas.openxmlformats.org/presentationml/2006/main" type="title" preserve="1">
   <p:cSld name="Title Slide">
@@ -306,7 +748,7 @@
             <a:fld id="{1D07A5CD-1B33-4196-9C5B-A05DEEFFEA37}" type="datetimeFigureOut">
               <a:rPr lang="en-US" smtClean="0"/>
               <a:pPr/>
-              <a:t>3/13/2012</a:t>
+              <a:t>3/14/2012</a:t>
             </a:fld>
             <a:endParaRPr lang="en-US"/>
           </a:p>
@@ -473,7 +915,7 @@
             <a:fld id="{1D07A5CD-1B33-4196-9C5B-A05DEEFFEA37}" type="datetimeFigureOut">
               <a:rPr lang="en-US" smtClean="0"/>
               <a:pPr/>
-              <a:t>3/13/2012</a:t>
+              <a:t>3/14/2012</a:t>
             </a:fld>
             <a:endParaRPr lang="en-US"/>
           </a:p>
@@ -650,7 +1092,7 @@
             <a:fld id="{1D07A5CD-1B33-4196-9C5B-A05DEEFFEA37}" type="datetimeFigureOut">
               <a:rPr lang="en-US" smtClean="0"/>
               <a:pPr/>
-              <a:t>3/13/2012</a:t>
+              <a:t>3/14/2012</a:t>
             </a:fld>
             <a:endParaRPr lang="en-US"/>
           </a:p>
@@ -817,7 +1259,7 @@
             <a:fld id="{1D07A5CD-1B33-4196-9C5B-A05DEEFFEA37}" type="datetimeFigureOut">
               <a:rPr lang="en-US" smtClean="0"/>
               <a:pPr/>
-              <a:t>3/13/2012</a:t>
+              <a:t>3/14/2012</a:t>
             </a:fld>
             <a:endParaRPr lang="en-US"/>
           </a:p>
@@ -1060,7 +1502,7 @@
             <a:fld id="{1D07A5CD-1B33-4196-9C5B-A05DEEFFEA37}" type="datetimeFigureOut">
               <a:rPr lang="en-US" smtClean="0"/>
               <a:pPr/>
-              <a:t>3/13/2012</a:t>
+              <a:t>3/14/2012</a:t>
             </a:fld>
             <a:endParaRPr lang="en-US"/>
           </a:p>
@@ -1345,7 +1787,7 @@
             <a:fld id="{1D07A5CD-1B33-4196-9C5B-A05DEEFFEA37}" type="datetimeFigureOut">
               <a:rPr lang="en-US" smtClean="0"/>
               <a:pPr/>
-              <a:t>3/13/2012</a:t>
+              <a:t>3/14/2012</a:t>
             </a:fld>
             <a:endParaRPr lang="en-US"/>
           </a:p>
@@ -1764,7 +2206,7 @@
             <a:fld id="{1D07A5CD-1B33-4196-9C5B-A05DEEFFEA37}" type="datetimeFigureOut">
               <a:rPr lang="en-US" smtClean="0"/>
               <a:pPr/>
-              <a:t>3/13/2012</a:t>
+              <a:t>3/14/2012</a:t>
             </a:fld>
             <a:endParaRPr lang="en-US"/>
           </a:p>
@@ -1879,7 +2321,7 @@
             <a:fld id="{1D07A5CD-1B33-4196-9C5B-A05DEEFFEA37}" type="datetimeFigureOut">
               <a:rPr lang="en-US" smtClean="0"/>
               <a:pPr/>
-              <a:t>3/13/2012</a:t>
+              <a:t>3/14/2012</a:t>
             </a:fld>
             <a:endParaRPr lang="en-US"/>
           </a:p>
@@ -1971,7 +2413,7 @@
             <a:fld id="{1D07A5CD-1B33-4196-9C5B-A05DEEFFEA37}" type="datetimeFigureOut">
               <a:rPr lang="en-US" smtClean="0"/>
               <a:pPr/>
-              <a:t>3/13/2012</a:t>
+              <a:t>3/14/2012</a:t>
             </a:fld>
             <a:endParaRPr lang="en-US"/>
           </a:p>
@@ -2245,7 +2687,7 @@
             <a:fld id="{1D07A5CD-1B33-4196-9C5B-A05DEEFFEA37}" type="datetimeFigureOut">
               <a:rPr lang="en-US" smtClean="0"/>
               <a:pPr/>
-              <a:t>3/13/2012</a:t>
+              <a:t>3/14/2012</a:t>
             </a:fld>
             <a:endParaRPr lang="en-US"/>
           </a:p>
@@ -2495,7 +2937,7 @@
             <a:fld id="{1D07A5CD-1B33-4196-9C5B-A05DEEFFEA37}" type="datetimeFigureOut">
               <a:rPr lang="en-US" smtClean="0"/>
               <a:pPr/>
-              <a:t>3/13/2012</a:t>
+              <a:t>3/14/2012</a:t>
             </a:fld>
             <a:endParaRPr lang="en-US"/>
           </a:p>
@@ -2705,7 +3147,7 @@
             <a:fld id="{1D07A5CD-1B33-4196-9C5B-A05DEEFFEA37}" type="datetimeFigureOut">
               <a:rPr lang="en-US" smtClean="0"/>
               <a:pPr/>
-              <a:t>3/13/2012</a:t>
+              <a:t>3/14/2012</a:t>
             </a:fld>
             <a:endParaRPr lang="en-US"/>
           </a:p>
@@ -3062,6 +3504,11 @@
 <file path=ppt/slides/slide1.xml><?xml version="1.0" encoding="utf-8"?>
 <p:sld xmlns:a="http://schemas.openxmlformats.org/drawingml/2006/main" xmlns:r="http://schemas.openxmlformats.org/officeDocument/2006/relationships" xmlns:p="http://schemas.openxmlformats.org/presentationml/2006/main">
   <p:cSld>
+    <p:bg>
+      <p:bgRef idx="1001">
+        <a:schemeClr val="bg1"/>
+      </p:bgRef>
+    </p:bg>
     <p:spTree>
       <p:nvGrpSpPr>
         <p:cNvPr id="1" name=""/>
@@ -3176,7 +3623,7 @@
     </p:spTree>
   </p:cSld>
   <p:clrMapOvr>
-    <a:masterClrMapping/>
+    <a:overrideClrMapping bg1="lt1" tx1="dk1" bg2="lt2" tx2="dk2" accent1="accent1" accent2="accent2" accent3="accent3" accent4="accent4" accent5="accent5" accent6="accent6" hlink="hlink" folHlink="folHlink"/>
   </p:clrMapOvr>
   <p:timing>
     <p:tnLst>
@@ -3222,7 +3669,7 @@
           <a:p>
             <a:r>
               <a:rPr lang="en-US" dirty="0" smtClean="0"/>
-              <a:t>Hardware Control</a:t>
+              <a:t>GPIB Control</a:t>
             </a:r>
             <a:endParaRPr lang="en-US" dirty="0"/>
           </a:p>
@@ -3230,68 +3677,269 @@
       </p:sp>
       <p:sp>
         <p:nvSpPr>
-          <p:cNvPr id="3" name="Content Placeholder 2"/>
-          <p:cNvSpPr>
-            <a:spLocks noGrp="1"/>
-          </p:cNvSpPr>
-          <p:nvPr>
-            <p:ph idx="1"/>
+          <p:cNvPr id="10" name="Content Placeholder 9"/>
+          <p:cNvSpPr>
+            <a:spLocks noGrp="1"/>
+          </p:cNvSpPr>
+          <p:nvPr>
+            <p:ph sz="half" idx="1"/>
           </p:nvPr>
         </p:nvSpPr>
         <p:spPr>
           <a:xfrm>
             <a:off x="457200" y="1600200"/>
-            <a:ext cx="8229600" cy="2590799"/>
+            <a:ext cx="4038600" cy="4800600"/>
           </a:xfrm>
         </p:spPr>
         <p:txBody>
           <a:bodyPr>
-            <a:normAutofit fontScale="85000" lnSpcReduction="20000"/>
+            <a:normAutofit fontScale="77500" lnSpcReduction="20000"/>
           </a:bodyPr>
           <a:lstStyle/>
           <a:p>
             <a:r>
               <a:rPr lang="en-US" dirty="0" smtClean="0"/>
-              <a:t>So how does the software communicate with the hardware</a:t>
-            </a:r>
+              <a:t>‘General Purpose Interface Bus’</a:t>
+            </a:r>
+          </a:p>
+          <a:p>
             <a:r>
               <a:rPr lang="en-US" dirty="0" smtClean="0"/>
-              <a:t>?</a:t>
-            </a:r>
-          </a:p>
-          <a:p>
-            <a:pPr>
-              <a:buNone/>
-            </a:pPr>
+              <a:t>The </a:t>
+            </a:r>
+            <a:r>
+              <a:rPr lang="en-US" dirty="0" smtClean="0"/>
+              <a:t>de facto standard of controlling hardware using a PC</a:t>
+            </a:r>
+          </a:p>
+          <a:p>
+            <a:r>
+              <a:rPr lang="en-US" dirty="0" smtClean="0"/>
+              <a:t>A bus system for Test and Measurement applications</a:t>
+            </a:r>
+          </a:p>
+          <a:p>
+            <a:r>
+              <a:rPr lang="en-US" dirty="0" smtClean="0"/>
+              <a:t>This </a:t>
+            </a:r>
+            <a:r>
+              <a:rPr lang="en-US" dirty="0" smtClean="0"/>
+              <a:t>networked system has all features that are required to create a measurement system. </a:t>
+            </a:r>
             <a:endParaRPr lang="en-US" dirty="0" smtClean="0"/>
           </a:p>
           <a:p>
             <a:r>
               <a:rPr lang="en-US" dirty="0" smtClean="0"/>
-              <a:t>Series of commands using the </a:t>
+              <a:t>Remote </a:t>
             </a:r>
             <a:r>
               <a:rPr lang="en-US" dirty="0" smtClean="0"/>
-              <a:t>GPIB</a:t>
-            </a:r>
-          </a:p>
-          <a:p>
+              <a:t>control of </a:t>
+            </a:r>
+            <a:r>
+              <a:rPr lang="en-US" dirty="0" smtClean="0"/>
+              <a:t>instruments, real-time </a:t>
+            </a:r>
+            <a:r>
+              <a:rPr lang="en-US" dirty="0" smtClean="0"/>
+              <a:t>response </a:t>
+            </a:r>
+            <a:r>
+              <a:rPr lang="en-US" dirty="0" smtClean="0"/>
+              <a:t>capability, data handshake for reliable operation are few of the features of the GPIB. </a:t>
+            </a:r>
             <a:endParaRPr lang="en-US" dirty="0" smtClean="0"/>
           </a:p>
           <a:p>
-            <a:r>
-              <a:rPr lang="en-US" dirty="0" smtClean="0"/>
-              <a:t>Series of tools using the FPGA</a:t>
-            </a:r>
-          </a:p>
-          <a:p>
-            <a:endParaRPr lang="en-US" dirty="0" smtClean="0"/>
-          </a:p>
-          <a:p>
             <a:endParaRPr lang="en-US" dirty="0"/>
           </a:p>
         </p:txBody>
       </p:sp>
+      <p:sp>
+        <p:nvSpPr>
+          <p:cNvPr id="1026" name="AutoShape 2" descr="data:image/jpeg;base64,/9j/4AAQSkZJRgABAQAAAQABAAD/2wCEAAkGBhAPDw8PDQ8QDw8NDw0NDw0NDQ8NDw8OFBAVFBQQEhUXHCYeFxkjGRYSHy8hJCcpLC0sFR4xNTA2NSYrLCkBCQoKDgwOFA8PGi8kHBwpKSksLCksLCwpKSkpKSkpKSkpKSkpNSwpLCwsLCkpKSwpKSwsLCksKSksLCkpKSkpKf/AABEIALIBGwMBIgACEQEDEQH/xAAcAAADAAMBAQEAAAAAAAAAAAAAAQIDBQYEBwj/xABAEAABBAADBAcECAUDBQEAAAABAAIDEQQSIQUGMVETMkFhcZGhIlKBsQcUI0KSosHRNFNicoIVM7IkQ1Sz8Bb/xAAYAQEBAQEBAAAAAAAAAAAAAAAAAgEDBP/EAB4RAQEAAgMBAAMAAAAAAAAAAAABERICITFBUWFx/9oADAMBAAIRAxEAPwDuGsWVrE2sWZrEEtYsrWKmsWQNQSGKwxWGqw1BjDVQasgamGoIDU8qyZU8qCA1PKryp5UEBqrKqATAQSGp5VVJgIJpOlVJgIJyopXSKQTSeVOk6QKkUqpFIFSKVUikCpFKqRSCaRStFIIpFK6SpBNIpXSVIJpSWrJSVIOea1ZWtQ1qyNagYarDUNCyAIANVBqYCoBAg1UAmAqAQTSeVVSqkEZU8qpOkEUmArpFIJpOk6TpAqRSpFIEnSaECQmikBSKTTQSAnSaaBUik0igKQmhAqRSaECpCaKQJFJ0hBomhZWhSAsjQgpoVgJAKwgYCqkKgEAEwEAKggEJoQCdIQgEUmgICkJoQFJoQgEJopAqTpCaBJoQgEJoQJBQhAIQhABNATQJCaECQmhBpWrIFDVYQW1WAparCClQSCoIGmElQQCEJoBCEIBNJNAJp0lSATQkgE7SpOkCJTCKTQCaSaAQhCBITpJAITQgE0IQCEIQCEIQaYLI0KGq2oMgVhQ1ZQEAFQQAmEDCaSaBoSTQCSaDpqdO86IFSYC12N3hwsOkkzAfdbb3eTbWrm3+ww6jZn+DAwfmKM2jp7Ra4mb6Q3G+jw4HfJLfoAtdid/MVXWhiHMMv1cVmYzaPo6TnAakgd5NBfH8Xv47USY5xPuxvr0YFqp96Y361PMeZY4jt7XnuPkid32ifb2Fj6+IiHd0gJ8gvPJvXgwL6dru5jXvPoF8Wl3glBOTDNZQB+1lAsXWgA/VavFb0Yqy1vR9tGNvSaeNnkqxWbvuE+/uHb1GSv8A8WsHqVrcT9Ijh/twMaB96WUnT4AfNfFpMZjX8Xyixmyh2SxfYBVrVyTOPWJP9xJ+aYZta+3Y3fTHCupFmbmbUPEcwXE2udxf0obUwzhnMMsZ4OfAGnwOUhcRsDHTMeA1jpWO0LMrnAEis47xfxXZP2c1w6rgSNbkcdfhSm3Bmtrsv6bJC9oxWGjyE058LnNcBzDXXfgvqOAx8eIjZNA8PjkFtc06eHce5fnHbOBkw7gbPRm6sWASKo2tludv7Ps+XU9Jh3kdLCKbfAZm8nD17VXrZzv1+hULw7O23BiIW4iGVroniw6wKPa0jsI5JSbYjHVzP/tGnmVjpmPehas7bH8t34gsZ28T1Y6/ud+wWZhmNwhaJ+15TwLW+Db+awv2lL/N8g0fos2ido6NSXAcSB4lcvLinnrSOP8AkV7dmYwOtj9TVgniRyScpTZuDiWjtvw1WM4z+k+dLCTSgvVGWJoVtCxNKyAotkCyArG1WEFhUFAVhBQQgIQNcd9JG+smzIIzAxrpZnEBzxbWMHE12k8AuwXHfSRsUYvDOZYDmN6Rjj2EE36Inl45cb64uaNrxiH5XgGmVH8PZAXN4zfhmZweZpCDRt+cGu8leXdzFxlpwwzgszG3kW8E/dFezXLXitftPdiYzOdE1pY8lw9oNDb7NSn3txZ5d9jrkiFf1OPD4JYTel8hqSToi403JC1414WST8l5It0Jz1nRt/yLj6BeyDc0ffmJ7mMA+dpniYPas7443XiXOeQMo6R8brvX2BQApaPAvt9vLCGgkiYkgjgfjrfwXYM3Xic7NI2SVzq1kkOp+FL2N2dhoeLIIyK6waXeuqbT4yTpywfdiMgkHO36tC8+0eLQ7iNR4ar0xbOnddQz66jPI2IBx1dY00v9V0rcdHwjEsvIQxPy/iIpWZ5Pu4cDhrPO1vo2ym1bhoYN3JeJbh2f35pyOPdyNfAL3QbuO7cQ+6DfsYwywOGpu173zy/zMPED7kTpnD4uIHooM50z4id/c0shafg0X6rM0xGOPdKFlF7XEC6M0paNTZ0sBXFFgYiMrsMD2CJvTv8AyAlKOTDtOZ0LHH3p3GY/nJ5rbYXeSNrcsQjbQ6sbWNAHgFmLRiizPH2GHxcl3lP1YQs7rMpb8lsIsF00QngndGGGnRuDBmcDrZaBQ7LteB2+YY8ZiBrZXk2TtXDuZ9TxBlD4pJSwRQukE7Xah1t0Ommun6VJ+S/ps8Ng34uefBvd0XRRROL3RMxJLSXaDOSNbGp10Uz/AEUtNlmIjv8ArwbG/wDrc1b7YWzniefFSAN6ZsUUcbSHZImDQFw0J51pZNcLXQAqVydduM3e3NxOBkzCeEwUTLG1s3taUCA4kNN9tro3Ykdiz7WdUElcmj8wWiZiNFlib02hxXesDsQvOJDyPksck4bq9zWD+twCnWsy9vTqTOtNPvBh2f8AcLzyjaT6nReX/wDQSyGsNhXOJ4OksjyH7rdGyWug6Qq8JNlmiOtucR4jKVp8PsHauI60ogaexjQ0j9VuMLuZjWAf9W0u/mmIGVvOibHot1VpW/ll7fVaqbeOFri0yx2DX+6z91mw24kRObFSzYl3KWVxb+G6W2Zu5hWgAYeIAcPs2roqcWAK2rGFkasWyNVhQ0qwgsKgoBVAoLCakFFoKWn25x/xHzW2tanbPEeA/wCSRPLx8f27uy3C7QEuctjleTGxgskniDxptnkeB8V78fgsRh3258ckQ6zWANc0cyNfmCt5vbiI2zwhxAeQ7JdaWav5j4rkZtpvjkLs7nuBkyQNZZqu3u4+CrErz21s9nRSYqISYfo4wXStc6Vxf7QdQyMDeGna5VJszKalxTiTqRDEyIH4nMa/Za3dPavRwiI1mzPeQD7zia8EbWxzmPDr6xAF9UE6KLFMszIg4B2eTLw6SV59LA9Ehjoo+qImHh7LWg/uupk2HgI8K2b+Mk0L3veQy+TWA0BfO1pmbyRs0gw8UfZ7EbRrzUS1VmHljmll/wBqOZ9nTLE+r8Toso2Pi3amNsY5zytb6CynLt/EydUO8ivLPiJbqWZkdnhJI1p8uK1j2f6JWs2Jjb/TFGXHzcf0UOw2DZ1nzSnkZAwE+DQPmvOzCZhm+1kb70cD8n43031WCSfDx6PdCxw7JsW1x/BCHlbgeoYrDtP2WGjvgHOBeR8StZtTDyTkPZGc7OGRtacgAlNvXhmdQuNcRBhWtuu0PmcSPwLyv344BkTnVbmmbEvcPi2ERt+aqSjT4zOXEOtuUDMXAgg8vFbDdfbT8LM1w+1a0jNC+nZm9uW+B4rN9nisJjsTJE2OaD6u9skRka1+eTIWOa5zgSeIPcVz0OKYxri4Gzo1wdlo3qQq/rH6L2VtGPExMmhdmY8fFpHFpHYQvcAvjP0UbclGNMQe50U4Ic1xLvbDS7pO48B4L7S1qizDpGm3rxJjwj3N454wNL4uXCsxuKk0Zn/xbS+l7Rw4e0NcLBe00e616sFs1jQKaPJbFSR82g3dx8vvi+1z3LbYL6OJHG55PgP3X0RkYHALIinObP3HwsVEsDjzdqt5BgI2CmMaPABZ0IGAmlaEDRaSVoNQCsjViasjSgyNVgrGCrCCwmCpCYQWCmEgqAQK1qtq6n4D/ktuWrW7Sj4fD5hE8vHF767JEzLJ1a020jMHa6Du4lfHdo7RkjL4YzkabaQwNYXNvg4gW4dx0X33akQcQ08CD818b3z2IcNii4j2ZwSzkOAIW/XJzGGmkY4FrqI14rrdpMfisFHPFq6JxErBxBy//ea5HVpJ92ib00tdXubtRrcS7D3bMW3JRBAEw1YRfPh5JYHuttdwY5sriIiHW4kBrKr2nX2WWjtOugKz4rebCMPsPkfR4Qwshadffksn8IXt2/u82LZ2IdGzKW42OV2lHoy2g09wc8r5pIXnMReVh1oaAE0LrvTr1uMusxe+V9XDtNfz55p/ygtZ6LXv3wxAJ6ORsN/+NFHCfDM1ub1WhOHOtkaNDxrd32Cu1PoW8ybbeg4O5eCZjcPXi9tSSm5ZJJTzlkc+nc/aJXlOLPACtKr9VbYh2M4Mp1m/aP3gvTBgJX6RsLi1lewwklp514p2dPFch5j2SR922DlzCnonGu2xfPzXT4bcTHPAJgexmUU+YiBo17S8jTivbHutDCQcRionkVeHwZ+sSE8s1ZG+JJQdDsjZkcewp3zNzfWbkAujUYyR/mJK4zaW78wczKzOzIJBK2nMcHDs/W+C6nauOxWIw/1eDD9FCGMiYM+ZwY2qqu3Tj3rTYDYOLaQ1zZHNB6pLy3jy4JknGuu+iPd+OISYyR7baXxN1oMNDM4k6cNPNfRXbczezhIX4l3DOBkhB73nj8LXO7m7DY0AyQC7zU4EtDuYadAvoeHAA0ACxc44ajZmz8S53SYtzL+7FGPZb8e0rdBlLJaRRSEWmVJQO0WlaLQNFpWi0FWklaLQahqyNWMFW1BlCoFQFQQWCmoBVBBYKsOWK1QKDKHLz4xlhZWuRJqEHDbx7XfFJGxkXSF4JzF+RrBY1OhJ49i5HfTDuxMZ+0hccOHy9Gxj2yUAM+pJFDTy+C7febDBpDz2GwaJ7eGnBcMIocMXvia6R8uYHOKAaTZAVTDhePLL5fiydQfvce4DWlst1sPJNiIWMBzdIyiBwAIJce4Va3OM2HDna/JJTrc+Gso7fZa7jXBbHYUE8F/VIWNc7QyyW91chyCZVrX0DaGCbPDPA5wAxLHMBJoB/wB0n40vj8e42Pe5zW4WUU4hxc0sZoeOY6Ed90u3xGwMdO3NLiDXuMGULUv2I8eyXSOA7C9xHkpjdWobuKWfxWKwuH/pMwllHdljsr1Q7C2ewnNJicSTVthhGHYf8pDfkFuMHu253UjPkt7g9yZXcQGorVzWHfBH/D7OgB9/FSSYl3lo1ev/AFXGEZWzdC33MLFHAK8Wi/Vdtg9wmjrn9FusLurh2fdBPmjcR8m/0SaY24SSnnI50h9VuNmbhzuIJaGjvX1WLAxt6rR5LOABwCNc9sndgRgB2q3DNmRj7o8l6k0ExwtbwAWYOUJgoMudGZY7TtBdpWptFoKtFqbRaCrRalCCrRalIlBq2lW0rECsgQZGqwsYKoFBadqLTtBVp5lNotBWZPMsaLQEsYeKcARyIteB+w4LsRMvnlC99p2g5jaWwc/VA8l5cBsAxnXypdgaUhou6QeGDZunteSyDY8XujyXtBTtBhiwjG8GjyWYUErSJQPMqBUBVaC7RakFO0FWnahO0FoU2mCgdp2ptNBVotSi0FWnahO0FWi1NotBVpEpWkg1QKyArCCsjSgygqgVjBVhBdotTaLQXaLU2i0DtFqbRaCrRaVpWgq0WptFoKtFqbQSgq07UBFoLTtRaoFBQKdqbRaCwU7UAp2gq07U2i0FWi0rQgq0WptFoLtFqLQgu0WotFoLtBU2laDxhg5DyVBg5DyTQgoNHIeSrKOQ8kIQPKOQ8k8o5DyQhAZRyCMo5BCECDRyTyjkhCAyjkPJGUckIQGUckZRyQhAso5IyjkhCB5RyRlHJCEBlHJPKOSEIGAE8o5IQgYaOSMo5IQgMo5Jho5IQgeUckZRyQhAUikIQFJ0hCAICVBCEBlHJPKOSEIP/9k="/>
+          <p:cNvSpPr>
+            <a:spLocks noChangeAspect="1" noChangeArrowheads="1"/>
+          </p:cNvSpPr>
+          <p:nvPr/>
+        </p:nvSpPr>
+        <p:spPr bwMode="auto">
+          <a:xfrm>
+            <a:off x="155575" y="-144463"/>
+            <a:ext cx="304800" cy="304801"/>
+          </a:xfrm>
+          <a:prstGeom prst="rect">
+            <a:avLst/>
+          </a:prstGeom>
+          <a:noFill/>
+        </p:spPr>
+        <p:txBody>
+          <a:bodyPr vert="horz" wrap="square" lIns="91440" tIns="45720" rIns="91440" bIns="45720" numCol="1" anchor="t" anchorCtr="0" compatLnSpc="1">
+            <a:prstTxWarp prst="textNoShape">
+              <a:avLst/>
+            </a:prstTxWarp>
+          </a:bodyPr>
+          <a:lstStyle/>
+          <a:p>
+            <a:endParaRPr lang="en-US"/>
+          </a:p>
+        </p:txBody>
+      </p:sp>
+      <p:sp>
+        <p:nvSpPr>
+          <p:cNvPr id="1028" name="AutoShape 4" descr="data:image/jpeg;base64,/9j/4AAQSkZJRgABAQAAAQABAAD/2wCEAAkGBhAPDw8PDQ8QDw8NDw0NDw0NDQ8NDw8OFBAVFBQQEhUXHCYeFxkjGRYSHy8hJCcpLC0sFR4xNTA2NSYrLCkBCQoKDgwOFA8PGi8kHBwpKSksLCksLCwpKSkpKSkpKSkpKSkpNSwpLCwsLCkpKSwpKSwsLCksKSksLCkpKSkpKf/AABEIALIBGwMBIgACEQEDEQH/xAAcAAADAAMBAQEAAAAAAAAAAAAAAQIDBQYEBwj/xABAEAABBAADBAcECAUDBQEAAAABAAIDEQQSIQUGMVETMkFhcZGhIlKBsQcUI0KSosHRNFNicoIVM7IkQ1Sz8Bb/xAAYAQEBAQEBAAAAAAAAAAAAAAAAAgEDBP/EAB4RAQEAAgMBAAMAAAAAAAAAAAABERICITFBUWFx/9oADAMBAAIRAxEAPwDuGsWVrE2sWZrEEtYsrWKmsWQNQSGKwxWGqw1BjDVQasgamGoIDU8qyZU8qCA1PKryp5UEBqrKqATAQSGp5VVJgIJpOlVJgIJyopXSKQTSeVOk6QKkUqpFIFSKVUikCpFKqRSCaRStFIIpFK6SpBNIpXSVIJpSWrJSVIOea1ZWtQ1qyNagYarDUNCyAIANVBqYCoBAg1UAmAqAQTSeVVSqkEZU8qpOkEUmArpFIJpOk6TpAqRSpFIEnSaECQmikBSKTTQSAnSaaBUik0igKQmhAqRSaECpCaKQJFJ0hBomhZWhSAsjQgpoVgJAKwgYCqkKgEAEwEAKggEJoQCdIQgEUmgICkJoQFJoQgEJopAqTpCaBJoQgEJoQJBQhAIQhABNATQJCaECQmhBpWrIFDVYQW1WAparCClQSCoIGmElQQCEJoBCEIBNJNAJp0lSATQkgE7SpOkCJTCKTQCaSaAQhCBITpJAITQgE0IQCEIQCEIQaYLI0KGq2oMgVhQ1ZQEAFQQAmEDCaSaBoSTQCSaDpqdO86IFSYC12N3hwsOkkzAfdbb3eTbWrm3+ww6jZn+DAwfmKM2jp7Ra4mb6Q3G+jw4HfJLfoAtdid/MVXWhiHMMv1cVmYzaPo6TnAakgd5NBfH8Xv47USY5xPuxvr0YFqp96Y361PMeZY4jt7XnuPkid32ifb2Fj6+IiHd0gJ8gvPJvXgwL6dru5jXvPoF8Wl3glBOTDNZQB+1lAsXWgA/VavFb0Yqy1vR9tGNvSaeNnkqxWbvuE+/uHb1GSv8A8WsHqVrcT9Ijh/twMaB96WUnT4AfNfFpMZjX8Xyixmyh2SxfYBVrVyTOPWJP9xJ+aYZta+3Y3fTHCupFmbmbUPEcwXE2udxf0obUwzhnMMsZ4OfAGnwOUhcRsDHTMeA1jpWO0LMrnAEis47xfxXZP2c1w6rgSNbkcdfhSm3Bmtrsv6bJC9oxWGjyE058LnNcBzDXXfgvqOAx8eIjZNA8PjkFtc06eHce5fnHbOBkw7gbPRm6sWASKo2tludv7Ps+XU9Jh3kdLCKbfAZm8nD17VXrZzv1+hULw7O23BiIW4iGVroniw6wKPa0jsI5JSbYjHVzP/tGnmVjpmPehas7bH8t34gsZ28T1Y6/ud+wWZhmNwhaJ+15TwLW+Db+awv2lL/N8g0fos2ido6NSXAcSB4lcvLinnrSOP8AkV7dmYwOtj9TVgniRyScpTZuDiWjtvw1WM4z+k+dLCTSgvVGWJoVtCxNKyAotkCyArG1WEFhUFAVhBQQgIQNcd9JG+smzIIzAxrpZnEBzxbWMHE12k8AuwXHfSRsUYvDOZYDmN6Rjj2EE36Inl45cb64uaNrxiH5XgGmVH8PZAXN4zfhmZweZpCDRt+cGu8leXdzFxlpwwzgszG3kW8E/dFezXLXitftPdiYzOdE1pY8lw9oNDb7NSn3txZ5d9jrkiFf1OPD4JYTel8hqSToi403JC1414WST8l5It0Jz1nRt/yLj6BeyDc0ffmJ7mMA+dpniYPas7443XiXOeQMo6R8brvX2BQApaPAvt9vLCGgkiYkgjgfjrfwXYM3Xic7NI2SVzq1kkOp+FL2N2dhoeLIIyK6waXeuqbT4yTpywfdiMgkHO36tC8+0eLQ7iNR4ar0xbOnddQz66jPI2IBx1dY00v9V0rcdHwjEsvIQxPy/iIpWZ5Pu4cDhrPO1vo2ym1bhoYN3JeJbh2f35pyOPdyNfAL3QbuO7cQ+6DfsYwywOGpu173zy/zMPED7kTpnD4uIHooM50z4id/c0shafg0X6rM0xGOPdKFlF7XEC6M0paNTZ0sBXFFgYiMrsMD2CJvTv8AyAlKOTDtOZ0LHH3p3GY/nJ5rbYXeSNrcsQjbQ6sbWNAHgFmLRiizPH2GHxcl3lP1YQs7rMpb8lsIsF00QngndGGGnRuDBmcDrZaBQ7LteB2+YY8ZiBrZXk2TtXDuZ9TxBlD4pJSwRQukE7Xah1t0Ommun6VJ+S/ps8Ng34uefBvd0XRRROL3RMxJLSXaDOSNbGp10Uz/AEUtNlmIjv8ArwbG/wDrc1b7YWzniefFSAN6ZsUUcbSHZImDQFw0J51pZNcLXQAqVydduM3e3NxOBkzCeEwUTLG1s3taUCA4kNN9tro3Ykdiz7WdUElcmj8wWiZiNFlib02hxXesDsQvOJDyPksck4bq9zWD+twCnWsy9vTqTOtNPvBh2f8AcLzyjaT6nReX/wDQSyGsNhXOJ4OksjyH7rdGyWug6Qq8JNlmiOtucR4jKVp8PsHauI60ogaexjQ0j9VuMLuZjWAf9W0u/mmIGVvOibHot1VpW/ll7fVaqbeOFri0yx2DX+6z91mw24kRObFSzYl3KWVxb+G6W2Zu5hWgAYeIAcPs2roqcWAK2rGFkasWyNVhQ0qwgsKgoBVAoLCakFFoKWn25x/xHzW2tanbPEeA/wCSRPLx8f27uy3C7QEuctjleTGxgskniDxptnkeB8V78fgsRh3258ckQ6zWANc0cyNfmCt5vbiI2zwhxAeQ7JdaWav5j4rkZtpvjkLs7nuBkyQNZZqu3u4+CrErz21s9nRSYqISYfo4wXStc6Vxf7QdQyMDeGna5VJszKalxTiTqRDEyIH4nMa/Za3dPavRwiI1mzPeQD7zia8EbWxzmPDr6xAF9UE6KLFMszIg4B2eTLw6SV59LA9Ehjoo+qImHh7LWg/uupk2HgI8K2b+Mk0L3veQy+TWA0BfO1pmbyRs0gw8UfZ7EbRrzUS1VmHljmll/wBqOZ9nTLE+r8Toso2Pi3amNsY5zytb6CynLt/EydUO8ivLPiJbqWZkdnhJI1p8uK1j2f6JWs2Jjb/TFGXHzcf0UOw2DZ1nzSnkZAwE+DQPmvOzCZhm+1kb70cD8n43031WCSfDx6PdCxw7JsW1x/BCHlbgeoYrDtP2WGjvgHOBeR8StZtTDyTkPZGc7OGRtacgAlNvXhmdQuNcRBhWtuu0PmcSPwLyv344BkTnVbmmbEvcPi2ERt+aqSjT4zOXEOtuUDMXAgg8vFbDdfbT8LM1w+1a0jNC+nZm9uW+B4rN9nisJjsTJE2OaD6u9skRka1+eTIWOa5zgSeIPcVz0OKYxri4Gzo1wdlo3qQq/rH6L2VtGPExMmhdmY8fFpHFpHYQvcAvjP0UbclGNMQe50U4Ic1xLvbDS7pO48B4L7S1qizDpGm3rxJjwj3N454wNL4uXCsxuKk0Zn/xbS+l7Rw4e0NcLBe00e616sFs1jQKaPJbFSR82g3dx8vvi+1z3LbYL6OJHG55PgP3X0RkYHALIinObP3HwsVEsDjzdqt5BgI2CmMaPABZ0IGAmlaEDRaSVoNQCsjViasjSgyNVgrGCrCCwmCpCYQWCmEgqAQK1qtq6n4D/ktuWrW7Sj4fD5hE8vHF767JEzLJ1a020jMHa6Du4lfHdo7RkjL4YzkabaQwNYXNvg4gW4dx0X33akQcQ08CD818b3z2IcNii4j2ZwSzkOAIW/XJzGGmkY4FrqI14rrdpMfisFHPFq6JxErBxBy//ea5HVpJ92ib00tdXubtRrcS7D3bMW3JRBAEw1YRfPh5JYHuttdwY5sriIiHW4kBrKr2nX2WWjtOugKz4rebCMPsPkfR4Qwshadffksn8IXt2/u82LZ2IdGzKW42OV2lHoy2g09wc8r5pIXnMReVh1oaAE0LrvTr1uMusxe+V9XDtNfz55p/ygtZ6LXv3wxAJ6ORsN/+NFHCfDM1ub1WhOHOtkaNDxrd32Cu1PoW8ybbeg4O5eCZjcPXi9tSSm5ZJJTzlkc+nc/aJXlOLPACtKr9VbYh2M4Mp1m/aP3gvTBgJX6RsLi1lewwklp514p2dPFch5j2SR922DlzCnonGu2xfPzXT4bcTHPAJgexmUU+YiBo17S8jTivbHutDCQcRionkVeHwZ+sSE8s1ZG+JJQdDsjZkcewp3zNzfWbkAujUYyR/mJK4zaW78wczKzOzIJBK2nMcHDs/W+C6nauOxWIw/1eDD9FCGMiYM+ZwY2qqu3Tj3rTYDYOLaQ1zZHNB6pLy3jy4JknGuu+iPd+OISYyR7baXxN1oMNDM4k6cNPNfRXbczezhIX4l3DOBkhB73nj8LXO7m7DY0AyQC7zU4EtDuYadAvoeHAA0ACxc44ajZmz8S53SYtzL+7FGPZb8e0rdBlLJaRRSEWmVJQO0WlaLQNFpWi0FWklaLQahqyNWMFW1BlCoFQFQQWCmoBVBBYKsOWK1QKDKHLz4xlhZWuRJqEHDbx7XfFJGxkXSF4JzF+RrBY1OhJ49i5HfTDuxMZ+0hccOHy9Gxj2yUAM+pJFDTy+C7febDBpDz2GwaJ7eGnBcMIocMXvia6R8uYHOKAaTZAVTDhePLL5fiydQfvce4DWlst1sPJNiIWMBzdIyiBwAIJce4Va3OM2HDna/JJTrc+Gso7fZa7jXBbHYUE8F/VIWNc7QyyW91chyCZVrX0DaGCbPDPA5wAxLHMBJoB/wB0n40vj8e42Pe5zW4WUU4hxc0sZoeOY6Ed90u3xGwMdO3NLiDXuMGULUv2I8eyXSOA7C9xHkpjdWobuKWfxWKwuH/pMwllHdljsr1Q7C2ewnNJicSTVthhGHYf8pDfkFuMHu253UjPkt7g9yZXcQGorVzWHfBH/D7OgB9/FSSYl3lo1ev/AFXGEZWzdC33MLFHAK8Wi/Vdtg9wmjrn9FusLurh2fdBPmjcR8m/0SaY24SSnnI50h9VuNmbhzuIJaGjvX1WLAxt6rR5LOABwCNc9sndgRgB2q3DNmRj7o8l6k0ExwtbwAWYOUJgoMudGZY7TtBdpWptFoKtFqbRaCrRalCCrRalIlBq2lW0rECsgQZGqwsYKoFBadqLTtBVp5lNotBWZPMsaLQEsYeKcARyIteB+w4LsRMvnlC99p2g5jaWwc/VA8l5cBsAxnXypdgaUhou6QeGDZunteSyDY8XujyXtBTtBhiwjG8GjyWYUErSJQPMqBUBVaC7RakFO0FWnahO0FoU2mCgdp2ptNBVotSi0FWnahO0FWi1NotBVpEpWkg1QKyArCCsjSgygqgVjBVhBdotTaLQXaLU2i0DtFqbRaCrRaVpWgq0WptFoKtFqbQSgq07UBFoLTtRaoFBQKdqbRaCwU7UAp2gq07U2i0FWi0rQgq0WptFoLtFqLQgu0WotFoLtBU2laDxhg5DyVBg5DyTQgoNHIeSrKOQ8kIQPKOQ8k8o5DyQhAZRyCMo5BCECDRyTyjkhCAyjkPJGUckIQGUckZRyQhAso5IyjkhCB5RyRlHJCEBlHJPKOSEIGAE8o5IQgYaOSMo5IQgMo5Jho5IQgeUckZRyQhAUikIQFJ0hCAICVBCEBlHJPKOSEIP/9k="/>
+          <p:cNvSpPr>
+            <a:spLocks noChangeAspect="1" noChangeArrowheads="1"/>
+          </p:cNvSpPr>
+          <p:nvPr/>
+        </p:nvSpPr>
+        <p:spPr bwMode="auto">
+          <a:xfrm>
+            <a:off x="155575" y="-144463"/>
+            <a:ext cx="304800" cy="304801"/>
+          </a:xfrm>
+          <a:prstGeom prst="rect">
+            <a:avLst/>
+          </a:prstGeom>
+          <a:noFill/>
+        </p:spPr>
+        <p:txBody>
+          <a:bodyPr vert="horz" wrap="square" lIns="91440" tIns="45720" rIns="91440" bIns="45720" numCol="1" anchor="t" anchorCtr="0" compatLnSpc="1">
+            <a:prstTxWarp prst="textNoShape">
+              <a:avLst/>
+            </a:prstTxWarp>
+          </a:bodyPr>
+          <a:lstStyle/>
+          <a:p>
+            <a:endParaRPr lang="en-US"/>
+          </a:p>
+        </p:txBody>
+      </p:sp>
+      <p:sp>
+        <p:nvSpPr>
+          <p:cNvPr id="1030" name="AutoShape 6" descr="data:image/jpeg;base64,/9j/4AAQSkZJRgABAQAAAQABAAD/2wCEAAkGBhESERUUEhIWEhUWExURFhUTExoZFxcSFhwVFBQSFRgjJzIeFxkjGRMWHy8gIycrLC0sGR4xNTEqNSYyLCkBCQoKDgwNFw8PGSwcHBwsKSksKSksKSkpKSkpKSwsKSwpKSkpLCkpKSwsKSkpLCkpKSwsKSwpKSkpLCwsLCkpKf/AABEIAIAArAMBIgACEQEDEQH/xAAcAAEAAgMBAQEAAAAAAAAAAAAAAwUEBgcCCAH/xAA6EAACAQICBQoFBAEEAwAAAAABAgADEQQhBRIUMVIGMkFRYXFykZKxBxMigaEzQmLBQ3OC0fAWI6L/xAAWAQEBAQAAAAAAAAAAAAAAAAAAAQL/xAAZEQEBAQADAAAAAAAAAAAAAAAAEQECEjH/2gAMAwEAAhEDEQA/AO006YcBmzvmB0AdAt0z3sqcC+kRheYvhX2ElgRbKnAvpEbKnAvpEliBFsqcC+kRsqcC+kSWIEWypwL6RGypwL6RJYgRbKnAvpEbKnAvpEliBFsqcC+kRsqcC+kSWIEWypwL6RGypwL6RJYgRbKnAvpEbKnAvpEliBFsqcC+kRsqcC+kSWIEWypwL6RGypwL6RJYgRbKnCB3Cx8xMavjvlnVN26QezqPkZnSm0xzx4R7mBaYXmL4V9hJZFheYvhX2ElgIiICIiAiIgIiICIiAiIgIiICIiAiIgJTaY548I9zLmU2mOePCPcwLTC8xfCvsJLIsLzF8K+wksBERAREQET8JmHidN4an+pXpp4qig+V4GbE1zE/EHAJ/m1+xEZvza35lZiPilQHMo1X7W1VHuTJcG7ROY474uuu5KNP/UqFj5C0psV8ZqtrfMpg9aUSb+ZtFWOzz8LAb8p8+Yz4s4l/8tU9zKg/+RK1OWPzTarrZkWd6pYAfyBH5G7qikfSdOsrc1ge4gz3PmjG6LYnXpEobX+hra3bYbjLPkd8RsRgalqlSpXpE2em9yV/lTJP0kdW4+RDNI+hImHonS1HE0lrUXDo4uCPyCOgjcR0TJqVlXnMF7yBKj3ExW0pRG+rT9a/8zFqcpcMP8mt4QW9haBaSm0xzx4R7mR1OV9EblqH/aB7mYlbS4rHWClQPpzt33/MlwbHheYvhX2ElkWF5i+FfYSWUIiIHN+UnxYajjXwtGkpNMZvUJ+p97BVFshfffPOaxpT4t4pTqtWCG17U6S7u83ImN8UcL8vEnFIgZhUZGvuAuwBt12uLnLITXMZo1MT8tw+rcZZC5Bz87yaqTSXL56pJc1avjfLy3CR0tMF11lNNQD9Vwbj7nKRf+K0157t9yFH2mTh9E4cZAA9OZZ8x2DK+czcIqE07Wd7GpZbndZcuw2kuo77gz9G537Qbmwt0TYqVFF5tO3TzVT7Z5/iezVP8AO0sx/FhFIo6WjKvQmpuOZRM/tczITk675nV3W3M5HnaWJxVt7keFVX3uZ5FYtzVep3l3/G6LpGK/J6kBarU6b2JRM7dW/ymVhOT+H/AGUmqdop1H/Jsv5mTRrVaQuKQp27EQnu6ZiYnli1r3PVY7x/20equ6WBuoZNQWb5TU2ycOMioz1cvz0TDTkcMYgrJqUtYsLEve6sVN7ZDd1XkfJnSpxNUoqo1maurMx1qZaxY6m57MLg375vWjMEKNNaa3IF8zmSSSzE9tyYGucnNAY/As3yqy/KY3qKKhtYfvX6bh7dW/p7Lx8UL35x62zMzca1qVQ/wb2tNVGOUb2Em5UXFTEDqHlPG1Hr/MwKNcvzAz+FD/ctcHyaxdTdS1B11G/oR1KxzipbaHclDfj/AKWZuE5AMf1a1uymLfnfMyroSlQsiXsRrG5JJO6/kBNZxhWx4XmL4V9hJZFheYvhX2ElmkIiIHMeUtBXOIDAMLubMLi4ZiMu8TQ61dQiJUUPqi5rG2sO2/Z0Tomm6AZ64O4lwfNpx/lDWfD1NVfqP7Sw1reAG4Hll0QNg0HikNBSyhnGtYst2trErv3ZdEy9F4OtjC60yqhPqdnayqM7DLNmNjkB5TQdFaTqo4LNdf3Dfl0mXT1a+HxYNMkip9SlTkykAhe0zG40vjgqS5PibnpFOn/bH+p4NbCjLVqVT/JyB5LaU+P09hVYkazm9zZRYnq1ibfcAiV1blmBzKYG8fU5P4TV/uIVta47VzTDpT6mKgfkz8bF16g/UNv46zZf7RaaLU5X1v2kJ4Kag9v1EFvveYGI0vWqc5nfI852OXXn1RCt8rVqKn/2Vh93UH7AEt+JXV8JQruFoOC+q7kENqtqqXsrEDOwO8AGacWqbrhczkMui/5E3D4d4C5rVKt9VKTLvzvUBSwPQdXXMqKvR2PNM/MVtVlIKkGxv0Ef2DvE7JyR08MZh1q6uq1yjjo1h+5ewjMTiuK0QSqlSpTV1rhgSCf2kb9ZbdU7L8PdHJRwqU6ZNZ2AqNqC+bAWB6FsLDMxovcRgPmoad7a/wBF+8iXGjuQmEpAfRrHraTaO0TU1g1SyAZhQbkn+R3fYS8lzEQ0MFTQWVFXuEmiJQlNpjnjwj3MuZTaY548I9zAtMLzF8K+wksiwvMXwr7CSwEREDTOU9HVqubW1lv98wZyvlzgkNNagI10bVtcXKnfYdYynZuWmj/mYdiOhSD4TvnGsTWVLIXX5IUqUUXYk3BA6hmD9pBz41gjX/kR2Wsf7m/cinFanT17E0X1B/puGC2PYGYd1ppmK0Out+oCLZWBJIvzSP2mbZoLGtRoinh8O7k5s7kKC27dvsBlaNVoul9Hslaohv8AQSgy3sDb7ZZyFMIL/SpbM5E5kWtaw6bze8QlapUL1MLRao1gSVc7sgSutqk7s7S30fyf0hUypq1MHoo01pDzUX/MDQsJyUxTAEUSi5fU4CDLPW1mtnM2nyUUfq4qkN51aetVNybnmjVz750vBfCTEVDeqR3uSx/M2XAfCWgv6jluwZRBxinobCLuWvW379SkufR+5pf6L5P4iuvy6QNGmf2U133Fru5+pjbK/ladowXInBUrWogkdLZy5o4VFFlUL3CVHFdE/BqurBgwXvE6xya0McNSCGx7haW8QEREBERASm0xzx4R7mXMptMc8eEe5gWmF5i+FfYSWRYXmL4V9hJYCIiB5dARY5gypqckcGxuaCE+ES4iBqOlvhxhqpBUCn12AmZo7kTh6QtbW75sUQMOloiiu6mvkJlqgG4W7p+xAREQEREBERAREQEREBKbTHPHhHuZcym0xzx4R7mBaYXmL4V9hJZj06oQBWytkD0Ebhn0Ge9qTjX1CBLEi2pONfUI2pONfUIEsSLak419Qjak419QgSxItqTjX1CNqTjX1CBLEi2pONfUI2pONfUIEsSLak419Qjak419QgSxItqTjX1CNqTjX1CBLEi2pONfUI2pONfUIEsSLak419Qjak419QgSxItqTjX1CNqTjX1CBLKbTHPHhHuZZnFpxA9xufITGr4H5h1jdegDpt1nzMD/2Q=="/>
+          <p:cNvSpPr>
+            <a:spLocks noChangeAspect="1" noChangeArrowheads="1"/>
+          </p:cNvSpPr>
+          <p:nvPr/>
+        </p:nvSpPr>
+        <p:spPr bwMode="auto">
+          <a:xfrm>
+            <a:off x="155575" y="-144463"/>
+            <a:ext cx="304800" cy="304801"/>
+          </a:xfrm>
+          <a:prstGeom prst="rect">
+            <a:avLst/>
+          </a:prstGeom>
+          <a:noFill/>
+        </p:spPr>
+        <p:txBody>
+          <a:bodyPr vert="horz" wrap="square" lIns="91440" tIns="45720" rIns="91440" bIns="45720" numCol="1" anchor="t" anchorCtr="0" compatLnSpc="1">
+            <a:prstTxWarp prst="textNoShape">
+              <a:avLst/>
+            </a:prstTxWarp>
+          </a:bodyPr>
+          <a:lstStyle/>
+          <a:p>
+            <a:endParaRPr lang="en-US"/>
+          </a:p>
+        </p:txBody>
+      </p:sp>
+      <p:sp>
+        <p:nvSpPr>
+          <p:cNvPr id="1032" name="AutoShape 8" descr="data:image/jpeg;base64,/9j/4AAQSkZJRgABAQAAAQABAAD/2wCEAAkGBhESERUUEhIWEhUWExURFhUTExoZFxcSFhwVFBQSFRgjJzIeFxkjGRMWHy8gIycrLC0sGR4xNTEqNSYyLCkBCQoKDgwNFw8PGSwcHBwsKSksKSksKSkpKSkpKSwsKSwpKSkpLCkpKSwsKSkpLCkpKSwsKSwpKSkpLCwsLCkpKf/AABEIAIAArAMBIgACEQEDEQH/xAAcAAEAAgMBAQEAAAAAAAAAAAAAAwUEBgcCCAH/xAA6EAACAQICBQoFBAEEAwAAAAABAgADEQQhBRIUMVIGMkFRYXFykZKxBxMigaEzQmLBQ3OC0fAWI6L/xAAWAQEBAQAAAAAAAAAAAAAAAAAAAQL/xAAZEQEBAQADAAAAAAAAAAAAAAAAEQECEjH/2gAMAwEAAhEDEQA/AO006YcBmzvmB0AdAt0z3sqcC+kRheYvhX2ElgRbKnAvpEbKnAvpEliBFsqcC+kRsqcC+kSWIEWypwL6RGypwL6RJYgRbKnAvpEbKnAvpEliBFsqcC+kRsqcC+kSWIEWypwL6RGypwL6RJYgRbKnAvpEbKnAvpEliBFsqcC+kRsqcC+kSWIEWypwL6RGypwL6RJYgRbKnCB3Cx8xMavjvlnVN26QezqPkZnSm0xzx4R7mBaYXmL4V9hJZFheYvhX2ElgIiICIiAiIgIiICIiAiIgIiICIiAiIgJTaY548I9zLmU2mOePCPcwLTC8xfCvsJLIsLzF8K+wksBERAREQET8JmHidN4an+pXpp4qig+V4GbE1zE/EHAJ/m1+xEZvza35lZiPilQHMo1X7W1VHuTJcG7ROY474uuu5KNP/UqFj5C0psV8ZqtrfMpg9aUSb+ZtFWOzz8LAb8p8+Yz4s4l/8tU9zKg/+RK1OWPzTarrZkWd6pYAfyBH5G7qikfSdOsrc1ge4gz3PmjG6LYnXpEobX+hra3bYbjLPkd8RsRgalqlSpXpE2em9yV/lTJP0kdW4+RDNI+hImHonS1HE0lrUXDo4uCPyCOgjcR0TJqVlXnMF7yBKj3ExW0pRG+rT9a/8zFqcpcMP8mt4QW9haBaSm0xzx4R7mR1OV9EblqH/aB7mYlbS4rHWClQPpzt33/MlwbHheYvhX2ElkWF5i+FfYSWUIiIHN+UnxYajjXwtGkpNMZvUJ+p97BVFshfffPOaxpT4t4pTqtWCG17U6S7u83ImN8UcL8vEnFIgZhUZGvuAuwBt12uLnLITXMZo1MT8tw+rcZZC5Bz87yaqTSXL56pJc1avjfLy3CR0tMF11lNNQD9Vwbj7nKRf+K0157t9yFH2mTh9E4cZAA9OZZ8x2DK+czcIqE07Wd7GpZbndZcuw2kuo77gz9G537Qbmwt0TYqVFF5tO3TzVT7Z5/iezVP8AO0sx/FhFIo6WjKvQmpuOZRM/tczITk675nV3W3M5HnaWJxVt7keFVX3uZ5FYtzVep3l3/G6LpGK/J6kBarU6b2JRM7dW/ymVhOT+H/AGUmqdop1H/Jsv5mTRrVaQuKQp27EQnu6ZiYnli1r3PVY7x/20equ6WBuoZNQWb5TU2ycOMioz1cvz0TDTkcMYgrJqUtYsLEve6sVN7ZDd1XkfJnSpxNUoqo1maurMx1qZaxY6m57MLg375vWjMEKNNaa3IF8zmSSSzE9tyYGucnNAY/As3yqy/KY3qKKhtYfvX6bh7dW/p7Lx8UL35x62zMzca1qVQ/wb2tNVGOUb2Em5UXFTEDqHlPG1Hr/MwKNcvzAz+FD/ctcHyaxdTdS1B11G/oR1KxzipbaHclDfj/AKWZuE5AMf1a1uymLfnfMyroSlQsiXsRrG5JJO6/kBNZxhWx4XmL4V9hJZFheYvhX2ElmkIiIHMeUtBXOIDAMLubMLi4ZiMu8TQ61dQiJUUPqi5rG2sO2/Z0Tomm6AZ64O4lwfNpx/lDWfD1NVfqP7Sw1reAG4Hll0QNg0HikNBSyhnGtYst2trErv3ZdEy9F4OtjC60yqhPqdnayqM7DLNmNjkB5TQdFaTqo4LNdf3Dfl0mXT1a+HxYNMkip9SlTkykAhe0zG40vjgqS5PibnpFOn/bH+p4NbCjLVqVT/JyB5LaU+P09hVYkazm9zZRYnq1ibfcAiV1blmBzKYG8fU5P4TV/uIVta47VzTDpT6mKgfkz8bF16g/UNv46zZf7RaaLU5X1v2kJ4Kag9v1EFvveYGI0vWqc5nfI852OXXn1RCt8rVqKn/2Vh93UH7AEt+JXV8JQruFoOC+q7kENqtqqXsrEDOwO8AGacWqbrhczkMui/5E3D4d4C5rVKt9VKTLvzvUBSwPQdXXMqKvR2PNM/MVtVlIKkGxv0Ef2DvE7JyR08MZh1q6uq1yjjo1h+5ewjMTiuK0QSqlSpTV1rhgSCf2kb9ZbdU7L8PdHJRwqU6ZNZ2AqNqC+bAWB6FsLDMxovcRgPmoad7a/wBF+8iXGjuQmEpAfRrHraTaO0TU1g1SyAZhQbkn+R3fYS8lzEQ0MFTQWVFXuEmiJQlNpjnjwj3MuZTaY548I9zAtMLzF8K+wksiwvMXwr7CSwEREDTOU9HVqubW1lv98wZyvlzgkNNagI10bVtcXKnfYdYynZuWmj/mYdiOhSD4TvnGsTWVLIXX5IUqUUXYk3BA6hmD9pBz41gjX/kR2Wsf7m/cinFanT17E0X1B/puGC2PYGYd1ppmK0Out+oCLZWBJIvzSP2mbZoLGtRoinh8O7k5s7kKC27dvsBlaNVoul9Hslaohv8AQSgy3sDb7ZZyFMIL/SpbM5E5kWtaw6bze8QlapUL1MLRao1gSVc7sgSutqk7s7S30fyf0hUypq1MHoo01pDzUX/MDQsJyUxTAEUSi5fU4CDLPW1mtnM2nyUUfq4qkN51aetVNybnmjVz750vBfCTEVDeqR3uSx/M2XAfCWgv6jluwZRBxinobCLuWvW379SkufR+5pf6L5P4iuvy6QNGmf2U133Fru5+pjbK/ladowXInBUrWogkdLZy5o4VFFlUL3CVHFdE/BqurBgwXvE6xya0McNSCGx7haW8QEREBERASm0xzx4R7mXMptMc8eEe5gWmF5i+FfYSWRYXmL4V9hJYCIiB5dARY5gypqckcGxuaCE+ES4iBqOlvhxhqpBUCn12AmZo7kTh6QtbW75sUQMOloiiu6mvkJlqgG4W7p+xAREQEREBERAREQEREBKbTHPHhHuZcym0xzx4R7mBaYXmL4V9hJZj06oQBWytkD0Ebhn0Ge9qTjX1CBLEi2pONfUI2pONfUIEsSLak419Qjak419QgSxItqTjX1CNqTjX1CBLEi2pONfUI2pONfUIEsSLak419Qjak419QgSxItqTjX1CNqTjX1CBLEi2pONfUI2pONfUIEsSLak419Qjak419QgSxItqTjX1CNqTjX1CBLKbTHPHhHuZZnFpxA9xufITGr4H5h1jdegDpt1nzMD/2Q=="/>
+          <p:cNvSpPr>
+            <a:spLocks noChangeAspect="1" noChangeArrowheads="1"/>
+          </p:cNvSpPr>
+          <p:nvPr/>
+        </p:nvSpPr>
+        <p:spPr bwMode="auto">
+          <a:xfrm>
+            <a:off x="155575" y="-144463"/>
+            <a:ext cx="304800" cy="304801"/>
+          </a:xfrm>
+          <a:prstGeom prst="rect">
+            <a:avLst/>
+          </a:prstGeom>
+          <a:noFill/>
+        </p:spPr>
+        <p:txBody>
+          <a:bodyPr vert="horz" wrap="square" lIns="91440" tIns="45720" rIns="91440" bIns="45720" numCol="1" anchor="t" anchorCtr="0" compatLnSpc="1">
+            <a:prstTxWarp prst="textNoShape">
+              <a:avLst/>
+            </a:prstTxWarp>
+          </a:bodyPr>
+          <a:lstStyle/>
+          <a:p>
+            <a:endParaRPr lang="en-US"/>
+          </a:p>
+        </p:txBody>
+      </p:sp>
+      <p:sp>
+        <p:nvSpPr>
+          <p:cNvPr id="1034" name="AutoShape 10" descr="data:image/jpeg;base64,/9j/4AAQSkZJRgABAQAAAQABAAD/2wCEAAkGBhESERUUEhIWEhUWExURFhUTExoZFxcSFhwVFBQSFRgjJzIeFxkjGRMWHy8gIycrLC0sGR4xNTEqNSYyLCkBCQoKDgwNFw8PGSwcHBwsKSksKSksKSkpKSkpKSwsKSwpKSkpLCkpKSwsKSkpLCkpKSwsKSwpKSkpLCwsLCkpKf/AABEIAIAArAMBIgACEQEDEQH/xAAcAAEAAgMBAQEAAAAAAAAAAAAAAwUEBgcCCAH/xAA6EAACAQICBQoFBAEEAwAAAAABAgADEQQhBRIUMVIGMkFRYXFykZKxBxMigaEzQmLBQ3OC0fAWI6L/xAAWAQEBAQAAAAAAAAAAAAAAAAAAAQL/xAAZEQEBAQADAAAAAAAAAAAAAAAAEQECEjH/2gAMAwEAAhEDEQA/AO006YcBmzvmB0AdAt0z3sqcC+kRheYvhX2ElgRbKnAvpEbKnAvpEliBFsqcC+kRsqcC+kSWIEWypwL6RGypwL6RJYgRbKnAvpEbKnAvpEliBFsqcC+kRsqcC+kSWIEWypwL6RGypwL6RJYgRbKnAvpEbKnAvpEliBFsqcC+kRsqcC+kSWIEWypwL6RGypwL6RJYgRbKnCB3Cx8xMavjvlnVN26QezqPkZnSm0xzx4R7mBaYXmL4V9hJZFheYvhX2ElgIiICIiAiIgIiICIiAiIgIiICIiAiIgJTaY548I9zLmU2mOePCPcwLTC8xfCvsJLIsLzF8K+wksBERAREQET8JmHidN4an+pXpp4qig+V4GbE1zE/EHAJ/m1+xEZvza35lZiPilQHMo1X7W1VHuTJcG7ROY474uuu5KNP/UqFj5C0psV8ZqtrfMpg9aUSb+ZtFWOzz8LAb8p8+Yz4s4l/8tU9zKg/+RK1OWPzTarrZkWd6pYAfyBH5G7qikfSdOsrc1ge4gz3PmjG6LYnXpEobX+hra3bYbjLPkd8RsRgalqlSpXpE2em9yV/lTJP0kdW4+RDNI+hImHonS1HE0lrUXDo4uCPyCOgjcR0TJqVlXnMF7yBKj3ExW0pRG+rT9a/8zFqcpcMP8mt4QW9haBaSm0xzx4R7mR1OV9EblqH/aB7mYlbS4rHWClQPpzt33/MlwbHheYvhX2ElkWF5i+FfYSWUIiIHN+UnxYajjXwtGkpNMZvUJ+p97BVFshfffPOaxpT4t4pTqtWCG17U6S7u83ImN8UcL8vEnFIgZhUZGvuAuwBt12uLnLITXMZo1MT8tw+rcZZC5Bz87yaqTSXL56pJc1avjfLy3CR0tMF11lNNQD9Vwbj7nKRf+K0157t9yFH2mTh9E4cZAA9OZZ8x2DK+czcIqE07Wd7GpZbndZcuw2kuo77gz9G537Qbmwt0TYqVFF5tO3TzVT7Z5/iezVP8AO0sx/FhFIo6WjKvQmpuOZRM/tczITk675nV3W3M5HnaWJxVt7keFVX3uZ5FYtzVep3l3/G6LpGK/J6kBarU6b2JRM7dW/ymVhOT+H/AGUmqdop1H/Jsv5mTRrVaQuKQp27EQnu6ZiYnli1r3PVY7x/20equ6WBuoZNQWb5TU2ycOMioz1cvz0TDTkcMYgrJqUtYsLEve6sVN7ZDd1XkfJnSpxNUoqo1maurMx1qZaxY6m57MLg375vWjMEKNNaa3IF8zmSSSzE9tyYGucnNAY/As3yqy/KY3qKKhtYfvX6bh7dW/p7Lx8UL35x62zMzca1qVQ/wb2tNVGOUb2Em5UXFTEDqHlPG1Hr/MwKNcvzAz+FD/ctcHyaxdTdS1B11G/oR1KxzipbaHclDfj/AKWZuE5AMf1a1uymLfnfMyroSlQsiXsRrG5JJO6/kBNZxhWx4XmL4V9hJZFheYvhX2ElmkIiIHMeUtBXOIDAMLubMLi4ZiMu8TQ61dQiJUUPqi5rG2sO2/Z0Tomm6AZ64O4lwfNpx/lDWfD1NVfqP7Sw1reAG4Hll0QNg0HikNBSyhnGtYst2trErv3ZdEy9F4OtjC60yqhPqdnayqM7DLNmNjkB5TQdFaTqo4LNdf3Dfl0mXT1a+HxYNMkip9SlTkykAhe0zG40vjgqS5PibnpFOn/bH+p4NbCjLVqVT/JyB5LaU+P09hVYkazm9zZRYnq1ibfcAiV1blmBzKYG8fU5P4TV/uIVta47VzTDpT6mKgfkz8bF16g/UNv46zZf7RaaLU5X1v2kJ4Kag9v1EFvveYGI0vWqc5nfI852OXXn1RCt8rVqKn/2Vh93UH7AEt+JXV8JQruFoOC+q7kENqtqqXsrEDOwO8AGacWqbrhczkMui/5E3D4d4C5rVKt9VKTLvzvUBSwPQdXXMqKvR2PNM/MVtVlIKkGxv0Ef2DvE7JyR08MZh1q6uq1yjjo1h+5ewjMTiuK0QSqlSpTV1rhgSCf2kb9ZbdU7L8PdHJRwqU6ZNZ2AqNqC+bAWB6FsLDMxovcRgPmoad7a/wBF+8iXGjuQmEpAfRrHraTaO0TU1g1SyAZhQbkn+R3fYS8lzEQ0MFTQWVFXuEmiJQlNpjnjwj3MuZTaY548I9zAtMLzF8K+wksiwvMXwr7CSwEREDTOU9HVqubW1lv98wZyvlzgkNNagI10bVtcXKnfYdYynZuWmj/mYdiOhSD4TvnGsTWVLIXX5IUqUUXYk3BA6hmD9pBz41gjX/kR2Wsf7m/cinFanT17E0X1B/puGC2PYGYd1ppmK0Out+oCLZWBJIvzSP2mbZoLGtRoinh8O7k5s7kKC27dvsBlaNVoul9Hslaohv8AQSgy3sDb7ZZyFMIL/SpbM5E5kWtaw6bze8QlapUL1MLRao1gSVc7sgSutqk7s7S30fyf0hUypq1MHoo01pDzUX/MDQsJyUxTAEUSi5fU4CDLPW1mtnM2nyUUfq4qkN51aetVNybnmjVz750vBfCTEVDeqR3uSx/M2XAfCWgv6jluwZRBxinobCLuWvW379SkufR+5pf6L5P4iuvy6QNGmf2U133Fru5+pjbK/ladowXInBUrWogkdLZy5o4VFFlUL3CVHFdE/BqurBgwXvE6xya0McNSCGx7haW8QEREBERASm0xzx4R7mXMptMc8eEe5gWmF5i+FfYSWRYXmL4V9hJYCIiB5dARY5gypqckcGxuaCE+ES4iBqOlvhxhqpBUCn12AmZo7kTh6QtbW75sUQMOloiiu6mvkJlqgG4W7p+xAREQEREBERAREQEREBKbTHPHhHuZcym0xzx4R7mBaYXmL4V9hJZj06oQBWytkD0Ebhn0Ge9qTjX1CBLEi2pONfUI2pONfUIEsSLak419Qjak419QgSxItqTjX1CNqTjX1CBLEi2pONfUI2pONfUIEsSLak419Qjak419QgSxItqTjX1CNqTjX1CBLEi2pONfUI2pONfUIEsSLak419Qjak419QgSxItqTjX1CNqTjX1CBLKbTHPHhHuZZnFpxA9xufITGr4H5h1jdegDpt1nzMD/2Q=="/>
+          <p:cNvSpPr>
+            <a:spLocks noChangeAspect="1" noChangeArrowheads="1"/>
+          </p:cNvSpPr>
+          <p:nvPr/>
+        </p:nvSpPr>
+        <p:spPr bwMode="auto">
+          <a:xfrm>
+            <a:off x="155575" y="-144463"/>
+            <a:ext cx="304800" cy="304801"/>
+          </a:xfrm>
+          <a:prstGeom prst="rect">
+            <a:avLst/>
+          </a:prstGeom>
+          <a:noFill/>
+        </p:spPr>
+        <p:txBody>
+          <a:bodyPr vert="horz" wrap="square" lIns="91440" tIns="45720" rIns="91440" bIns="45720" numCol="1" anchor="t" anchorCtr="0" compatLnSpc="1">
+            <a:prstTxWarp prst="textNoShape">
+              <a:avLst/>
+            </a:prstTxWarp>
+          </a:bodyPr>
+          <a:lstStyle/>
+          <a:p>
+            <a:endParaRPr lang="en-US"/>
+          </a:p>
+        </p:txBody>
+      </p:sp>
+      <p:pic>
+        <p:nvPicPr>
+          <p:cNvPr id="3" name="Picture 2"/>
+          <p:cNvPicPr>
+            <a:picLocks noChangeAspect="1" noChangeArrowheads="1"/>
+          </p:cNvPicPr>
+          <p:nvPr/>
+        </p:nvPicPr>
+        <p:blipFill>
+          <a:blip r:embed="rId2" cstate="print"/>
+          <a:srcRect l="12766" r="27660"/>
+          <a:stretch>
+            <a:fillRect/>
+          </a:stretch>
+        </p:blipFill>
+        <p:spPr bwMode="auto">
+          <a:xfrm rot="5400000">
+            <a:off x="5381625" y="1476375"/>
+            <a:ext cx="2133600" cy="2686050"/>
+          </a:xfrm>
+          <a:prstGeom prst="rect">
+            <a:avLst/>
+          </a:prstGeom>
+          <a:noFill/>
+          <a:ln w="9525">
+            <a:noFill/>
+            <a:miter lim="800000"/>
+            <a:headEnd/>
+            <a:tailEnd/>
+          </a:ln>
+          <a:effectLst/>
+        </p:spPr>
+      </p:pic>
     </p:spTree>
   </p:cSld>
   <p:clrMapOvr>
@@ -3341,7 +3989,7 @@
           <a:p>
             <a:r>
               <a:rPr lang="en-US" dirty="0" smtClean="0"/>
-              <a:t>FPGA control</a:t>
+              <a:t>Hardware </a:t>
             </a:r>
             <a:endParaRPr lang="en-US" dirty="0"/>
           </a:p>
@@ -3349,800 +3997,25 @@
       </p:sp>
       <p:sp>
         <p:nvSpPr>
-          <p:cNvPr id="4" name="Rectangle 4"/>
-          <p:cNvSpPr>
-            <a:spLocks noChangeArrowheads="1"/>
-          </p:cNvSpPr>
-          <p:nvPr/>
-        </p:nvSpPr>
-        <p:spPr bwMode="auto">
-          <a:xfrm>
-            <a:off x="2374900" y="2362200"/>
-            <a:ext cx="2376488" cy="2628900"/>
-          </a:xfrm>
-          <a:prstGeom prst="rect">
-            <a:avLst/>
-          </a:prstGeom>
-          <a:solidFill>
-            <a:schemeClr val="accent1"/>
-          </a:solidFill>
-          <a:ln w="50800">
-            <a:solidFill>
-              <a:schemeClr val="tx1"/>
-            </a:solidFill>
-            <a:miter lim="800000"/>
-            <a:headEnd/>
-            <a:tailEnd/>
-          </a:ln>
-        </p:spPr>
-        <p:txBody>
-          <a:bodyPr wrap="none" anchor="ctr"/>
-          <a:lstStyle/>
-          <a:p>
-            <a:pPr algn="ctr"/>
-            <a:r>
-              <a:rPr lang="en-US" sz="2000" b="1" dirty="0"/>
-              <a:t>SE Test System</a:t>
-            </a:r>
-            <a:br>
-              <a:rPr lang="en-US" sz="2000" b="1" dirty="0"/>
-            </a:br>
-            <a:r>
-              <a:rPr lang="en-US" sz="2000" b="1" dirty="0"/>
-              <a:t>(made of several</a:t>
-            </a:r>
-            <a:br>
-              <a:rPr lang="en-US" sz="2000" b="1" dirty="0"/>
-            </a:br>
-            <a:r>
-              <a:rPr lang="en-US" sz="2000" b="1" dirty="0"/>
-              <a:t>components)</a:t>
-            </a:r>
-          </a:p>
-        </p:txBody>
-      </p:sp>
-      <p:sp>
-        <p:nvSpPr>
-          <p:cNvPr id="5" name="Line 5"/>
-          <p:cNvSpPr>
-            <a:spLocks noChangeShapeType="1"/>
-          </p:cNvSpPr>
-          <p:nvPr/>
-        </p:nvSpPr>
-        <p:spPr bwMode="auto">
-          <a:xfrm flipH="1">
-            <a:off x="1619250" y="2651125"/>
-            <a:ext cx="757238" cy="0"/>
-          </a:xfrm>
-          <a:prstGeom prst="line">
-            <a:avLst/>
-          </a:prstGeom>
-          <a:noFill/>
-          <a:ln w="38100">
-            <a:solidFill>
-              <a:schemeClr val="tx1"/>
-            </a:solidFill>
-            <a:round/>
-            <a:headEnd/>
-            <a:tailEnd/>
-          </a:ln>
-        </p:spPr>
+          <p:cNvPr id="3" name="Content Placeholder 2"/>
+          <p:cNvSpPr>
+            <a:spLocks noGrp="1"/>
+          </p:cNvSpPr>
+          <p:nvPr>
+            <p:ph idx="1"/>
+          </p:nvPr>
+        </p:nvSpPr>
+        <p:spPr/>
         <p:txBody>
           <a:bodyPr/>
           <a:lstStyle/>
           <a:p>
-            <a:endParaRPr lang="en-US" dirty="0"/>
-          </a:p>
-        </p:txBody>
-      </p:sp>
-      <p:sp>
-        <p:nvSpPr>
-          <p:cNvPr id="6" name="Line 6"/>
-          <p:cNvSpPr>
-            <a:spLocks noChangeShapeType="1"/>
-          </p:cNvSpPr>
-          <p:nvPr/>
-        </p:nvSpPr>
-        <p:spPr bwMode="auto">
-          <a:xfrm flipH="1">
-            <a:off x="1619250" y="3011488"/>
-            <a:ext cx="757238" cy="0"/>
-          </a:xfrm>
-          <a:prstGeom prst="line">
-            <a:avLst/>
-          </a:prstGeom>
-          <a:noFill/>
-          <a:ln w="38100">
-            <a:solidFill>
-              <a:schemeClr val="tx1"/>
-            </a:solidFill>
-            <a:round/>
-            <a:headEnd/>
-            <a:tailEnd/>
-          </a:ln>
-        </p:spPr>
-        <p:txBody>
-          <a:bodyPr/>
-          <a:lstStyle/>
-          <a:p>
-            <a:endParaRPr lang="en-US" dirty="0"/>
-          </a:p>
-        </p:txBody>
-      </p:sp>
-      <p:sp>
-        <p:nvSpPr>
-          <p:cNvPr id="7" name="Text Box 7"/>
-          <p:cNvSpPr txBox="1">
-            <a:spLocks noChangeArrowheads="1"/>
-          </p:cNvSpPr>
-          <p:nvPr/>
-        </p:nvSpPr>
-        <p:spPr bwMode="auto">
-          <a:xfrm>
-            <a:off x="938213" y="2398713"/>
-            <a:ext cx="717550" cy="366712"/>
-          </a:xfrm>
-          <a:prstGeom prst="rect">
-            <a:avLst/>
-          </a:prstGeom>
-          <a:noFill/>
-          <a:ln w="9525">
-            <a:noFill/>
-            <a:miter lim="800000"/>
-            <a:headEnd/>
-            <a:tailEnd/>
-          </a:ln>
-        </p:spPr>
-        <p:txBody>
-          <a:bodyPr wrap="none">
-            <a:spAutoFit/>
-          </a:bodyPr>
-          <a:lstStyle/>
-          <a:p>
-            <a:r>
-              <a:rPr lang="en-US" dirty="0"/>
-              <a:t>3.3 V</a:t>
-            </a:r>
-          </a:p>
-        </p:txBody>
-      </p:sp>
-      <p:sp>
-        <p:nvSpPr>
-          <p:cNvPr id="8" name="Text Box 8"/>
-          <p:cNvSpPr txBox="1">
-            <a:spLocks noChangeArrowheads="1"/>
-          </p:cNvSpPr>
-          <p:nvPr/>
-        </p:nvSpPr>
-        <p:spPr bwMode="auto">
-          <a:xfrm>
-            <a:off x="938213" y="2795588"/>
-            <a:ext cx="692150" cy="366712"/>
-          </a:xfrm>
-          <a:prstGeom prst="rect">
-            <a:avLst/>
-          </a:prstGeom>
-          <a:noFill/>
-          <a:ln w="9525">
-            <a:noFill/>
-            <a:miter lim="800000"/>
-            <a:headEnd/>
-            <a:tailEnd/>
-          </a:ln>
-        </p:spPr>
-        <p:txBody>
-          <a:bodyPr wrap="none">
-            <a:spAutoFit/>
-          </a:bodyPr>
-          <a:lstStyle/>
-          <a:p>
-            <a:r>
-              <a:rPr lang="en-US" dirty="0"/>
-              <a:t>GND</a:t>
-            </a:r>
-          </a:p>
-        </p:txBody>
-      </p:sp>
-      <p:sp>
-        <p:nvSpPr>
-          <p:cNvPr id="9" name="Line 9"/>
-          <p:cNvSpPr>
-            <a:spLocks noChangeShapeType="1"/>
-          </p:cNvSpPr>
-          <p:nvPr/>
-        </p:nvSpPr>
-        <p:spPr bwMode="auto">
-          <a:xfrm flipH="1">
-            <a:off x="4754563" y="2867025"/>
-            <a:ext cx="1046162" cy="0"/>
-          </a:xfrm>
-          <a:prstGeom prst="line">
-            <a:avLst/>
-          </a:prstGeom>
-          <a:noFill/>
-          <a:ln w="38100">
-            <a:solidFill>
-              <a:schemeClr val="tx1"/>
-            </a:solidFill>
-            <a:round/>
-            <a:headEnd/>
-            <a:tailEnd/>
-          </a:ln>
-        </p:spPr>
-        <p:txBody>
-          <a:bodyPr/>
-          <a:lstStyle/>
-          <a:p>
-            <a:endParaRPr lang="en-US" dirty="0"/>
-          </a:p>
-        </p:txBody>
-      </p:sp>
-      <p:sp>
-        <p:nvSpPr>
-          <p:cNvPr id="10" name="Rectangle 9"/>
-          <p:cNvSpPr>
-            <a:spLocks noChangeArrowheads="1"/>
-          </p:cNvSpPr>
-          <p:nvPr/>
-        </p:nvSpPr>
-        <p:spPr bwMode="auto">
-          <a:xfrm>
-            <a:off x="5800725" y="2362200"/>
-            <a:ext cx="1692275" cy="1009650"/>
-          </a:xfrm>
-          <a:prstGeom prst="rect">
-            <a:avLst/>
-          </a:prstGeom>
-          <a:solidFill>
-            <a:schemeClr val="accent1"/>
-          </a:solidFill>
-          <a:ln w="50800">
-            <a:solidFill>
-              <a:schemeClr val="tx1"/>
-            </a:solidFill>
-            <a:miter lim="800000"/>
-            <a:headEnd/>
-            <a:tailEnd/>
-          </a:ln>
-        </p:spPr>
-        <p:txBody>
-          <a:bodyPr wrap="none" anchor="ctr"/>
-          <a:lstStyle/>
-          <a:p>
-            <a:pPr algn="ctr"/>
-            <a:r>
-              <a:rPr lang="en-US" sz="2000" b="1" dirty="0"/>
-              <a:t>FPGA</a:t>
-            </a:r>
-          </a:p>
-        </p:txBody>
-      </p:sp>
-      <p:sp>
-        <p:nvSpPr>
-          <p:cNvPr id="11" name="Text Box 12"/>
-          <p:cNvSpPr txBox="1">
-            <a:spLocks noChangeArrowheads="1"/>
-          </p:cNvSpPr>
-          <p:nvPr/>
-        </p:nvSpPr>
-        <p:spPr bwMode="auto">
-          <a:xfrm>
-            <a:off x="5176838" y="2398713"/>
-            <a:ext cx="552450" cy="366712"/>
-          </a:xfrm>
-          <a:prstGeom prst="rect">
-            <a:avLst/>
-          </a:prstGeom>
-          <a:noFill/>
-          <a:ln w="9525">
-            <a:noFill/>
-            <a:miter lim="800000"/>
-            <a:headEnd/>
-            <a:tailEnd/>
-          </a:ln>
-        </p:spPr>
-        <p:txBody>
-          <a:bodyPr wrap="none">
-            <a:spAutoFit/>
-          </a:bodyPr>
-          <a:lstStyle/>
-          <a:p>
-            <a:pPr algn="ctr"/>
-            <a:r>
-              <a:rPr lang="en-US" dirty="0"/>
-              <a:t>I/O </a:t>
-            </a:r>
-          </a:p>
-        </p:txBody>
-      </p:sp>
-      <p:sp>
-        <p:nvSpPr>
-          <p:cNvPr id="12" name="Rectangle 11"/>
-          <p:cNvSpPr>
-            <a:spLocks noChangeArrowheads="1"/>
-          </p:cNvSpPr>
-          <p:nvPr/>
-        </p:nvSpPr>
-        <p:spPr bwMode="auto">
-          <a:xfrm>
-            <a:off x="2917825" y="4306888"/>
-            <a:ext cx="1223963" cy="431800"/>
-          </a:xfrm>
-          <a:prstGeom prst="rect">
-            <a:avLst/>
-          </a:prstGeom>
-          <a:solidFill>
-            <a:schemeClr val="bg1"/>
-          </a:solidFill>
-          <a:ln w="38100">
-            <a:solidFill>
-              <a:schemeClr val="tx1"/>
-            </a:solidFill>
-            <a:miter lim="800000"/>
-            <a:headEnd/>
-            <a:tailEnd/>
-          </a:ln>
-        </p:spPr>
-        <p:txBody>
-          <a:bodyPr wrap="none" anchor="ctr"/>
-          <a:lstStyle/>
-          <a:p>
-            <a:pPr algn="ctr"/>
-            <a:r>
-              <a:rPr lang="en-US" dirty="0"/>
-              <a:t>DUT</a:t>
-            </a:r>
-          </a:p>
-        </p:txBody>
-      </p:sp>
-      <p:sp>
-        <p:nvSpPr>
-          <p:cNvPr id="13" name="Line 15"/>
-          <p:cNvSpPr>
-            <a:spLocks noChangeShapeType="1"/>
-          </p:cNvSpPr>
-          <p:nvPr/>
-        </p:nvSpPr>
-        <p:spPr bwMode="auto">
-          <a:xfrm>
-            <a:off x="6592888" y="3371850"/>
-            <a:ext cx="0" cy="863600"/>
-          </a:xfrm>
-          <a:prstGeom prst="line">
-            <a:avLst/>
-          </a:prstGeom>
-          <a:noFill/>
-          <a:ln w="38100">
-            <a:solidFill>
-              <a:schemeClr val="tx1"/>
-            </a:solidFill>
-            <a:round/>
-            <a:headEnd/>
-            <a:tailEnd/>
-          </a:ln>
-        </p:spPr>
-        <p:txBody>
-          <a:bodyPr/>
-          <a:lstStyle/>
-          <a:p>
-            <a:endParaRPr lang="en-US" dirty="0"/>
-          </a:p>
-        </p:txBody>
-      </p:sp>
-      <p:sp>
-        <p:nvSpPr>
-          <p:cNvPr id="14" name="Rectangle 13"/>
-          <p:cNvSpPr>
-            <a:spLocks noChangeArrowheads="1"/>
-          </p:cNvSpPr>
-          <p:nvPr/>
-        </p:nvSpPr>
-        <p:spPr bwMode="auto">
-          <a:xfrm>
-            <a:off x="5548313" y="4056063"/>
-            <a:ext cx="2376487" cy="1417637"/>
-          </a:xfrm>
-          <a:prstGeom prst="rect">
-            <a:avLst/>
-          </a:prstGeom>
-          <a:solidFill>
-            <a:schemeClr val="accent1"/>
-          </a:solidFill>
-          <a:ln w="50800">
-            <a:solidFill>
-              <a:schemeClr val="tx1"/>
-            </a:solidFill>
-            <a:miter lim="800000"/>
-            <a:headEnd/>
-            <a:tailEnd/>
-          </a:ln>
-        </p:spPr>
-        <p:txBody>
-          <a:bodyPr wrap="none" anchor="ctr"/>
-          <a:lstStyle/>
-          <a:p>
-            <a:pPr algn="ctr"/>
-            <a:r>
-              <a:rPr lang="en-US" sz="2000" b="1" dirty="0"/>
-              <a:t>Computer</a:t>
-            </a:r>
-          </a:p>
-        </p:txBody>
-      </p:sp>
-      <p:sp>
-        <p:nvSpPr>
-          <p:cNvPr id="15" name="Text Box 17"/>
-          <p:cNvSpPr txBox="1">
-            <a:spLocks noChangeArrowheads="1"/>
-          </p:cNvSpPr>
-          <p:nvPr/>
-        </p:nvSpPr>
-        <p:spPr bwMode="auto">
-          <a:xfrm>
-            <a:off x="6589713" y="3498850"/>
-            <a:ext cx="1263650" cy="366713"/>
-          </a:xfrm>
-          <a:prstGeom prst="rect">
-            <a:avLst/>
-          </a:prstGeom>
-          <a:noFill/>
-          <a:ln w="9525">
-            <a:noFill/>
-            <a:miter lim="800000"/>
-            <a:headEnd/>
-            <a:tailEnd/>
-          </a:ln>
-        </p:spPr>
-        <p:txBody>
-          <a:bodyPr wrap="none">
-            <a:spAutoFit/>
-          </a:bodyPr>
-          <a:lstStyle/>
-          <a:p>
-            <a:r>
-              <a:rPr lang="en-US" dirty="0"/>
-              <a:t>USB/serial</a:t>
-            </a:r>
-          </a:p>
-        </p:txBody>
-      </p:sp>
-    </p:spTree>
-  </p:cSld>
-  <p:clrMapOvr>
-    <a:masterClrMapping/>
-  </p:clrMapOvr>
-</p:sld>
-</file>
-
-<file path=ppt/slides/slide12.xml><?xml version="1.0" encoding="utf-8"?>
-<p:sld xmlns:a="http://schemas.openxmlformats.org/drawingml/2006/main" xmlns:r="http://schemas.openxmlformats.org/officeDocument/2006/relationships" xmlns:p="http://schemas.openxmlformats.org/presentationml/2006/main">
-  <p:cSld>
-    <p:spTree>
-      <p:nvGrpSpPr>
-        <p:cNvPr id="1" name=""/>
-        <p:cNvGrpSpPr/>
-        <p:nvPr/>
-      </p:nvGrpSpPr>
-      <p:grpSpPr>
-        <a:xfrm>
-          <a:off x="0" y="0"/>
-          <a:ext cx="0" cy="0"/>
-          <a:chOff x="0" y="0"/>
-          <a:chExt cx="0" cy="0"/>
-        </a:xfrm>
-      </p:grpSpPr>
-      <p:sp>
-        <p:nvSpPr>
-          <p:cNvPr id="2" name="Title 1"/>
-          <p:cNvSpPr>
-            <a:spLocks noGrp="1"/>
-          </p:cNvSpPr>
-          <p:nvPr>
-            <p:ph type="title"/>
-          </p:nvPr>
-        </p:nvSpPr>
-        <p:spPr/>
-        <p:txBody>
-          <a:bodyPr/>
-          <a:lstStyle/>
-          <a:p>
-            <a:r>
-              <a:rPr lang="en-US" dirty="0" smtClean="0"/>
-              <a:t>GPIB Control</a:t>
-            </a:r>
-            <a:endParaRPr lang="en-US" dirty="0"/>
-          </a:p>
-        </p:txBody>
-      </p:sp>
-      <p:sp>
-        <p:nvSpPr>
-          <p:cNvPr id="10" name="Content Placeholder 9"/>
-          <p:cNvSpPr>
-            <a:spLocks noGrp="1"/>
-          </p:cNvSpPr>
-          <p:nvPr>
-            <p:ph sz="half" idx="1"/>
-          </p:nvPr>
-        </p:nvSpPr>
-        <p:spPr/>
-        <p:txBody>
-          <a:bodyPr/>
-          <a:lstStyle/>
-          <a:p>
-            <a:r>
-              <a:rPr lang="en-US" dirty="0" smtClean="0"/>
-              <a:t>The de facto standard of controlling hardware using a PC</a:t>
-            </a:r>
-          </a:p>
-          <a:p>
-            <a:endParaRPr lang="en-US" dirty="0"/>
-          </a:p>
-        </p:txBody>
-      </p:sp>
-      <p:sp>
-        <p:nvSpPr>
-          <p:cNvPr id="11" name="Content Placeholder 10"/>
-          <p:cNvSpPr>
-            <a:spLocks noGrp="1"/>
-          </p:cNvSpPr>
-          <p:nvPr>
-            <p:ph sz="half" idx="2"/>
-          </p:nvPr>
-        </p:nvSpPr>
-        <p:spPr/>
-        <p:txBody>
-          <a:bodyPr/>
-          <a:lstStyle/>
-          <a:p>
-            <a:endParaRPr lang="en-US"/>
-          </a:p>
-        </p:txBody>
-      </p:sp>
-      <p:sp>
-        <p:nvSpPr>
-          <p:cNvPr id="1026" name="AutoShape 2" descr="data:image/jpeg;base64,/9j/4AAQSkZJRgABAQAAAQABAAD/2wCEAAkGBhAPDw8PDQ8QDw8NDw0NDw0NDQ8NDw8OFBAVFBQQEhUXHCYeFxkjGRYSHy8hJCcpLC0sFR4xNTA2NSYrLCkBCQoKDgwOFA8PGi8kHBwpKSksLCksLCwpKSkpKSkpKSkpKSkpNSwpLCwsLCkpKSwpKSwsLCksKSksLCkpKSkpKf/AABEIALIBGwMBIgACEQEDEQH/xAAcAAADAAMBAQEAAAAAAAAAAAAAAQIDBQYEBwj/xABAEAABBAADBAcECAUDBQEAAAABAAIDEQQSIQUGMVETMkFhcZGhIlKBsQcUI0KSosHRNFNicoIVM7IkQ1Sz8Bb/xAAYAQEBAQEBAAAAAAAAAAAAAAAAAgEDBP/EAB4RAQEAAgMBAAMAAAAAAAAAAAABERICITFBUWFx/9oADAMBAAIRAxEAPwDuGsWVrE2sWZrEEtYsrWKmsWQNQSGKwxWGqw1BjDVQasgamGoIDU8qyZU8qCA1PKryp5UEBqrKqATAQSGp5VVJgIJpOlVJgIJyopXSKQTSeVOk6QKkUqpFIFSKVUikCpFKqRSCaRStFIIpFK6SpBNIpXSVIJpSWrJSVIOea1ZWtQ1qyNagYarDUNCyAIANVBqYCoBAg1UAmAqAQTSeVVSqkEZU8qpOkEUmArpFIJpOk6TpAqRSpFIEnSaECQmikBSKTTQSAnSaaBUik0igKQmhAqRSaECpCaKQJFJ0hBomhZWhSAsjQgpoVgJAKwgYCqkKgEAEwEAKggEJoQCdIQgEUmgICkJoQFJoQgEJopAqTpCaBJoQgEJoQJBQhAIQhABNATQJCaECQmhBpWrIFDVYQW1WAparCClQSCoIGmElQQCEJoBCEIBNJNAJp0lSATQkgE7SpOkCJTCKTQCaSaAQhCBITpJAITQgE0IQCEIQCEIQaYLI0KGq2oMgVhQ1ZQEAFQQAmEDCaSaBoSTQCSaDpqdO86IFSYC12N3hwsOkkzAfdbb3eTbWrm3+ww6jZn+DAwfmKM2jp7Ra4mb6Q3G+jw4HfJLfoAtdid/MVXWhiHMMv1cVmYzaPo6TnAakgd5NBfH8Xv47USY5xPuxvr0YFqp96Y361PMeZY4jt7XnuPkid32ifb2Fj6+IiHd0gJ8gvPJvXgwL6dru5jXvPoF8Wl3glBOTDNZQB+1lAsXWgA/VavFb0Yqy1vR9tGNvSaeNnkqxWbvuE+/uHb1GSv8A8WsHqVrcT9Ijh/twMaB96WUnT4AfNfFpMZjX8Xyixmyh2SxfYBVrVyTOPWJP9xJ+aYZta+3Y3fTHCupFmbmbUPEcwXE2udxf0obUwzhnMMsZ4OfAGnwOUhcRsDHTMeA1jpWO0LMrnAEis47xfxXZP2c1w6rgSNbkcdfhSm3Bmtrsv6bJC9oxWGjyE058LnNcBzDXXfgvqOAx8eIjZNA8PjkFtc06eHce5fnHbOBkw7gbPRm6sWASKo2tludv7Ps+XU9Jh3kdLCKbfAZm8nD17VXrZzv1+hULw7O23BiIW4iGVroniw6wKPa0jsI5JSbYjHVzP/tGnmVjpmPehas7bH8t34gsZ28T1Y6/ud+wWZhmNwhaJ+15TwLW+Db+awv2lL/N8g0fos2ido6NSXAcSB4lcvLinnrSOP8AkV7dmYwOtj9TVgniRyScpTZuDiWjtvw1WM4z+k+dLCTSgvVGWJoVtCxNKyAotkCyArG1WEFhUFAVhBQQgIQNcd9JG+smzIIzAxrpZnEBzxbWMHE12k8AuwXHfSRsUYvDOZYDmN6Rjj2EE36Inl45cb64uaNrxiH5XgGmVH8PZAXN4zfhmZweZpCDRt+cGu8leXdzFxlpwwzgszG3kW8E/dFezXLXitftPdiYzOdE1pY8lw9oNDb7NSn3txZ5d9jrkiFf1OPD4JYTel8hqSToi403JC1414WST8l5It0Jz1nRt/yLj6BeyDc0ffmJ7mMA+dpniYPas7443XiXOeQMo6R8brvX2BQApaPAvt9vLCGgkiYkgjgfjrfwXYM3Xic7NI2SVzq1kkOp+FL2N2dhoeLIIyK6waXeuqbT4yTpywfdiMgkHO36tC8+0eLQ7iNR4ar0xbOnddQz66jPI2IBx1dY00v9V0rcdHwjEsvIQxPy/iIpWZ5Pu4cDhrPO1vo2ym1bhoYN3JeJbh2f35pyOPdyNfAL3QbuO7cQ+6DfsYwywOGpu173zy/zMPED7kTpnD4uIHooM50z4id/c0shafg0X6rM0xGOPdKFlF7XEC6M0paNTZ0sBXFFgYiMrsMD2CJvTv8AyAlKOTDtOZ0LHH3p3GY/nJ5rbYXeSNrcsQjbQ6sbWNAHgFmLRiizPH2GHxcl3lP1YQs7rMpb8lsIsF00QngndGGGnRuDBmcDrZaBQ7LteB2+YY8ZiBrZXk2TtXDuZ9TxBlD4pJSwRQukE7Xah1t0Ommun6VJ+S/ps8Ng34uefBvd0XRRROL3RMxJLSXaDOSNbGp10Uz/AEUtNlmIjv8ArwbG/wDrc1b7YWzniefFSAN6ZsUUcbSHZImDQFw0J51pZNcLXQAqVydduM3e3NxOBkzCeEwUTLG1s3taUCA4kNN9tro3Ykdiz7WdUElcmj8wWiZiNFlib02hxXesDsQvOJDyPksck4bq9zWD+twCnWsy9vTqTOtNPvBh2f8AcLzyjaT6nReX/wDQSyGsNhXOJ4OksjyH7rdGyWug6Qq8JNlmiOtucR4jKVp8PsHauI60ogaexjQ0j9VuMLuZjWAf9W0u/mmIGVvOibHot1VpW/ll7fVaqbeOFri0yx2DX+6z91mw24kRObFSzYl3KWVxb+G6W2Zu5hWgAYeIAcPs2roqcWAK2rGFkasWyNVhQ0qwgsKgoBVAoLCakFFoKWn25x/xHzW2tanbPEeA/wCSRPLx8f27uy3C7QEuctjleTGxgskniDxptnkeB8V78fgsRh3258ckQ6zWANc0cyNfmCt5vbiI2zwhxAeQ7JdaWav5j4rkZtpvjkLs7nuBkyQNZZqu3u4+CrErz21s9nRSYqISYfo4wXStc6Vxf7QdQyMDeGna5VJszKalxTiTqRDEyIH4nMa/Za3dPavRwiI1mzPeQD7zia8EbWxzmPDr6xAF9UE6KLFMszIg4B2eTLw6SV59LA9Ehjoo+qImHh7LWg/uupk2HgI8K2b+Mk0L3veQy+TWA0BfO1pmbyRs0gw8UfZ7EbRrzUS1VmHljmll/wBqOZ9nTLE+r8Toso2Pi3amNsY5zytb6CynLt/EydUO8ivLPiJbqWZkdnhJI1p8uK1j2f6JWs2Jjb/TFGXHzcf0UOw2DZ1nzSnkZAwE+DQPmvOzCZhm+1kb70cD8n43031WCSfDx6PdCxw7JsW1x/BCHlbgeoYrDtP2WGjvgHOBeR8StZtTDyTkPZGc7OGRtacgAlNvXhmdQuNcRBhWtuu0PmcSPwLyv344BkTnVbmmbEvcPi2ERt+aqSjT4zOXEOtuUDMXAgg8vFbDdfbT8LM1w+1a0jNC+nZm9uW+B4rN9nisJjsTJE2OaD6u9skRka1+eTIWOa5zgSeIPcVz0OKYxri4Gzo1wdlo3qQq/rH6L2VtGPExMmhdmY8fFpHFpHYQvcAvjP0UbclGNMQe50U4Ic1xLvbDS7pO48B4L7S1qizDpGm3rxJjwj3N454wNL4uXCsxuKk0Zn/xbS+l7Rw4e0NcLBe00e616sFs1jQKaPJbFSR82g3dx8vvi+1z3LbYL6OJHG55PgP3X0RkYHALIinObP3HwsVEsDjzdqt5BgI2CmMaPABZ0IGAmlaEDRaSVoNQCsjViasjSgyNVgrGCrCCwmCpCYQWCmEgqAQK1qtq6n4D/ktuWrW7Sj4fD5hE8vHF767JEzLJ1a020jMHa6Du4lfHdo7RkjL4YzkabaQwNYXNvg4gW4dx0X33akQcQ08CD818b3z2IcNii4j2ZwSzkOAIW/XJzGGmkY4FrqI14rrdpMfisFHPFq6JxErBxBy//ea5HVpJ92ib00tdXubtRrcS7D3bMW3JRBAEw1YRfPh5JYHuttdwY5sriIiHW4kBrKr2nX2WWjtOugKz4rebCMPsPkfR4Qwshadffksn8IXt2/u82LZ2IdGzKW42OV2lHoy2g09wc8r5pIXnMReVh1oaAE0LrvTr1uMusxe+V9XDtNfz55p/ygtZ6LXv3wxAJ6ORsN/+NFHCfDM1ub1WhOHOtkaNDxrd32Cu1PoW8ybbeg4O5eCZjcPXi9tSSm5ZJJTzlkc+nc/aJXlOLPACtKr9VbYh2M4Mp1m/aP3gvTBgJX6RsLi1lewwklp514p2dPFch5j2SR922DlzCnonGu2xfPzXT4bcTHPAJgexmUU+YiBo17S8jTivbHutDCQcRionkVeHwZ+sSE8s1ZG+JJQdDsjZkcewp3zNzfWbkAujUYyR/mJK4zaW78wczKzOzIJBK2nMcHDs/W+C6nauOxWIw/1eDD9FCGMiYM+ZwY2qqu3Tj3rTYDYOLaQ1zZHNB6pLy3jy4JknGuu+iPd+OISYyR7baXxN1oMNDM4k6cNPNfRXbczezhIX4l3DOBkhB73nj8LXO7m7DY0AyQC7zU4EtDuYadAvoeHAA0ACxc44ajZmz8S53SYtzL+7FGPZb8e0rdBlLJaRRSEWmVJQO0WlaLQNFpWi0FWklaLQahqyNWMFW1BlCoFQFQQWCmoBVBBYKsOWK1QKDKHLz4xlhZWuRJqEHDbx7XfFJGxkXSF4JzF+RrBY1OhJ49i5HfTDuxMZ+0hccOHy9Gxj2yUAM+pJFDTy+C7febDBpDz2GwaJ7eGnBcMIocMXvia6R8uYHOKAaTZAVTDhePLL5fiydQfvce4DWlst1sPJNiIWMBzdIyiBwAIJce4Va3OM2HDna/JJTrc+Gso7fZa7jXBbHYUE8F/VIWNc7QyyW91chyCZVrX0DaGCbPDPA5wAxLHMBJoB/wB0n40vj8e42Pe5zW4WUU4hxc0sZoeOY6Ed90u3xGwMdO3NLiDXuMGULUv2I8eyXSOA7C9xHkpjdWobuKWfxWKwuH/pMwllHdljsr1Q7C2ewnNJicSTVthhGHYf8pDfkFuMHu253UjPkt7g9yZXcQGorVzWHfBH/D7OgB9/FSSYl3lo1ev/AFXGEZWzdC33MLFHAK8Wi/Vdtg9wmjrn9FusLurh2fdBPmjcR8m/0SaY24SSnnI50h9VuNmbhzuIJaGjvX1WLAxt6rR5LOABwCNc9sndgRgB2q3DNmRj7o8l6k0ExwtbwAWYOUJgoMudGZY7TtBdpWptFoKtFqbRaCrRalCCrRalIlBq2lW0rECsgQZGqwsYKoFBadqLTtBVp5lNotBWZPMsaLQEsYeKcARyIteB+w4LsRMvnlC99p2g5jaWwc/VA8l5cBsAxnXypdgaUhou6QeGDZunteSyDY8XujyXtBTtBhiwjG8GjyWYUErSJQPMqBUBVaC7RakFO0FWnahO0FoU2mCgdp2ptNBVotSi0FWnahO0FWi1NotBVpEpWkg1QKyArCCsjSgygqgVjBVhBdotTaLQXaLU2i0DtFqbRaCrRaVpWgq0WptFoKtFqbQSgq07UBFoLTtRaoFBQKdqbRaCwU7UAp2gq07U2i0FWi0rQgq0WptFoLtFqLQgu0WotFoLtBU2laDxhg5DyVBg5DyTQgoNHIeSrKOQ8kIQPKOQ8k8o5DyQhAZRyCMo5BCECDRyTyjkhCAyjkPJGUckIQGUckZRyQhAso5IyjkhCB5RyRlHJCEBlHJPKOSEIGAE8o5IQgYaOSMo5IQgMo5Jho5IQgeUckZRyQhAUikIQFJ0hCAICVBCEBlHJPKOSEIP/9k="/>
-          <p:cNvSpPr>
-            <a:spLocks noChangeAspect="1" noChangeArrowheads="1"/>
-          </p:cNvSpPr>
-          <p:nvPr/>
-        </p:nvSpPr>
-        <p:spPr bwMode="auto">
-          <a:xfrm>
-            <a:off x="155575" y="-144463"/>
-            <a:ext cx="304800" cy="304801"/>
-          </a:xfrm>
-          <a:prstGeom prst="rect">
-            <a:avLst/>
-          </a:prstGeom>
-          <a:noFill/>
-        </p:spPr>
-        <p:txBody>
-          <a:bodyPr vert="horz" wrap="square" lIns="91440" tIns="45720" rIns="91440" bIns="45720" numCol="1" anchor="t" anchorCtr="0" compatLnSpc="1">
-            <a:prstTxWarp prst="textNoShape">
-              <a:avLst/>
-            </a:prstTxWarp>
-          </a:bodyPr>
-          <a:lstStyle/>
-          <a:p>
-            <a:endParaRPr lang="en-US"/>
-          </a:p>
-        </p:txBody>
-      </p:sp>
-      <p:sp>
-        <p:nvSpPr>
-          <p:cNvPr id="1028" name="AutoShape 4" descr="data:image/jpeg;base64,/9j/4AAQSkZJRgABAQAAAQABAAD/2wCEAAkGBhAPDw8PDQ8QDw8NDw0NDw0NDQ8NDw8OFBAVFBQQEhUXHCYeFxkjGRYSHy8hJCcpLC0sFR4xNTA2NSYrLCkBCQoKDgwOFA8PGi8kHBwpKSksLCksLCwpKSkpKSkpKSkpKSkpNSwpLCwsLCkpKSwpKSwsLCksKSksLCkpKSkpKf/AABEIALIBGwMBIgACEQEDEQH/xAAcAAADAAMBAQEAAAAAAAAAAAAAAQIDBQYEBwj/xABAEAABBAADBAcECAUDBQEAAAABAAIDEQQSIQUGMVETMkFhcZGhIlKBsQcUI0KSosHRNFNicoIVM7IkQ1Sz8Bb/xAAYAQEBAQEBAAAAAAAAAAAAAAAAAgEDBP/EAB4RAQEAAgMBAAMAAAAAAAAAAAABERICITFBUWFx/9oADAMBAAIRAxEAPwDuGsWVrE2sWZrEEtYsrWKmsWQNQSGKwxWGqw1BjDVQasgamGoIDU8qyZU8qCA1PKryp5UEBqrKqATAQSGp5VVJgIJpOlVJgIJyopXSKQTSeVOk6QKkUqpFIFSKVUikCpFKqRSCaRStFIIpFK6SpBNIpXSVIJpSWrJSVIOea1ZWtQ1qyNagYarDUNCyAIANVBqYCoBAg1UAmAqAQTSeVVSqkEZU8qpOkEUmArpFIJpOk6TpAqRSpFIEnSaECQmikBSKTTQSAnSaaBUik0igKQmhAqRSaECpCaKQJFJ0hBomhZWhSAsjQgpoVgJAKwgYCqkKgEAEwEAKggEJoQCdIQgEUmgICkJoQFJoQgEJopAqTpCaBJoQgEJoQJBQhAIQhABNATQJCaECQmhBpWrIFDVYQW1WAparCClQSCoIGmElQQCEJoBCEIBNJNAJp0lSATQkgE7SpOkCJTCKTQCaSaAQhCBITpJAITQgE0IQCEIQCEIQaYLI0KGq2oMgVhQ1ZQEAFQQAmEDCaSaBoSTQCSaDpqdO86IFSYC12N3hwsOkkzAfdbb3eTbWrm3+ww6jZn+DAwfmKM2jp7Ra4mb6Q3G+jw4HfJLfoAtdid/MVXWhiHMMv1cVmYzaPo6TnAakgd5NBfH8Xv47USY5xPuxvr0YFqp96Y361PMeZY4jt7XnuPkid32ifb2Fj6+IiHd0gJ8gvPJvXgwL6dru5jXvPoF8Wl3glBOTDNZQB+1lAsXWgA/VavFb0Yqy1vR9tGNvSaeNnkqxWbvuE+/uHb1GSv8A8WsHqVrcT9Ijh/twMaB96WUnT4AfNfFpMZjX8Xyixmyh2SxfYBVrVyTOPWJP9xJ+aYZta+3Y3fTHCupFmbmbUPEcwXE2udxf0obUwzhnMMsZ4OfAGnwOUhcRsDHTMeA1jpWO0LMrnAEis47xfxXZP2c1w6rgSNbkcdfhSm3Bmtrsv6bJC9oxWGjyE058LnNcBzDXXfgvqOAx8eIjZNA8PjkFtc06eHce5fnHbOBkw7gbPRm6sWASKo2tludv7Ps+XU9Jh3kdLCKbfAZm8nD17VXrZzv1+hULw7O23BiIW4iGVroniw6wKPa0jsI5JSbYjHVzP/tGnmVjpmPehas7bH8t34gsZ28T1Y6/ud+wWZhmNwhaJ+15TwLW+Db+awv2lL/N8g0fos2ido6NSXAcSB4lcvLinnrSOP8AkV7dmYwOtj9TVgniRyScpTZuDiWjtvw1WM4z+k+dLCTSgvVGWJoVtCxNKyAotkCyArG1WEFhUFAVhBQQgIQNcd9JG+smzIIzAxrpZnEBzxbWMHE12k8AuwXHfSRsUYvDOZYDmN6Rjj2EE36Inl45cb64uaNrxiH5XgGmVH8PZAXN4zfhmZweZpCDRt+cGu8leXdzFxlpwwzgszG3kW8E/dFezXLXitftPdiYzOdE1pY8lw9oNDb7NSn3txZ5d9jrkiFf1OPD4JYTel8hqSToi403JC1414WST8l5It0Jz1nRt/yLj6BeyDc0ffmJ7mMA+dpniYPas7443XiXOeQMo6R8brvX2BQApaPAvt9vLCGgkiYkgjgfjrfwXYM3Xic7NI2SVzq1kkOp+FL2N2dhoeLIIyK6waXeuqbT4yTpywfdiMgkHO36tC8+0eLQ7iNR4ar0xbOnddQz66jPI2IBx1dY00v9V0rcdHwjEsvIQxPy/iIpWZ5Pu4cDhrPO1vo2ym1bhoYN3JeJbh2f35pyOPdyNfAL3QbuO7cQ+6DfsYwywOGpu173zy/zMPED7kTpnD4uIHooM50z4id/c0shafg0X6rM0xGOPdKFlF7XEC6M0paNTZ0sBXFFgYiMrsMD2CJvTv8AyAlKOTDtOZ0LHH3p3GY/nJ5rbYXeSNrcsQjbQ6sbWNAHgFmLRiizPH2GHxcl3lP1YQs7rMpb8lsIsF00QngndGGGnRuDBmcDrZaBQ7LteB2+YY8ZiBrZXk2TtXDuZ9TxBlD4pJSwRQukE7Xah1t0Ommun6VJ+S/ps8Ng34uefBvd0XRRROL3RMxJLSXaDOSNbGp10Uz/AEUtNlmIjv8ArwbG/wDrc1b7YWzniefFSAN6ZsUUcbSHZImDQFw0J51pZNcLXQAqVydduM3e3NxOBkzCeEwUTLG1s3taUCA4kNN9tro3Ykdiz7WdUElcmj8wWiZiNFlib02hxXesDsQvOJDyPksck4bq9zWD+twCnWsy9vTqTOtNPvBh2f8AcLzyjaT6nReX/wDQSyGsNhXOJ4OksjyH7rdGyWug6Qq8JNlmiOtucR4jKVp8PsHauI60ogaexjQ0j9VuMLuZjWAf9W0u/mmIGVvOibHot1VpW/ll7fVaqbeOFri0yx2DX+6z91mw24kRObFSzYl3KWVxb+G6W2Zu5hWgAYeIAcPs2roqcWAK2rGFkasWyNVhQ0qwgsKgoBVAoLCakFFoKWn25x/xHzW2tanbPEeA/wCSRPLx8f27uy3C7QEuctjleTGxgskniDxptnkeB8V78fgsRh3258ckQ6zWANc0cyNfmCt5vbiI2zwhxAeQ7JdaWav5j4rkZtpvjkLs7nuBkyQNZZqu3u4+CrErz21s9nRSYqISYfo4wXStc6Vxf7QdQyMDeGna5VJszKalxTiTqRDEyIH4nMa/Za3dPavRwiI1mzPeQD7zia8EbWxzmPDr6xAF9UE6KLFMszIg4B2eTLw6SV59LA9Ehjoo+qImHh7LWg/uupk2HgI8K2b+Mk0L3veQy+TWA0BfO1pmbyRs0gw8UfZ7EbRrzUS1VmHljmll/wBqOZ9nTLE+r8Toso2Pi3amNsY5zytb6CynLt/EydUO8ivLPiJbqWZkdnhJI1p8uK1j2f6JWs2Jjb/TFGXHzcf0UOw2DZ1nzSnkZAwE+DQPmvOzCZhm+1kb70cD8n43031WCSfDx6PdCxw7JsW1x/BCHlbgeoYrDtP2WGjvgHOBeR8StZtTDyTkPZGc7OGRtacgAlNvXhmdQuNcRBhWtuu0PmcSPwLyv344BkTnVbmmbEvcPi2ERt+aqSjT4zOXEOtuUDMXAgg8vFbDdfbT8LM1w+1a0jNC+nZm9uW+B4rN9nisJjsTJE2OaD6u9skRka1+eTIWOa5zgSeIPcVz0OKYxri4Gzo1wdlo3qQq/rH6L2VtGPExMmhdmY8fFpHFpHYQvcAvjP0UbclGNMQe50U4Ic1xLvbDS7pO48B4L7S1qizDpGm3rxJjwj3N454wNL4uXCsxuKk0Zn/xbS+l7Rw4e0NcLBe00e616sFs1jQKaPJbFSR82g3dx8vvi+1z3LbYL6OJHG55PgP3X0RkYHALIinObP3HwsVEsDjzdqt5BgI2CmMaPABZ0IGAmlaEDRaSVoNQCsjViasjSgyNVgrGCrCCwmCpCYQWCmEgqAQK1qtq6n4D/ktuWrW7Sj4fD5hE8vHF767JEzLJ1a020jMHa6Du4lfHdo7RkjL4YzkabaQwNYXNvg4gW4dx0X33akQcQ08CD818b3z2IcNii4j2ZwSzkOAIW/XJzGGmkY4FrqI14rrdpMfisFHPFq6JxErBxBy//ea5HVpJ92ib00tdXubtRrcS7D3bMW3JRBAEw1YRfPh5JYHuttdwY5sriIiHW4kBrKr2nX2WWjtOugKz4rebCMPsPkfR4Qwshadffksn8IXt2/u82LZ2IdGzKW42OV2lHoy2g09wc8r5pIXnMReVh1oaAE0LrvTr1uMusxe+V9XDtNfz55p/ygtZ6LXv3wxAJ6ORsN/+NFHCfDM1ub1WhOHOtkaNDxrd32Cu1PoW8ybbeg4O5eCZjcPXi9tSSm5ZJJTzlkc+nc/aJXlOLPACtKr9VbYh2M4Mp1m/aP3gvTBgJX6RsLi1lewwklp514p2dPFch5j2SR922DlzCnonGu2xfPzXT4bcTHPAJgexmUU+YiBo17S8jTivbHutDCQcRionkVeHwZ+sSE8s1ZG+JJQdDsjZkcewp3zNzfWbkAujUYyR/mJK4zaW78wczKzOzIJBK2nMcHDs/W+C6nauOxWIw/1eDD9FCGMiYM+ZwY2qqu3Tj3rTYDYOLaQ1zZHNB6pLy3jy4JknGuu+iPd+OISYyR7baXxN1oMNDM4k6cNPNfRXbczezhIX4l3DOBkhB73nj8LXO7m7DY0AyQC7zU4EtDuYadAvoeHAA0ACxc44ajZmz8S53SYtzL+7FGPZb8e0rdBlLJaRRSEWmVJQO0WlaLQNFpWi0FWklaLQahqyNWMFW1BlCoFQFQQWCmoBVBBYKsOWK1QKDKHLz4xlhZWuRJqEHDbx7XfFJGxkXSF4JzF+RrBY1OhJ49i5HfTDuxMZ+0hccOHy9Gxj2yUAM+pJFDTy+C7febDBpDz2GwaJ7eGnBcMIocMXvia6R8uYHOKAaTZAVTDhePLL5fiydQfvce4DWlst1sPJNiIWMBzdIyiBwAIJce4Va3OM2HDna/JJTrc+Gso7fZa7jXBbHYUE8F/VIWNc7QyyW91chyCZVrX0DaGCbPDPA5wAxLHMBJoB/wB0n40vj8e42Pe5zW4WUU4hxc0sZoeOY6Ed90u3xGwMdO3NLiDXuMGULUv2I8eyXSOA7C9xHkpjdWobuKWfxWKwuH/pMwllHdljsr1Q7C2ewnNJicSTVthhGHYf8pDfkFuMHu253UjPkt7g9yZXcQGorVzWHfBH/D7OgB9/FSSYl3lo1ev/AFXGEZWzdC33MLFHAK8Wi/Vdtg9wmjrn9FusLurh2fdBPmjcR8m/0SaY24SSnnI50h9VuNmbhzuIJaGjvX1WLAxt6rR5LOABwCNc9sndgRgB2q3DNmRj7o8l6k0ExwtbwAWYOUJgoMudGZY7TtBdpWptFoKtFqbRaCrRalCCrRalIlBq2lW0rECsgQZGqwsYKoFBadqLTtBVp5lNotBWZPMsaLQEsYeKcARyIteB+w4LsRMvnlC99p2g5jaWwc/VA8l5cBsAxnXypdgaUhou6QeGDZunteSyDY8XujyXtBTtBhiwjG8GjyWYUErSJQPMqBUBVaC7RakFO0FWnahO0FoU2mCgdp2ptNBVotSi0FWnahO0FWi1NotBVpEpWkg1QKyArCCsjSgygqgVjBVhBdotTaLQXaLU2i0DtFqbRaCrRaVpWgq0WptFoKtFqbQSgq07UBFoLTtRaoFBQKdqbRaCwU7UAp2gq07U2i0FWi0rQgq0WptFoLtFqLQgu0WotFoLtBU2laDxhg5DyVBg5DyTQgoNHIeSrKOQ8kIQPKOQ8k8o5DyQhAZRyCMo5BCECDRyTyjkhCAyjkPJGUckIQGUckZRyQhAso5IyjkhCB5RyRlHJCEBlHJPKOSEIGAE8o5IQgYaOSMo5IQgMo5Jho5IQgeUckZRyQhAUikIQFJ0hCAICVBCEBlHJPKOSEIP/9k="/>
-          <p:cNvSpPr>
-            <a:spLocks noChangeAspect="1" noChangeArrowheads="1"/>
-          </p:cNvSpPr>
-          <p:nvPr/>
-        </p:nvSpPr>
-        <p:spPr bwMode="auto">
-          <a:xfrm>
-            <a:off x="155575" y="-144463"/>
-            <a:ext cx="304800" cy="304801"/>
-          </a:xfrm>
-          <a:prstGeom prst="rect">
-            <a:avLst/>
-          </a:prstGeom>
-          <a:noFill/>
-        </p:spPr>
-        <p:txBody>
-          <a:bodyPr vert="horz" wrap="square" lIns="91440" tIns="45720" rIns="91440" bIns="45720" numCol="1" anchor="t" anchorCtr="0" compatLnSpc="1">
-            <a:prstTxWarp prst="textNoShape">
-              <a:avLst/>
-            </a:prstTxWarp>
-          </a:bodyPr>
-          <a:lstStyle/>
-          <a:p>
-            <a:endParaRPr lang="en-US"/>
-          </a:p>
-        </p:txBody>
-      </p:sp>
-      <p:sp>
-        <p:nvSpPr>
-          <p:cNvPr id="1030" name="AutoShape 6" descr="data:image/jpeg;base64,/9j/4AAQSkZJRgABAQAAAQABAAD/2wCEAAkGBhESERUUEhIWEhUWExURFhUTExoZFxcSFhwVFBQSFRgjJzIeFxkjGRMWHy8gIycrLC0sGR4xNTEqNSYyLCkBCQoKDgwNFw8PGSwcHBwsKSksKSksKSkpKSkpKSwsKSwpKSkpLCkpKSwsKSkpLCkpKSwsKSwpKSkpLCwsLCkpKf/AABEIAIAArAMBIgACEQEDEQH/xAAcAAEAAgMBAQEAAAAAAAAAAAAAAwUEBgcCCAH/xAA6EAACAQICBQoFBAEEAwAAAAABAgADEQQhBRIUMVIGMkFRYXFykZKxBxMigaEzQmLBQ3OC0fAWI6L/xAAWAQEBAQAAAAAAAAAAAAAAAAAAAQL/xAAZEQEBAQADAAAAAAAAAAAAAAAAEQECEjH/2gAMAwEAAhEDEQA/AO006YcBmzvmB0AdAt0z3sqcC+kRheYvhX2ElgRbKnAvpEbKnAvpEliBFsqcC+kRsqcC+kSWIEWypwL6RGypwL6RJYgRbKnAvpEbKnAvpEliBFsqcC+kRsqcC+kSWIEWypwL6RGypwL6RJYgRbKnAvpEbKnAvpEliBFsqcC+kRsqcC+kSWIEWypwL6RGypwL6RJYgRbKnCB3Cx8xMavjvlnVN26QezqPkZnSm0xzx4R7mBaYXmL4V9hJZFheYvhX2ElgIiICIiAiIgIiICIiAiIgIiICIiAiIgJTaY548I9zLmU2mOePCPcwLTC8xfCvsJLIsLzF8K+wksBERAREQET8JmHidN4an+pXpp4qig+V4GbE1zE/EHAJ/m1+xEZvza35lZiPilQHMo1X7W1VHuTJcG7ROY474uuu5KNP/UqFj5C0psV8ZqtrfMpg9aUSb+ZtFWOzz8LAb8p8+Yz4s4l/8tU9zKg/+RK1OWPzTarrZkWd6pYAfyBH5G7qikfSdOsrc1ge4gz3PmjG6LYnXpEobX+hra3bYbjLPkd8RsRgalqlSpXpE2em9yV/lTJP0kdW4+RDNI+hImHonS1HE0lrUXDo4uCPyCOgjcR0TJqVlXnMF7yBKj3ExW0pRG+rT9a/8zFqcpcMP8mt4QW9haBaSm0xzx4R7mR1OV9EblqH/aB7mYlbS4rHWClQPpzt33/MlwbHheYvhX2ElkWF5i+FfYSWUIiIHN+UnxYajjXwtGkpNMZvUJ+p97BVFshfffPOaxpT4t4pTqtWCG17U6S7u83ImN8UcL8vEnFIgZhUZGvuAuwBt12uLnLITXMZo1MT8tw+rcZZC5Bz87yaqTSXL56pJc1avjfLy3CR0tMF11lNNQD9Vwbj7nKRf+K0157t9yFH2mTh9E4cZAA9OZZ8x2DK+czcIqE07Wd7GpZbndZcuw2kuo77gz9G537Qbmwt0TYqVFF5tO3TzVT7Z5/iezVP8AO0sx/FhFIo6WjKvQmpuOZRM/tczITk675nV3W3M5HnaWJxVt7keFVX3uZ5FYtzVep3l3/G6LpGK/J6kBarU6b2JRM7dW/ymVhOT+H/AGUmqdop1H/Jsv5mTRrVaQuKQp27EQnu6ZiYnli1r3PVY7x/20equ6WBuoZNQWb5TU2ycOMioz1cvz0TDTkcMYgrJqUtYsLEve6sVN7ZDd1XkfJnSpxNUoqo1maurMx1qZaxY6m57MLg375vWjMEKNNaa3IF8zmSSSzE9tyYGucnNAY/As3yqy/KY3qKKhtYfvX6bh7dW/p7Lx8UL35x62zMzca1qVQ/wb2tNVGOUb2Em5UXFTEDqHlPG1Hr/MwKNcvzAz+FD/ctcHyaxdTdS1B11G/oR1KxzipbaHclDfj/AKWZuE5AMf1a1uymLfnfMyroSlQsiXsRrG5JJO6/kBNZxhWx4XmL4V9hJZFheYvhX2ElmkIiIHMeUtBXOIDAMLubMLi4ZiMu8TQ61dQiJUUPqi5rG2sO2/Z0Tomm6AZ64O4lwfNpx/lDWfD1NVfqP7Sw1reAG4Hll0QNg0HikNBSyhnGtYst2trErv3ZdEy9F4OtjC60yqhPqdnayqM7DLNmNjkB5TQdFaTqo4LNdf3Dfl0mXT1a+HxYNMkip9SlTkykAhe0zG40vjgqS5PibnpFOn/bH+p4NbCjLVqVT/JyB5LaU+P09hVYkazm9zZRYnq1ibfcAiV1blmBzKYG8fU5P4TV/uIVta47VzTDpT6mKgfkz8bF16g/UNv46zZf7RaaLU5X1v2kJ4Kag9v1EFvveYGI0vWqc5nfI852OXXn1RCt8rVqKn/2Vh93UH7AEt+JXV8JQruFoOC+q7kENqtqqXsrEDOwO8AGacWqbrhczkMui/5E3D4d4C5rVKt9VKTLvzvUBSwPQdXXMqKvR2PNM/MVtVlIKkGxv0Ef2DvE7JyR08MZh1q6uq1yjjo1h+5ewjMTiuK0QSqlSpTV1rhgSCf2kb9ZbdU7L8PdHJRwqU6ZNZ2AqNqC+bAWB6FsLDMxovcRgPmoad7a/wBF+8iXGjuQmEpAfRrHraTaO0TU1g1SyAZhQbkn+R3fYS8lzEQ0MFTQWVFXuEmiJQlNpjnjwj3MuZTaY548I9zAtMLzF8K+wksiwvMXwr7CSwEREDTOU9HVqubW1lv98wZyvlzgkNNagI10bVtcXKnfYdYynZuWmj/mYdiOhSD4TvnGsTWVLIXX5IUqUUXYk3BA6hmD9pBz41gjX/kR2Wsf7m/cinFanT17E0X1B/puGC2PYGYd1ppmK0Out+oCLZWBJIvzSP2mbZoLGtRoinh8O7k5s7kKC27dvsBlaNVoul9Hslaohv8AQSgy3sDb7ZZyFMIL/SpbM5E5kWtaw6bze8QlapUL1MLRao1gSVc7sgSutqk7s7S30fyf0hUypq1MHoo01pDzUX/MDQsJyUxTAEUSi5fU4CDLPW1mtnM2nyUUfq4qkN51aetVNybnmjVz750vBfCTEVDeqR3uSx/M2XAfCWgv6jluwZRBxinobCLuWvW379SkufR+5pf6L5P4iuvy6QNGmf2U133Fru5+pjbK/ladowXInBUrWogkdLZy5o4VFFlUL3CVHFdE/BqurBgwXvE6xya0McNSCGx7haW8QEREBERASm0xzx4R7mXMptMc8eEe5gWmF5i+FfYSWRYXmL4V9hJYCIiB5dARY5gypqckcGxuaCE+ES4iBqOlvhxhqpBUCn12AmZo7kTh6QtbW75sUQMOloiiu6mvkJlqgG4W7p+xAREQEREBERAREQEREBKbTHPHhHuZcym0xzx4R7mBaYXmL4V9hJZj06oQBWytkD0Ebhn0Ge9qTjX1CBLEi2pONfUI2pONfUIEsSLak419Qjak419QgSxItqTjX1CNqTjX1CBLEi2pONfUI2pONfUIEsSLak419Qjak419QgSxItqTjX1CNqTjX1CBLEi2pONfUI2pONfUIEsSLak419Qjak419QgSxItqTjX1CNqTjX1CBLKbTHPHhHuZZnFpxA9xufITGr4H5h1jdegDpt1nzMD/2Q=="/>
-          <p:cNvSpPr>
-            <a:spLocks noChangeAspect="1" noChangeArrowheads="1"/>
-          </p:cNvSpPr>
-          <p:nvPr/>
-        </p:nvSpPr>
-        <p:spPr bwMode="auto">
-          <a:xfrm>
-            <a:off x="155575" y="-144463"/>
-            <a:ext cx="304800" cy="304801"/>
-          </a:xfrm>
-          <a:prstGeom prst="rect">
-            <a:avLst/>
-          </a:prstGeom>
-          <a:noFill/>
-        </p:spPr>
-        <p:txBody>
-          <a:bodyPr vert="horz" wrap="square" lIns="91440" tIns="45720" rIns="91440" bIns="45720" numCol="1" anchor="t" anchorCtr="0" compatLnSpc="1">
-            <a:prstTxWarp prst="textNoShape">
-              <a:avLst/>
-            </a:prstTxWarp>
-          </a:bodyPr>
-          <a:lstStyle/>
-          <a:p>
-            <a:endParaRPr lang="en-US"/>
-          </a:p>
-        </p:txBody>
-      </p:sp>
-      <p:sp>
-        <p:nvSpPr>
-          <p:cNvPr id="1032" name="AutoShape 8" descr="data:image/jpeg;base64,/9j/4AAQSkZJRgABAQAAAQABAAD/2wCEAAkGBhESERUUEhIWEhUWExURFhUTExoZFxcSFhwVFBQSFRgjJzIeFxkjGRMWHy8gIycrLC0sGR4xNTEqNSYyLCkBCQoKDgwNFw8PGSwcHBwsKSksKSksKSkpKSkpKSwsKSwpKSkpLCkpKSwsKSkpLCkpKSwsKSwpKSkpLCwsLCkpKf/AABEIAIAArAMBIgACEQEDEQH/xAAcAAEAAgMBAQEAAAAAAAAAAAAAAwUEBgcCCAH/xAA6EAACAQICBQoFBAEEAwAAAAABAgADEQQhBRIUMVIGMkFRYXFykZKxBxMigaEzQmLBQ3OC0fAWI6L/xAAWAQEBAQAAAAAAAAAAAAAAAAAAAQL/xAAZEQEBAQADAAAAAAAAAAAAAAAAEQECEjH/2gAMAwEAAhEDEQA/AO006YcBmzvmB0AdAt0z3sqcC+kRheYvhX2ElgRbKnAvpEbKnAvpEliBFsqcC+kRsqcC+kSWIEWypwL6RGypwL6RJYgRbKnAvpEbKnAvpEliBFsqcC+kRsqcC+kSWIEWypwL6RGypwL6RJYgRbKnAvpEbKnAvpEliBFsqcC+kRsqcC+kSWIEWypwL6RGypwL6RJYgRbKnCB3Cx8xMavjvlnVN26QezqPkZnSm0xzx4R7mBaYXmL4V9hJZFheYvhX2ElgIiICIiAiIgIiICIiAiIgIiICIiAiIgJTaY548I9zLmU2mOePCPcwLTC8xfCvsJLIsLzF8K+wksBERAREQET8JmHidN4an+pXpp4qig+V4GbE1zE/EHAJ/m1+xEZvza35lZiPilQHMo1X7W1VHuTJcG7ROY474uuu5KNP/UqFj5C0psV8ZqtrfMpg9aUSb+ZtFWOzz8LAb8p8+Yz4s4l/8tU9zKg/+RK1OWPzTarrZkWd6pYAfyBH5G7qikfSdOsrc1ge4gz3PmjG6LYnXpEobX+hra3bYbjLPkd8RsRgalqlSpXpE2em9yV/lTJP0kdW4+RDNI+hImHonS1HE0lrUXDo4uCPyCOgjcR0TJqVlXnMF7yBKj3ExW0pRG+rT9a/8zFqcpcMP8mt4QW9haBaSm0xzx4R7mR1OV9EblqH/aB7mYlbS4rHWClQPpzt33/MlwbHheYvhX2ElkWF5i+FfYSWUIiIHN+UnxYajjXwtGkpNMZvUJ+p97BVFshfffPOaxpT4t4pTqtWCG17U6S7u83ImN8UcL8vEnFIgZhUZGvuAuwBt12uLnLITXMZo1MT8tw+rcZZC5Bz87yaqTSXL56pJc1avjfLy3CR0tMF11lNNQD9Vwbj7nKRf+K0157t9yFH2mTh9E4cZAA9OZZ8x2DK+czcIqE07Wd7GpZbndZcuw2kuo77gz9G537Qbmwt0TYqVFF5tO3TzVT7Z5/iezVP8AO0sx/FhFIo6WjKvQmpuOZRM/tczITk675nV3W3M5HnaWJxVt7keFVX3uZ5FYtzVep3l3/G6LpGK/J6kBarU6b2JRM7dW/ymVhOT+H/AGUmqdop1H/Jsv5mTRrVaQuKQp27EQnu6ZiYnli1r3PVY7x/20equ6WBuoZNQWb5TU2ycOMioz1cvz0TDTkcMYgrJqUtYsLEve6sVN7ZDd1XkfJnSpxNUoqo1maurMx1qZaxY6m57MLg375vWjMEKNNaa3IF8zmSSSzE9tyYGucnNAY/As3yqy/KY3qKKhtYfvX6bh7dW/p7Lx8UL35x62zMzca1qVQ/wb2tNVGOUb2Em5UXFTEDqHlPG1Hr/MwKNcvzAz+FD/ctcHyaxdTdS1B11G/oR1KxzipbaHclDfj/AKWZuE5AMf1a1uymLfnfMyroSlQsiXsRrG5JJO6/kBNZxhWx4XmL4V9hJZFheYvhX2ElmkIiIHMeUtBXOIDAMLubMLi4ZiMu8TQ61dQiJUUPqi5rG2sO2/Z0Tomm6AZ64O4lwfNpx/lDWfD1NVfqP7Sw1reAG4Hll0QNg0HikNBSyhnGtYst2trErv3ZdEy9F4OtjC60yqhPqdnayqM7DLNmNjkB5TQdFaTqo4LNdf3Dfl0mXT1a+HxYNMkip9SlTkykAhe0zG40vjgqS5PibnpFOn/bH+p4NbCjLVqVT/JyB5LaU+P09hVYkazm9zZRYnq1ibfcAiV1blmBzKYG8fU5P4TV/uIVta47VzTDpT6mKgfkz8bF16g/UNv46zZf7RaaLU5X1v2kJ4Kag9v1EFvveYGI0vWqc5nfI852OXXn1RCt8rVqKn/2Vh93UH7AEt+JXV8JQruFoOC+q7kENqtqqXsrEDOwO8AGacWqbrhczkMui/5E3D4d4C5rVKt9VKTLvzvUBSwPQdXXMqKvR2PNM/MVtVlIKkGxv0Ef2DvE7JyR08MZh1q6uq1yjjo1h+5ewjMTiuK0QSqlSpTV1rhgSCf2kb9ZbdU7L8PdHJRwqU6ZNZ2AqNqC+bAWB6FsLDMxovcRgPmoad7a/wBF+8iXGjuQmEpAfRrHraTaO0TU1g1SyAZhQbkn+R3fYS8lzEQ0MFTQWVFXuEmiJQlNpjnjwj3MuZTaY548I9zAtMLzF8K+wksiwvMXwr7CSwEREDTOU9HVqubW1lv98wZyvlzgkNNagI10bVtcXKnfYdYynZuWmj/mYdiOhSD4TvnGsTWVLIXX5IUqUUXYk3BA6hmD9pBz41gjX/kR2Wsf7m/cinFanT17E0X1B/puGC2PYGYd1ppmK0Out+oCLZWBJIvzSP2mbZoLGtRoinh8O7k5s7kKC27dvsBlaNVoul9Hslaohv8AQSgy3sDb7ZZyFMIL/SpbM5E5kWtaw6bze8QlapUL1MLRao1gSVc7sgSutqk7s7S30fyf0hUypq1MHoo01pDzUX/MDQsJyUxTAEUSi5fU4CDLPW1mtnM2nyUUfq4qkN51aetVNybnmjVz750vBfCTEVDeqR3uSx/M2XAfCWgv6jluwZRBxinobCLuWvW379SkufR+5pf6L5P4iuvy6QNGmf2U133Fru5+pjbK/ladowXInBUrWogkdLZy5o4VFFlUL3CVHFdE/BqurBgwXvE6xya0McNSCGx7haW8QEREBERASm0xzx4R7mXMptMc8eEe5gWmF5i+FfYSWRYXmL4V9hJYCIiB5dARY5gypqckcGxuaCE+ES4iBqOlvhxhqpBUCn12AmZo7kTh6QtbW75sUQMOloiiu6mvkJlqgG4W7p+xAREQEREBERAREQEREBKbTHPHhHuZcym0xzx4R7mBaYXmL4V9hJZj06oQBWytkD0Ebhn0Ge9qTjX1CBLEi2pONfUI2pONfUIEsSLak419Qjak419QgSxItqTjX1CNqTjX1CBLEi2pONfUI2pONfUIEsSLak419Qjak419QgSxItqTjX1CNqTjX1CBLEi2pONfUI2pONfUIEsSLak419Qjak419QgSxItqTjX1CNqTjX1CBLKbTHPHhHuZZnFpxA9xufITGr4H5h1jdegDpt1nzMD/2Q=="/>
-          <p:cNvSpPr>
-            <a:spLocks noChangeAspect="1" noChangeArrowheads="1"/>
-          </p:cNvSpPr>
-          <p:nvPr/>
-        </p:nvSpPr>
-        <p:spPr bwMode="auto">
-          <a:xfrm>
-            <a:off x="155575" y="-144463"/>
-            <a:ext cx="304800" cy="304801"/>
-          </a:xfrm>
-          <a:prstGeom prst="rect">
-            <a:avLst/>
-          </a:prstGeom>
-          <a:noFill/>
-        </p:spPr>
-        <p:txBody>
-          <a:bodyPr vert="horz" wrap="square" lIns="91440" tIns="45720" rIns="91440" bIns="45720" numCol="1" anchor="t" anchorCtr="0" compatLnSpc="1">
-            <a:prstTxWarp prst="textNoShape">
-              <a:avLst/>
-            </a:prstTxWarp>
-          </a:bodyPr>
-          <a:lstStyle/>
-          <a:p>
-            <a:endParaRPr lang="en-US"/>
-          </a:p>
-        </p:txBody>
-      </p:sp>
-      <p:sp>
-        <p:nvSpPr>
-          <p:cNvPr id="1034" name="AutoShape 10" descr="data:image/jpeg;base64,/9j/4AAQSkZJRgABAQAAAQABAAD/2wCEAAkGBhESERUUEhIWEhUWExURFhUTExoZFxcSFhwVFBQSFRgjJzIeFxkjGRMWHy8gIycrLC0sGR4xNTEqNSYyLCkBCQoKDgwNFw8PGSwcHBwsKSksKSksKSkpKSkpKSwsKSwpKSkpLCkpKSwsKSkpLCkpKSwsKSwpKSkpLCwsLCkpKf/AABEIAIAArAMBIgACEQEDEQH/xAAcAAEAAgMBAQEAAAAAAAAAAAAAAwUEBgcCCAH/xAA6EAACAQICBQoFBAEEAwAAAAABAgADEQQhBRIUMVIGMkFRYXFykZKxBxMigaEzQmLBQ3OC0fAWI6L/xAAWAQEBAQAAAAAAAAAAAAAAAAAAAQL/xAAZEQEBAQADAAAAAAAAAAAAAAAAEQECEjH/2gAMAwEAAhEDEQA/AO006YcBmzvmB0AdAt0z3sqcC+kRheYvhX2ElgRbKnAvpEbKnAvpEliBFsqcC+kRsqcC+kSWIEWypwL6RGypwL6RJYgRbKnAvpEbKnAvpEliBFsqcC+kRsqcC+kSWIEWypwL6RGypwL6RJYgRbKnAvpEbKnAvpEliBFsqcC+kRsqcC+kSWIEWypwL6RGypwL6RJYgRbKnCB3Cx8xMavjvlnVN26QezqPkZnSm0xzx4R7mBaYXmL4V9hJZFheYvhX2ElgIiICIiAiIgIiICIiAiIgIiICIiAiIgJTaY548I9zLmU2mOePCPcwLTC8xfCvsJLIsLzF8K+wksBERAREQET8JmHidN4an+pXpp4qig+V4GbE1zE/EHAJ/m1+xEZvza35lZiPilQHMo1X7W1VHuTJcG7ROY474uuu5KNP/UqFj5C0psV8ZqtrfMpg9aUSb+ZtFWOzz8LAb8p8+Yz4s4l/8tU9zKg/+RK1OWPzTarrZkWd6pYAfyBH5G7qikfSdOsrc1ge4gz3PmjG6LYnXpEobX+hra3bYbjLPkd8RsRgalqlSpXpE2em9yV/lTJP0kdW4+RDNI+hImHonS1HE0lrUXDo4uCPyCOgjcR0TJqVlXnMF7yBKj3ExW0pRG+rT9a/8zFqcpcMP8mt4QW9haBaSm0xzx4R7mR1OV9EblqH/aB7mYlbS4rHWClQPpzt33/MlwbHheYvhX2ElkWF5i+FfYSWUIiIHN+UnxYajjXwtGkpNMZvUJ+p97BVFshfffPOaxpT4t4pTqtWCG17U6S7u83ImN8UcL8vEnFIgZhUZGvuAuwBt12uLnLITXMZo1MT8tw+rcZZC5Bz87yaqTSXL56pJc1avjfLy3CR0tMF11lNNQD9Vwbj7nKRf+K0157t9yFH2mTh9E4cZAA9OZZ8x2DK+czcIqE07Wd7GpZbndZcuw2kuo77gz9G537Qbmwt0TYqVFF5tO3TzVT7Z5/iezVP8AO0sx/FhFIo6WjKvQmpuOZRM/tczITk675nV3W3M5HnaWJxVt7keFVX3uZ5FYtzVep3l3/G6LpGK/J6kBarU6b2JRM7dW/ymVhOT+H/AGUmqdop1H/Jsv5mTRrVaQuKQp27EQnu6ZiYnli1r3PVY7x/20equ6WBuoZNQWb5TU2ycOMioz1cvz0TDTkcMYgrJqUtYsLEve6sVN7ZDd1XkfJnSpxNUoqo1maurMx1qZaxY6m57MLg375vWjMEKNNaa3IF8zmSSSzE9tyYGucnNAY/As3yqy/KY3qKKhtYfvX6bh7dW/p7Lx8UL35x62zMzca1qVQ/wb2tNVGOUb2Em5UXFTEDqHlPG1Hr/MwKNcvzAz+FD/ctcHyaxdTdS1B11G/oR1KxzipbaHclDfj/AKWZuE5AMf1a1uymLfnfMyroSlQsiXsRrG5JJO6/kBNZxhWx4XmL4V9hJZFheYvhX2ElmkIiIHMeUtBXOIDAMLubMLi4ZiMu8TQ61dQiJUUPqi5rG2sO2/Z0Tomm6AZ64O4lwfNpx/lDWfD1NVfqP7Sw1reAG4Hll0QNg0HikNBSyhnGtYst2trErv3ZdEy9F4OtjC60yqhPqdnayqM7DLNmNjkB5TQdFaTqo4LNdf3Dfl0mXT1a+HxYNMkip9SlTkykAhe0zG40vjgqS5PibnpFOn/bH+p4NbCjLVqVT/JyB5LaU+P09hVYkazm9zZRYnq1ibfcAiV1blmBzKYG8fU5P4TV/uIVta47VzTDpT6mKgfkz8bF16g/UNv46zZf7RaaLU5X1v2kJ4Kag9v1EFvveYGI0vWqc5nfI852OXXn1RCt8rVqKn/2Vh93UH7AEt+JXV8JQruFoOC+q7kENqtqqXsrEDOwO8AGacWqbrhczkMui/5E3D4d4C5rVKt9VKTLvzvUBSwPQdXXMqKvR2PNM/MVtVlIKkGxv0Ef2DvE7JyR08MZh1q6uq1yjjo1h+5ewjMTiuK0QSqlSpTV1rhgSCf2kb9ZbdU7L8PdHJRwqU6ZNZ2AqNqC+bAWB6FsLDMxovcRgPmoad7a/wBF+8iXGjuQmEpAfRrHraTaO0TU1g1SyAZhQbkn+R3fYS8lzEQ0MFTQWVFXuEmiJQlNpjnjwj3MuZTaY548I9zAtMLzF8K+wksiwvMXwr7CSwEREDTOU9HVqubW1lv98wZyvlzgkNNagI10bVtcXKnfYdYynZuWmj/mYdiOhSD4TvnGsTWVLIXX5IUqUUXYk3BA6hmD9pBz41gjX/kR2Wsf7m/cinFanT17E0X1B/puGC2PYGYd1ppmK0Out+oCLZWBJIvzSP2mbZoLGtRoinh8O7k5s7kKC27dvsBlaNVoul9Hslaohv8AQSgy3sDb7ZZyFMIL/SpbM5E5kWtaw6bze8QlapUL1MLRao1gSVc7sgSutqk7s7S30fyf0hUypq1MHoo01pDzUX/MDQsJyUxTAEUSi5fU4CDLPW1mtnM2nyUUfq4qkN51aetVNybnmjVz750vBfCTEVDeqR3uSx/M2XAfCWgv6jluwZRBxinobCLuWvW379SkufR+5pf6L5P4iuvy6QNGmf2U133Fru5+pjbK/ladowXInBUrWogkdLZy5o4VFFlUL3CVHFdE/BqurBgwXvE6xya0McNSCGx7haW8QEREBERASm0xzx4R7mXMptMc8eEe5gWmF5i+FfYSWRYXmL4V9hJYCIiB5dARY5gypqckcGxuaCE+ES4iBqOlvhxhqpBUCn12AmZo7kTh6QtbW75sUQMOloiiu6mvkJlqgG4W7p+xAREQEREBERAREQEREBKbTHPHhHuZcym0xzx4R7mBaYXmL4V9hJZj06oQBWytkD0Ebhn0Ge9qTjX1CBLEi2pONfUI2pONfUIEsSLak419Qjak419QgSxItqTjX1CNqTjX1CBLEi2pONfUI2pONfUIEsSLak419Qjak419QgSxItqTjX1CNqTjX1CBLEi2pONfUI2pONfUIEsSLak419Qjak419QgSxItqTjX1CNqTjX1CBLKbTHPHhHuZZnFpxA9xufITGr4H5h1jdegDpt1nzMD/2Q=="/>
-          <p:cNvSpPr>
-            <a:spLocks noChangeAspect="1" noChangeArrowheads="1"/>
-          </p:cNvSpPr>
-          <p:nvPr/>
-        </p:nvSpPr>
-        <p:spPr bwMode="auto">
-          <a:xfrm>
-            <a:off x="155575" y="-144463"/>
-            <a:ext cx="304800" cy="304801"/>
-          </a:xfrm>
-          <a:prstGeom prst="rect">
-            <a:avLst/>
-          </a:prstGeom>
-          <a:noFill/>
-        </p:spPr>
-        <p:txBody>
-          <a:bodyPr vert="horz" wrap="square" lIns="91440" tIns="45720" rIns="91440" bIns="45720" numCol="1" anchor="t" anchorCtr="0" compatLnSpc="1">
-            <a:prstTxWarp prst="textNoShape">
-              <a:avLst/>
-            </a:prstTxWarp>
-          </a:bodyPr>
-          <a:lstStyle/>
-          <a:p>
-            <a:endParaRPr lang="en-US"/>
-          </a:p>
-        </p:txBody>
-      </p:sp>
-      <p:pic>
-        <p:nvPicPr>
-          <p:cNvPr id="1036" name="Picture 12" descr="http://www.ni.com/images/coreblock/large/gpib1.gif"/>
-          <p:cNvPicPr>
-            <a:picLocks noChangeAspect="1" noChangeArrowheads="1"/>
-          </p:cNvPicPr>
-          <p:nvPr/>
-        </p:nvPicPr>
-        <p:blipFill>
-          <a:blip r:embed="rId2" cstate="print"/>
-          <a:srcRect/>
-          <a:stretch>
-            <a:fillRect/>
-          </a:stretch>
-        </p:blipFill>
-        <p:spPr bwMode="auto">
-          <a:xfrm>
-            <a:off x="4876800" y="1981200"/>
-            <a:ext cx="3276600" cy="2453642"/>
-          </a:xfrm>
-          <a:prstGeom prst="rect">
-            <a:avLst/>
-          </a:prstGeom>
-          <a:noFill/>
-        </p:spPr>
-      </p:pic>
-    </p:spTree>
-  </p:cSld>
-  <p:clrMapOvr>
-    <a:masterClrMapping/>
-  </p:clrMapOvr>
-</p:sld>
-</file>
-
-<file path=ppt/slides/slide13.xml><?xml version="1.0" encoding="utf-8"?>
-<p:sld xmlns:a="http://schemas.openxmlformats.org/drawingml/2006/main" xmlns:r="http://schemas.openxmlformats.org/officeDocument/2006/relationships" xmlns:p="http://schemas.openxmlformats.org/presentationml/2006/main">
-  <p:cSld>
-    <p:spTree>
-      <p:nvGrpSpPr>
-        <p:cNvPr id="1" name=""/>
-        <p:cNvGrpSpPr/>
-        <p:nvPr/>
-      </p:nvGrpSpPr>
-      <p:grpSpPr>
-        <a:xfrm>
-          <a:off x="0" y="0"/>
-          <a:ext cx="0" cy="0"/>
-          <a:chOff x="0" y="0"/>
-          <a:chExt cx="0" cy="0"/>
-        </a:xfrm>
-      </p:grpSpPr>
-      <p:sp>
-        <p:nvSpPr>
-          <p:cNvPr id="2" name="Title 1"/>
-          <p:cNvSpPr>
-            <a:spLocks noGrp="1"/>
-          </p:cNvSpPr>
-          <p:nvPr>
-            <p:ph type="title"/>
-          </p:nvPr>
-        </p:nvSpPr>
-        <p:spPr/>
-        <p:txBody>
-          <a:bodyPr/>
-          <a:lstStyle/>
-          <a:p>
-            <a:r>
-              <a:rPr lang="en-US" dirty="0" smtClean="0"/>
-              <a:t>Hardware </a:t>
-            </a:r>
-            <a:endParaRPr lang="en-US" dirty="0"/>
-          </a:p>
-        </p:txBody>
-      </p:sp>
-      <p:sp>
-        <p:nvSpPr>
-          <p:cNvPr id="3" name="Content Placeholder 2"/>
-          <p:cNvSpPr>
-            <a:spLocks noGrp="1"/>
-          </p:cNvSpPr>
-          <p:nvPr>
-            <p:ph idx="1"/>
-          </p:nvPr>
-        </p:nvSpPr>
-        <p:spPr/>
-        <p:txBody>
-          <a:bodyPr/>
-          <a:lstStyle/>
-          <a:p>
             <a:pPr>
               <a:buNone/>
             </a:pPr>
             <a:r>
-              <a:rPr lang="en-US" sz="2400" dirty="0" err="1" smtClean="0"/>
-              <a:t>Gpib</a:t>
+              <a:rPr lang="en-US" sz="2400" dirty="0" smtClean="0"/>
+              <a:t>GPIB gateway </a:t>
             </a:r>
             <a:endParaRPr lang="en-US" sz="2400" dirty="0" smtClean="0"/>
           </a:p>
@@ -4178,11 +4051,7 @@
             </a:pPr>
             <a:r>
               <a:rPr lang="en-US" sz="2400" i="1" dirty="0" smtClean="0"/>
-              <a:t>h</a:t>
-            </a:r>
-            <a:r>
-              <a:rPr lang="en-US" sz="2400" i="1" dirty="0" smtClean="0"/>
-              <a:t>p34401a</a:t>
+              <a:t>hp34401a</a:t>
             </a:r>
           </a:p>
           <a:p>
@@ -4280,7 +4149,7 @@
 </p:sld>
 </file>
 
-<file path=ppt/slides/slide14.xml><?xml version="1.0" encoding="utf-8"?>
+<file path=ppt/slides/slide12.xml><?xml version="1.0" encoding="utf-8"?>
 <p:sld xmlns:a="http://schemas.openxmlformats.org/drawingml/2006/main" xmlns:r="http://schemas.openxmlformats.org/officeDocument/2006/relationships" xmlns:p="http://schemas.openxmlformats.org/presentationml/2006/main">
   <p:cSld>
     <p:spTree>
@@ -4340,8 +4209,9 @@
             </a:pPr>
             <a:r>
               <a:rPr lang="en-US" sz="2400" dirty="0" smtClean="0"/>
-              <a:t>- Oscilloscope </a:t>
-            </a:r>
+              <a:t>Oscilloscope </a:t>
+            </a:r>
+            <a:endParaRPr lang="en-US" sz="2400" dirty="0" smtClean="0"/>
           </a:p>
           <a:p>
             <a:pPr>
@@ -4401,6 +4271,342 @@
 </p:sld>
 </file>
 
+<file path=ppt/slides/slide13.xml><?xml version="1.0" encoding="utf-8"?>
+<p:sld xmlns:a="http://schemas.openxmlformats.org/drawingml/2006/main" xmlns:r="http://schemas.openxmlformats.org/officeDocument/2006/relationships" xmlns:p="http://schemas.openxmlformats.org/presentationml/2006/main">
+  <p:cSld>
+    <p:spTree>
+      <p:nvGrpSpPr>
+        <p:cNvPr id="1" name=""/>
+        <p:cNvGrpSpPr/>
+        <p:nvPr/>
+      </p:nvGrpSpPr>
+      <p:grpSpPr>
+        <a:xfrm>
+          <a:off x="0" y="0"/>
+          <a:ext cx="0" cy="0"/>
+          <a:chOff x="0" y="0"/>
+          <a:chExt cx="0" cy="0"/>
+        </a:xfrm>
+      </p:grpSpPr>
+      <p:sp>
+        <p:nvSpPr>
+          <p:cNvPr id="2" name="Title 1"/>
+          <p:cNvSpPr>
+            <a:spLocks noGrp="1"/>
+          </p:cNvSpPr>
+          <p:nvPr>
+            <p:ph type="title"/>
+          </p:nvPr>
+        </p:nvSpPr>
+        <p:spPr/>
+        <p:txBody>
+          <a:bodyPr/>
+          <a:lstStyle/>
+          <a:p>
+            <a:r>
+              <a:rPr lang="en-US" dirty="0" smtClean="0"/>
+              <a:t>GPIB: SCPI commands</a:t>
+            </a:r>
+            <a:endParaRPr lang="en-US" dirty="0"/>
+          </a:p>
+        </p:txBody>
+      </p:sp>
+      <p:sp>
+        <p:nvSpPr>
+          <p:cNvPr id="3" name="Content Placeholder 2"/>
+          <p:cNvSpPr>
+            <a:spLocks noGrp="1"/>
+          </p:cNvSpPr>
+          <p:nvPr>
+            <p:ph idx="1"/>
+          </p:nvPr>
+        </p:nvSpPr>
+        <p:spPr/>
+        <p:txBody>
+          <a:bodyPr>
+            <a:normAutofit/>
+          </a:bodyPr>
+          <a:lstStyle/>
+          <a:p>
+            <a:pPr>
+              <a:buNone/>
+            </a:pPr>
+            <a:r>
+              <a:rPr lang="en-US" sz="2400" b="1" dirty="0" smtClean="0"/>
+              <a:t>Standard </a:t>
+            </a:r>
+            <a:r>
+              <a:rPr lang="en-US" sz="2400" b="1" dirty="0" smtClean="0"/>
+              <a:t>Commands for Programmable Instruments</a:t>
+            </a:r>
+            <a:endParaRPr lang="en-US" sz="2400" i="1" dirty="0" smtClean="0"/>
+          </a:p>
+          <a:p>
+            <a:pPr>
+              <a:buNone/>
+            </a:pPr>
+            <a:endParaRPr lang="en-US" sz="2400" i="1" dirty="0" smtClean="0"/>
+          </a:p>
+          <a:p>
+            <a:pPr>
+              <a:buNone/>
+            </a:pPr>
+            <a:r>
+              <a:rPr lang="en-US" sz="2400" dirty="0" smtClean="0"/>
+              <a:t>standard for syntax and commands to use in controlling programmable test and measurement </a:t>
+            </a:r>
+            <a:r>
+              <a:rPr lang="en-US" sz="2400" dirty="0" smtClean="0"/>
+              <a:t>devices</a:t>
+            </a:r>
+          </a:p>
+          <a:p>
+            <a:pPr>
+              <a:buNone/>
+            </a:pPr>
+            <a:endParaRPr lang="en-US" sz="2400" i="1" dirty="0" smtClean="0"/>
+          </a:p>
+          <a:p>
+            <a:pPr>
+              <a:buNone/>
+            </a:pPr>
+            <a:r>
+              <a:rPr lang="en-US" sz="2400" dirty="0" smtClean="0"/>
+              <a:t>SCPI commands to an instrument may either perform a </a:t>
+            </a:r>
+            <a:r>
+              <a:rPr lang="en-US" sz="2400" i="1" dirty="0" smtClean="0"/>
+              <a:t>set</a:t>
+            </a:r>
+            <a:r>
+              <a:rPr lang="en-US" sz="2400" dirty="0" smtClean="0"/>
+              <a:t> operation (e.g. switching a power supply on) or a </a:t>
+            </a:r>
+            <a:r>
+              <a:rPr lang="en-US" sz="2400" i="1" dirty="0" smtClean="0"/>
+              <a:t>query</a:t>
+            </a:r>
+            <a:r>
+              <a:rPr lang="en-US" sz="2400" dirty="0" smtClean="0"/>
+              <a:t> operation (e.g. reading a voltage</a:t>
+            </a:r>
+            <a:r>
+              <a:rPr lang="en-US" sz="2400" dirty="0" smtClean="0"/>
+              <a:t>)</a:t>
+            </a:r>
+          </a:p>
+          <a:p>
+            <a:pPr>
+              <a:buNone/>
+            </a:pPr>
+            <a:endParaRPr lang="en-US" sz="2400" i="1" dirty="0" smtClean="0"/>
+          </a:p>
+          <a:p>
+            <a:pPr>
+              <a:buNone/>
+            </a:pPr>
+            <a:endParaRPr lang="en-US" sz="2400" i="1" dirty="0" smtClean="0"/>
+          </a:p>
+          <a:p>
+            <a:pPr>
+              <a:buNone/>
+            </a:pPr>
+            <a:endParaRPr lang="en-US" sz="2400" i="1" dirty="0" smtClean="0"/>
+          </a:p>
+          <a:p>
+            <a:pPr>
+              <a:buNone/>
+            </a:pPr>
+            <a:endParaRPr lang="en-US" sz="2400" i="1" dirty="0" smtClean="0"/>
+          </a:p>
+          <a:p>
+            <a:pPr>
+              <a:buNone/>
+            </a:pPr>
+            <a:endParaRPr lang="en-US" sz="2400" i="1" dirty="0" smtClean="0"/>
+          </a:p>
+          <a:p>
+            <a:pPr>
+              <a:buNone/>
+            </a:pPr>
+            <a:endParaRPr lang="en-US" sz="2000" dirty="0" smtClean="0"/>
+          </a:p>
+          <a:p>
+            <a:pPr>
+              <a:buNone/>
+            </a:pPr>
+            <a:endParaRPr lang="en-US" sz="2400" dirty="0" smtClean="0"/>
+          </a:p>
+          <a:p>
+            <a:pPr>
+              <a:buNone/>
+            </a:pPr>
+            <a:endParaRPr lang="en-US" sz="2400" i="1" dirty="0" smtClean="0"/>
+          </a:p>
+          <a:p>
+            <a:pPr>
+              <a:buNone/>
+            </a:pPr>
+            <a:endParaRPr lang="en-US" sz="2400" i="1" dirty="0" smtClean="0"/>
+          </a:p>
+          <a:p>
+            <a:pPr>
+              <a:buNone/>
+            </a:pPr>
+            <a:endParaRPr lang="en-US" sz="2400" i="1" dirty="0" smtClean="0"/>
+          </a:p>
+          <a:p>
+            <a:endParaRPr lang="en-US" sz="2400" dirty="0"/>
+          </a:p>
+        </p:txBody>
+      </p:sp>
+    </p:spTree>
+  </p:cSld>
+  <p:clrMapOvr>
+    <a:masterClrMapping/>
+  </p:clrMapOvr>
+  <p:timing>
+    <p:tnLst>
+      <p:par>
+        <p:cTn id="1" dur="indefinite" restart="never" nodeType="tmRoot"/>
+      </p:par>
+    </p:tnLst>
+  </p:timing>
+</p:sld>
+</file>
+
+<file path=ppt/slides/slide14.xml><?xml version="1.0" encoding="utf-8"?>
+<p:sld xmlns:a="http://schemas.openxmlformats.org/drawingml/2006/main" xmlns:r="http://schemas.openxmlformats.org/officeDocument/2006/relationships" xmlns:p="http://schemas.openxmlformats.org/presentationml/2006/main">
+  <p:cSld>
+    <p:spTree>
+      <p:nvGrpSpPr>
+        <p:cNvPr id="1" name=""/>
+        <p:cNvGrpSpPr/>
+        <p:nvPr/>
+      </p:nvGrpSpPr>
+      <p:grpSpPr>
+        <a:xfrm>
+          <a:off x="0" y="0"/>
+          <a:ext cx="0" cy="0"/>
+          <a:chOff x="0" y="0"/>
+          <a:chExt cx="0" cy="0"/>
+        </a:xfrm>
+      </p:grpSpPr>
+      <p:sp>
+        <p:nvSpPr>
+          <p:cNvPr id="2" name="Title 1"/>
+          <p:cNvSpPr>
+            <a:spLocks noGrp="1"/>
+          </p:cNvSpPr>
+          <p:nvPr>
+            <p:ph type="title"/>
+          </p:nvPr>
+        </p:nvSpPr>
+        <p:spPr/>
+        <p:txBody>
+          <a:bodyPr/>
+          <a:lstStyle/>
+          <a:p>
+            <a:r>
+              <a:rPr lang="en-US" dirty="0" smtClean="0"/>
+              <a:t>Modularity</a:t>
+            </a:r>
+            <a:endParaRPr lang="en-US" dirty="0"/>
+          </a:p>
+        </p:txBody>
+      </p:sp>
+      <p:sp>
+        <p:nvSpPr>
+          <p:cNvPr id="3" name="Content Placeholder 2"/>
+          <p:cNvSpPr>
+            <a:spLocks noGrp="1"/>
+          </p:cNvSpPr>
+          <p:nvPr>
+            <p:ph idx="1"/>
+          </p:nvPr>
+        </p:nvSpPr>
+        <p:spPr/>
+        <p:txBody>
+          <a:bodyPr>
+            <a:normAutofit/>
+          </a:bodyPr>
+          <a:lstStyle/>
+          <a:p>
+            <a:pPr>
+              <a:buNone/>
+            </a:pPr>
+            <a:r>
+              <a:rPr lang="en-US" dirty="0" smtClean="0"/>
+              <a:t>	-What is </a:t>
+            </a:r>
+            <a:r>
+              <a:rPr lang="en-US" dirty="0" smtClean="0"/>
+              <a:t>modularity? </a:t>
+            </a:r>
+            <a:endParaRPr lang="en-US" dirty="0" smtClean="0"/>
+          </a:p>
+          <a:p>
+            <a:pPr>
+              <a:buNone/>
+            </a:pPr>
+            <a:r>
+              <a:rPr lang="en-US" dirty="0" smtClean="0"/>
+              <a:t>	-Subdivide the modules by commands because one command can work with multiple device</a:t>
+            </a:r>
+          </a:p>
+          <a:p>
+            <a:pPr>
+              <a:buNone/>
+            </a:pPr>
+            <a:r>
+              <a:rPr lang="en-US" dirty="0" smtClean="0"/>
+              <a:t>	-should be easy for user to write new commands for new device</a:t>
+            </a:r>
+          </a:p>
+          <a:p>
+            <a:pPr>
+              <a:buNone/>
+            </a:pPr>
+            <a:r>
+              <a:rPr lang="en-US" dirty="0" smtClean="0"/>
+              <a:t>	-Easy for extending the software in the future</a:t>
+            </a:r>
+          </a:p>
+          <a:p>
+            <a:pPr>
+              <a:buNone/>
+            </a:pPr>
+            <a:endParaRPr lang="en-US" dirty="0" smtClean="0"/>
+          </a:p>
+          <a:p>
+            <a:pPr>
+              <a:buNone/>
+            </a:pPr>
+            <a:endParaRPr lang="en-US" dirty="0" smtClean="0"/>
+          </a:p>
+          <a:p>
+            <a:pPr>
+              <a:buNone/>
+            </a:pPr>
+            <a:endParaRPr lang="en-US" dirty="0" smtClean="0"/>
+          </a:p>
+        </p:txBody>
+      </p:sp>
+    </p:spTree>
+  </p:cSld>
+  <p:clrMapOvr>
+    <a:masterClrMapping/>
+  </p:clrMapOvr>
+  <p:timing>
+    <p:tnLst>
+      <p:par>
+        <p:cTn id="1" dur="indefinite" restart="never" nodeType="tmRoot"/>
+      </p:par>
+    </p:tnLst>
+  </p:timing>
+</p:sld>
+</file>
+
 <file path=ppt/slides/slide15.xml><?xml version="1.0" encoding="utf-8"?>
 <p:sld xmlns:a="http://schemas.openxmlformats.org/drawingml/2006/main" xmlns:r="http://schemas.openxmlformats.org/officeDocument/2006/relationships" xmlns:p="http://schemas.openxmlformats.org/presentationml/2006/main">
   <p:cSld>
@@ -4435,7 +4641,7 @@
           <a:p>
             <a:r>
               <a:rPr lang="en-US" dirty="0" smtClean="0"/>
-              <a:t>GPIB: SCPI commands</a:t>
+              <a:t>API</a:t>
             </a:r>
             <a:endParaRPr lang="en-US" dirty="0"/>
           </a:p>
@@ -4454,7 +4660,7 @@
         <p:spPr/>
         <p:txBody>
           <a:bodyPr>
-            <a:normAutofit/>
+            <a:normAutofit fontScale="92500"/>
           </a:bodyPr>
           <a:lstStyle/>
           <a:p>
@@ -4462,8 +4668,25 @@
               <a:buNone/>
             </a:pPr>
             <a:r>
-              <a:rPr lang="en-US" sz="2400" i="1" dirty="0" smtClean="0"/>
-              <a:t>What is it</a:t>
+              <a:rPr lang="en-US" dirty="0" smtClean="0">
+                <a:latin typeface="Courier New" pitchFamily="49" charset="0"/>
+                <a:cs typeface="Courier New" pitchFamily="49" charset="0"/>
+              </a:rPr>
+              <a:t>class </a:t>
+            </a:r>
+            <a:r>
+              <a:rPr lang="en-US" dirty="0" err="1" smtClean="0">
+                <a:latin typeface="Courier New" pitchFamily="49" charset="0"/>
+                <a:cs typeface="Courier New" pitchFamily="49" charset="0"/>
+              </a:rPr>
+              <a:t>FileProcessor</a:t>
+            </a:r>
+            <a:r>
+              <a:rPr lang="en-US" dirty="0" smtClean="0">
+                <a:latin typeface="Courier New" pitchFamily="49" charset="0"/>
+                <a:cs typeface="Courier New" pitchFamily="49" charset="0"/>
+              </a:rPr>
+              <a:t>:</a:t>
             </a:r>
           </a:p>
           <a:p>
@@ -4471,8 +4694,32 @@
               <a:buNone/>
             </a:pPr>
             <a:r>
-              <a:rPr lang="en-US" sz="2400" i="1" dirty="0" smtClean="0"/>
-              <a:t>Why we use it</a:t>
+              <a:rPr lang="en-US" dirty="0" smtClean="0">
+                <a:latin typeface="Courier New" pitchFamily="49" charset="0"/>
+                <a:cs typeface="Courier New" pitchFamily="49" charset="0"/>
+              </a:rPr>
+              <a:t>	</a:t>
+            </a:r>
+            <a:r>
+              <a:rPr lang="en-US" dirty="0" smtClean="0">
+                <a:latin typeface="Courier New" pitchFamily="49" charset="0"/>
+                <a:cs typeface="Courier New" pitchFamily="49" charset="0"/>
+              </a:rPr>
+              <a:t>	def init(self, </a:t>
+            </a:r>
+            <a:r>
+              <a:rPr lang="en-US" dirty="0" err="1" smtClean="0">
+                <a:latin typeface="Courier New" pitchFamily="49" charset="0"/>
+                <a:cs typeface="Courier New" pitchFamily="49" charset="0"/>
+              </a:rPr>
+              <a:t>filesList</a:t>
+            </a:r>
+            <a:r>
+              <a:rPr lang="en-US" dirty="0" smtClean="0">
+                <a:latin typeface="Courier New" pitchFamily="49" charset="0"/>
+                <a:cs typeface="Courier New" pitchFamily="49" charset="0"/>
+              </a:rPr>
+              <a:t>):</a:t>
             </a:r>
           </a:p>
           <a:p>
@@ -4480,66 +4727,185 @@
               <a:buNone/>
             </a:pPr>
             <a:r>
-              <a:rPr lang="en-US" sz="2400" i="1" dirty="0" smtClean="0"/>
-              <a:t>Examples</a:t>
-            </a:r>
+              <a:rPr lang="en-US" dirty="0" smtClean="0">
+                <a:latin typeface="Courier New" pitchFamily="49" charset="0"/>
+                <a:cs typeface="Courier New" pitchFamily="49" charset="0"/>
+              </a:rPr>
+              <a:t>	</a:t>
+            </a:r>
+            <a:r>
+              <a:rPr lang="en-US" dirty="0" smtClean="0">
+                <a:latin typeface="Courier New" pitchFamily="49" charset="0"/>
+                <a:cs typeface="Courier New" pitchFamily="49" charset="0"/>
+              </a:rPr>
+              <a:t>		</a:t>
+            </a:r>
+            <a:r>
+              <a:rPr lang="en-US" dirty="0" err="1" smtClean="0">
+                <a:latin typeface="Courier New" pitchFamily="49" charset="0"/>
+                <a:cs typeface="Courier New" pitchFamily="49" charset="0"/>
+              </a:rPr>
+              <a:t>self.filesList</a:t>
+            </a:r>
+            <a:r>
+              <a:rPr lang="en-US" dirty="0" smtClean="0">
+                <a:latin typeface="Courier New" pitchFamily="49" charset="0"/>
+                <a:cs typeface="Courier New" pitchFamily="49" charset="0"/>
+              </a:rPr>
+              <a:t> = </a:t>
+            </a:r>
+            <a:r>
+              <a:rPr lang="en-US" dirty="0" err="1" smtClean="0">
+                <a:latin typeface="Courier New" pitchFamily="49" charset="0"/>
+                <a:cs typeface="Courier New" pitchFamily="49" charset="0"/>
+              </a:rPr>
+              <a:t>filesList</a:t>
+            </a:r>
+            <a:endParaRPr lang="en-US" dirty="0" smtClean="0">
+              <a:latin typeface="Courier New" pitchFamily="49" charset="0"/>
+              <a:cs typeface="Courier New" pitchFamily="49" charset="0"/>
+            </a:endParaRPr>
           </a:p>
           <a:p>
             <a:pPr>
               <a:buNone/>
             </a:pPr>
-            <a:endParaRPr lang="en-US" sz="2400" i="1" dirty="0" smtClean="0"/>
+            <a:r>
+              <a:rPr lang="en-US" dirty="0" smtClean="0">
+                <a:latin typeface="Courier New" pitchFamily="49" charset="0"/>
+                <a:cs typeface="Courier New" pitchFamily="49" charset="0"/>
+              </a:rPr>
+              <a:t>	</a:t>
+            </a:r>
+            <a:r>
+              <a:rPr lang="en-US" dirty="0" smtClean="0">
+                <a:latin typeface="Courier New" pitchFamily="49" charset="0"/>
+                <a:cs typeface="Courier New" pitchFamily="49" charset="0"/>
+              </a:rPr>
+              <a:t>		#Fill in the following</a:t>
+            </a:r>
           </a:p>
           <a:p>
             <a:pPr>
               <a:buNone/>
             </a:pPr>
-            <a:endParaRPr lang="en-US" sz="2400" i="1" dirty="0" smtClean="0"/>
+            <a:r>
+              <a:rPr lang="en-US" dirty="0" smtClean="0">
+                <a:latin typeface="Courier New" pitchFamily="49" charset="0"/>
+                <a:cs typeface="Courier New" pitchFamily="49" charset="0"/>
+              </a:rPr>
+              <a:t>	</a:t>
+            </a:r>
+            <a:r>
+              <a:rPr lang="en-US" dirty="0" smtClean="0">
+                <a:latin typeface="Courier New" pitchFamily="49" charset="0"/>
+                <a:cs typeface="Courier New" pitchFamily="49" charset="0"/>
+              </a:rPr>
+              <a:t>		</a:t>
+            </a:r>
+            <a:r>
+              <a:rPr lang="en-US" dirty="0" err="1" smtClean="0">
+                <a:latin typeface="Courier New" pitchFamily="49" charset="0"/>
+                <a:cs typeface="Courier New" pitchFamily="49" charset="0"/>
+              </a:rPr>
+              <a:t>self.processedData</a:t>
+            </a:r>
+            <a:r>
+              <a:rPr lang="en-US" dirty="0" smtClean="0">
+                <a:latin typeface="Courier New" pitchFamily="49" charset="0"/>
+                <a:cs typeface="Courier New" pitchFamily="49" charset="0"/>
+              </a:rPr>
+              <a:t> = [{}]</a:t>
+            </a:r>
           </a:p>
           <a:p>
             <a:pPr>
               <a:buNone/>
             </a:pPr>
-            <a:endParaRPr lang="en-US" sz="2400" i="1" dirty="0" smtClean="0"/>
+            <a:r>
+              <a:rPr lang="en-US" dirty="0" smtClean="0">
+                <a:latin typeface="Courier New" pitchFamily="49" charset="0"/>
+                <a:cs typeface="Courier New" pitchFamily="49" charset="0"/>
+              </a:rPr>
+              <a:t>	</a:t>
+            </a:r>
+            <a:r>
+              <a:rPr lang="en-US" dirty="0" smtClean="0">
+                <a:latin typeface="Courier New" pitchFamily="49" charset="0"/>
+                <a:cs typeface="Courier New" pitchFamily="49" charset="0"/>
+              </a:rPr>
+              <a:t>		</a:t>
+            </a:r>
+            <a:r>
+              <a:rPr lang="en-US" dirty="0" err="1" smtClean="0">
+                <a:latin typeface="Courier New" pitchFamily="49" charset="0"/>
+                <a:cs typeface="Courier New" pitchFamily="49" charset="0"/>
+              </a:rPr>
+              <a:t>self.displayData</a:t>
+            </a:r>
+            <a:r>
+              <a:rPr lang="en-US" dirty="0" smtClean="0">
+                <a:latin typeface="Courier New" pitchFamily="49" charset="0"/>
+                <a:cs typeface="Courier New" pitchFamily="49" charset="0"/>
+              </a:rPr>
+              <a:t> = []</a:t>
+            </a:r>
           </a:p>
           <a:p>
             <a:pPr>
               <a:buNone/>
             </a:pPr>
-            <a:endParaRPr lang="en-US" sz="2400" i="1" dirty="0" smtClean="0"/>
+            <a:r>
+              <a:rPr lang="en-US" dirty="0" smtClean="0">
+                <a:latin typeface="Courier New" pitchFamily="49" charset="0"/>
+                <a:cs typeface="Courier New" pitchFamily="49" charset="0"/>
+              </a:rPr>
+              <a:t>	</a:t>
+            </a:r>
+            <a:r>
+              <a:rPr lang="en-US" dirty="0" smtClean="0">
+                <a:latin typeface="Courier New" pitchFamily="49" charset="0"/>
+                <a:cs typeface="Courier New" pitchFamily="49" charset="0"/>
+              </a:rPr>
+              <a:t>		</a:t>
+            </a:r>
+            <a:r>
+              <a:rPr lang="en-US" dirty="0" err="1" smtClean="0">
+                <a:latin typeface="Courier New" pitchFamily="49" charset="0"/>
+                <a:cs typeface="Courier New" pitchFamily="49" charset="0"/>
+              </a:rPr>
+              <a:t>self.tableData</a:t>
+            </a:r>
+            <a:r>
+              <a:rPr lang="en-US" dirty="0" smtClean="0">
+                <a:latin typeface="Courier New" pitchFamily="49" charset="0"/>
+                <a:cs typeface="Courier New" pitchFamily="49" charset="0"/>
+              </a:rPr>
+              <a:t> = []</a:t>
+            </a:r>
           </a:p>
           <a:p>
             <a:pPr>
               <a:buNone/>
             </a:pPr>
-            <a:endParaRPr lang="en-US" sz="2000" dirty="0" smtClean="0"/>
-          </a:p>
-          <a:p>
-            <a:pPr>
-              <a:buNone/>
-            </a:pPr>
-            <a:endParaRPr lang="en-US" sz="2400" dirty="0" smtClean="0"/>
-          </a:p>
-          <a:p>
-            <a:pPr>
-              <a:buNone/>
-            </a:pPr>
-            <a:endParaRPr lang="en-US" sz="2400" i="1" dirty="0" smtClean="0"/>
-          </a:p>
-          <a:p>
-            <a:pPr>
-              <a:buNone/>
-            </a:pPr>
-            <a:endParaRPr lang="en-US" sz="2400" i="1" dirty="0" smtClean="0"/>
-          </a:p>
-          <a:p>
-            <a:pPr>
-              <a:buNone/>
-            </a:pPr>
-            <a:endParaRPr lang="en-US" sz="2400" i="1" dirty="0" smtClean="0"/>
-          </a:p>
-          <a:p>
-            <a:endParaRPr lang="en-US" sz="2400" dirty="0"/>
+            <a:r>
+              <a:rPr lang="en-US" dirty="0" smtClean="0">
+                <a:latin typeface="Courier New" pitchFamily="49" charset="0"/>
+                <a:cs typeface="Courier New" pitchFamily="49" charset="0"/>
+              </a:rPr>
+              <a:t>	</a:t>
+            </a:r>
+            <a:r>
+              <a:rPr lang="en-US" dirty="0" smtClean="0">
+                <a:latin typeface="Courier New" pitchFamily="49" charset="0"/>
+                <a:cs typeface="Courier New" pitchFamily="49" charset="0"/>
+              </a:rPr>
+              <a:t>		 </a:t>
+            </a:r>
+            <a:endParaRPr lang="en-US" dirty="0">
+              <a:latin typeface="Courier New" pitchFamily="49" charset="0"/>
+              <a:cs typeface="Courier New" pitchFamily="49" charset="0"/>
+            </a:endParaRPr>
           </a:p>
         </p:txBody>
       </p:sp>
@@ -4592,7 +4958,7 @@
           <a:p>
             <a:r>
               <a:rPr lang="en-US" dirty="0" smtClean="0"/>
-              <a:t>Software Design</a:t>
+              <a:t>API</a:t>
             </a:r>
             <a:endParaRPr lang="en-US" dirty="0"/>
           </a:p>
@@ -4610,34 +4976,63 @@
         </p:nvSpPr>
         <p:spPr/>
         <p:txBody>
-          <a:bodyPr/>
+          <a:bodyPr>
+            <a:normAutofit lnSpcReduction="10000"/>
+          </a:bodyPr>
           <a:lstStyle/>
           <a:p>
             <a:r>
               <a:rPr lang="en-US" dirty="0" smtClean="0"/>
-              <a:t>How to make it modular?</a:t>
-            </a:r>
+              <a:t>Have access to 4 plot windows</a:t>
+            </a:r>
+          </a:p>
+          <a:p>
+            <a:endParaRPr lang="en-US" dirty="0" smtClean="0"/>
           </a:p>
           <a:p>
             <a:r>
               <a:rPr lang="en-US" dirty="0" smtClean="0"/>
-              <a:t>Modules for each device</a:t>
-            </a:r>
+              <a:t>Uses </a:t>
+            </a:r>
+            <a:r>
+              <a:rPr lang="en-US" dirty="0" err="1" smtClean="0"/>
+              <a:t>PyQwt</a:t>
+            </a:r>
+            <a:r>
+              <a:rPr lang="en-US" dirty="0" smtClean="0"/>
+              <a:t> plotting library</a:t>
+            </a:r>
+          </a:p>
+          <a:p>
+            <a:pPr lvl="1"/>
+            <a:r>
+              <a:rPr lang="en-US" dirty="0" smtClean="0"/>
+              <a:t>Easy to modify</a:t>
+            </a:r>
+          </a:p>
+          <a:p>
+            <a:pPr lvl="1"/>
             <a:endParaRPr lang="en-US" dirty="0" smtClean="0"/>
           </a:p>
           <a:p>
             <a:r>
               <a:rPr lang="en-US" dirty="0" smtClean="0"/>
-              <a:t>-documentation</a:t>
-            </a:r>
-            <a:r>
-              <a:rPr lang="en-US" dirty="0"/>
-              <a:t> </a:t>
-            </a:r>
+              <a:t>View is based off of the tree list</a:t>
+            </a:r>
+          </a:p>
+          <a:p>
+            <a:endParaRPr lang="en-US" dirty="0" smtClean="0"/>
+          </a:p>
+          <a:p>
             <a:r>
               <a:rPr lang="en-US" dirty="0" smtClean="0"/>
-              <a:t>so everything is standardized</a:t>
-            </a:r>
+              <a:t>D</a:t>
+            </a:r>
+            <a:r>
+              <a:rPr lang="en-US" dirty="0" smtClean="0"/>
+              <a:t>ocumentation and sample code</a:t>
+            </a:r>
+            <a:endParaRPr lang="en-US" dirty="0"/>
           </a:p>
         </p:txBody>
       </p:sp>
@@ -4709,7 +5104,7 @@
         <p:spPr/>
         <p:txBody>
           <a:bodyPr>
-            <a:normAutofit fontScale="92500" lnSpcReduction="10000"/>
+            <a:normAutofit fontScale="77500" lnSpcReduction="20000"/>
           </a:bodyPr>
           <a:lstStyle/>
           <a:p>
@@ -4717,21 +5112,34 @@
               <a:buNone/>
             </a:pPr>
             <a:r>
+              <a:rPr lang="en-US" sz="2400" b="1" dirty="0" smtClean="0"/>
+              <a:t>Software has to be robust </a:t>
+            </a:r>
+            <a:r>
+              <a:rPr lang="en-US" sz="2400" b="1" dirty="0" smtClean="0"/>
+              <a:t>from</a:t>
+            </a:r>
+            <a:r>
               <a:rPr lang="en-US" sz="2400" dirty="0" smtClean="0"/>
-              <a:t>Software has to be robust from people:</a:t>
-            </a:r>
-          </a:p>
-          <a:p>
+              <a:t>:</a:t>
+            </a:r>
             <a:endParaRPr lang="en-US" sz="2400" dirty="0" smtClean="0"/>
           </a:p>
           <a:p>
+            <a:endParaRPr lang="en-US" sz="2400" dirty="0" smtClean="0"/>
+          </a:p>
+          <a:p>
             <a:r>
               <a:rPr lang="en-US" sz="2400" dirty="0" smtClean="0"/>
-              <a:t>who are </a:t>
+              <a:t>People </a:t>
             </a:r>
             <a:r>
               <a:rPr lang="en-US" sz="2400" dirty="0" smtClean="0"/>
-              <a:t>not familiar with the program</a:t>
+              <a:t>who </a:t>
+            </a:r>
+            <a:r>
+              <a:rPr lang="en-US" sz="2400" dirty="0" smtClean="0"/>
+              <a:t>are not familiar with the program</a:t>
             </a:r>
           </a:p>
           <a:p>
@@ -4740,7 +5148,11 @@
           <a:p>
             <a:r>
               <a:rPr lang="en-US" sz="2400" dirty="0" smtClean="0"/>
-              <a:t>who wants to hack the program</a:t>
+              <a:t>People who </a:t>
+            </a:r>
+            <a:r>
+              <a:rPr lang="en-US" sz="2400" dirty="0" smtClean="0"/>
+              <a:t>wants to hack the program</a:t>
             </a:r>
           </a:p>
           <a:p>
@@ -4749,7 +5161,24 @@
           <a:p>
             <a:r>
               <a:rPr lang="en-US" sz="2400" dirty="0" smtClean="0"/>
-              <a:t>who might try to break the program on purpose</a:t>
+              <a:t>People who </a:t>
+            </a:r>
+            <a:r>
+              <a:rPr lang="en-US" sz="2400" dirty="0" smtClean="0"/>
+              <a:t>might try to break the program on </a:t>
+            </a:r>
+            <a:r>
+              <a:rPr lang="en-US" sz="2400" dirty="0" smtClean="0"/>
+              <a:t>purpose</a:t>
+            </a:r>
+          </a:p>
+          <a:p>
+            <a:pPr>
+              <a:buNone/>
+            </a:pPr>
+            <a:r>
+              <a:rPr lang="en-US" sz="2400" dirty="0" smtClean="0"/>
+              <a:t> </a:t>
             </a:r>
           </a:p>
           <a:p>
@@ -4760,41 +5189,61 @@
               <a:buNone/>
             </a:pPr>
             <a:r>
+              <a:rPr lang="en-US" sz="2400" b="1" dirty="0" smtClean="0"/>
+              <a:t>How</a:t>
+            </a:r>
+            <a:r>
+              <a:rPr lang="en-US" sz="2400" b="1" dirty="0" smtClean="0"/>
+              <a:t>?</a:t>
+            </a:r>
+          </a:p>
+          <a:p>
+            <a:pPr>
+              <a:buNone/>
+            </a:pPr>
+            <a:endParaRPr lang="en-US" sz="2400" dirty="0" smtClean="0"/>
+          </a:p>
+          <a:p>
+            <a:pPr marL="457200" indent="-457200"/>
+            <a:r>
               <a:rPr lang="en-US" sz="2400" dirty="0" smtClean="0"/>
-              <a:t>How?</a:t>
-            </a:r>
+              <a:t>Checking method</a:t>
+            </a:r>
+          </a:p>
+          <a:p>
+            <a:pPr marL="457200" indent="-457200"/>
+            <a:r>
+              <a:rPr lang="en-US" sz="2400" dirty="0" smtClean="0"/>
+              <a:t>Documentation (user manual, developer manual</a:t>
+            </a:r>
+            <a:r>
+              <a:rPr lang="en-US" sz="2400" dirty="0" smtClean="0"/>
+              <a:t>)</a:t>
+            </a:r>
+          </a:p>
+          <a:p>
+            <a:pPr marL="457200" indent="-457200"/>
+            <a:r>
+              <a:rPr lang="en-US" sz="2400" dirty="0" smtClean="0"/>
+              <a:t>Hide implementation details (such as GPIB</a:t>
+            </a:r>
+            <a:r>
+              <a:rPr lang="en-US" sz="2400" dirty="0" smtClean="0"/>
+              <a:t>)</a:t>
+            </a:r>
+          </a:p>
+          <a:p>
+            <a:pPr marL="457200" indent="-457200"/>
+            <a:r>
+              <a:rPr lang="en-US" sz="2400" dirty="0" smtClean="0"/>
+              <a:t>Sanitizing inputs</a:t>
+            </a:r>
+            <a:endParaRPr lang="en-US" sz="2400" dirty="0" smtClean="0"/>
           </a:p>
           <a:p>
             <a:pPr marL="457200" indent="-457200">
               <a:buAutoNum type="arabicPeriod"/>
             </a:pPr>
-            <a:r>
-              <a:rPr lang="en-US" sz="2400" dirty="0" smtClean="0"/>
-              <a:t>Checking method</a:t>
-            </a:r>
-          </a:p>
-          <a:p>
-            <a:pPr marL="457200" indent="-457200">
-              <a:buAutoNum type="arabicPeriod"/>
-            </a:pPr>
-            <a:r>
-              <a:rPr lang="en-US" sz="2400" dirty="0" smtClean="0"/>
-              <a:t>Documentation (user manual, </a:t>
-            </a:r>
-            <a:r>
-              <a:rPr lang="en-US" sz="2400" smtClean="0"/>
-              <a:t>developer manual)</a:t>
-            </a:r>
-            <a:endParaRPr lang="en-US" sz="2400" dirty="0" smtClean="0"/>
-          </a:p>
-          <a:p>
-            <a:pPr marL="457200" indent="-457200">
-              <a:buAutoNum type="arabicPeriod"/>
-            </a:pPr>
-            <a:r>
-              <a:rPr lang="en-US" sz="2400" dirty="0" smtClean="0"/>
-              <a:t>Expectation for dummy users</a:t>
-            </a:r>
             <a:endParaRPr lang="en-US" sz="2400" dirty="0" smtClean="0"/>
           </a:p>
         </p:txBody>
@@ -4804,6 +5253,13 @@
   <p:clrMapOvr>
     <a:masterClrMapping/>
   </p:clrMapOvr>
+  <p:timing>
+    <p:tnLst>
+      <p:par>
+        <p:cTn id="1" dur="indefinite" restart="never" nodeType="tmRoot"/>
+      </p:par>
+    </p:tnLst>
+  </p:timing>
 </p:sld>
 </file>
 
@@ -4841,7 +5297,7 @@
           <a:p>
             <a:r>
               <a:rPr lang="en-US" dirty="0" smtClean="0"/>
-              <a:t>Testing</a:t>
+              <a:t>Assumptions</a:t>
             </a:r>
             <a:endParaRPr lang="en-US" dirty="0"/>
           </a:p>
@@ -4859,55 +5315,43 @@
         </p:nvSpPr>
         <p:spPr/>
         <p:txBody>
-          <a:bodyPr>
-            <a:normAutofit/>
-          </a:bodyPr>
-          <a:lstStyle/>
-          <a:p>
-            <a:r>
-              <a:rPr lang="en-US" sz="2400" dirty="0" smtClean="0"/>
-              <a:t>Trial period for candidates to use it for two weeks</a:t>
-            </a:r>
-          </a:p>
-          <a:p>
-            <a:pPr marL="457200" indent="-457200">
+          <a:bodyPr/>
+          <a:lstStyle/>
+          <a:p>
+            <a:r>
+              <a:rPr lang="en-US" dirty="0" smtClean="0"/>
+              <a:t>User sets up physical GPIB devices</a:t>
+            </a:r>
+          </a:p>
+          <a:p>
+            <a:r>
+              <a:rPr lang="en-US" dirty="0" smtClean="0"/>
+              <a:t>Will not be used for publication quality plots</a:t>
+            </a:r>
+          </a:p>
+          <a:p>
+            <a:r>
+              <a:rPr lang="en-US" dirty="0" smtClean="0"/>
+              <a:t>User will process FPGA data (in python)</a:t>
+            </a:r>
+          </a:p>
+          <a:p>
+            <a:r>
+              <a:rPr lang="en-US" dirty="0" smtClean="0"/>
+              <a:t>Access to FGPA output files</a:t>
+            </a:r>
+          </a:p>
+          <a:p>
+            <a:endParaRPr lang="en-US" dirty="0" smtClean="0"/>
+          </a:p>
+          <a:p>
+            <a:pPr>
               <a:buNone/>
             </a:pPr>
-            <a:r>
-              <a:rPr lang="en-US" sz="2400" dirty="0" smtClean="0"/>
-              <a:t>	- 	user manual (after GUI is complete)</a:t>
-            </a:r>
-          </a:p>
-          <a:p>
-            <a:pPr marL="457200" indent="-457200">
-              <a:buNone/>
-            </a:pPr>
-            <a:r>
-              <a:rPr lang="en-US" sz="2400" dirty="0" smtClean="0"/>
-              <a:t>	- 	developers manual (ongoing)</a:t>
-            </a:r>
-          </a:p>
-          <a:p>
-            <a:pPr>
-              <a:buNone/>
-            </a:pPr>
-            <a:endParaRPr lang="en-US" sz="2400" dirty="0" smtClean="0"/>
-          </a:p>
-          <a:p>
-            <a:r>
-              <a:rPr lang="en-US" sz="2400" dirty="0" smtClean="0"/>
-              <a:t>Receive feedback from candidates</a:t>
-            </a:r>
-          </a:p>
-          <a:p>
-            <a:endParaRPr lang="en-US" sz="2400" dirty="0" smtClean="0"/>
-          </a:p>
-          <a:p>
-            <a:r>
-              <a:rPr lang="en-US" sz="2400" dirty="0" smtClean="0"/>
-              <a:t>Use feedback for improvising the program in the future</a:t>
-            </a:r>
-            <a:endParaRPr lang="en-US" sz="2400" dirty="0"/>
+            <a:endParaRPr lang="en-US" dirty="0" smtClean="0"/>
+          </a:p>
+          <a:p>
+            <a:endParaRPr lang="en-US" dirty="0" smtClean="0"/>
           </a:p>
         </p:txBody>
       </p:sp>
@@ -4916,6 +5360,259 @@
   <p:clrMapOvr>
     <a:masterClrMapping/>
   </p:clrMapOvr>
+  <p:timing>
+    <p:tnLst>
+      <p:par>
+        <p:cTn id="1" dur="indefinite" restart="never" nodeType="tmRoot"/>
+      </p:par>
+    </p:tnLst>
+  </p:timing>
+</p:sld>
+</file>
+
+<file path=ppt/slides/slide19.xml><?xml version="1.0" encoding="utf-8"?>
+<p:sld xmlns:a="http://schemas.openxmlformats.org/drawingml/2006/main" xmlns:r="http://schemas.openxmlformats.org/officeDocument/2006/relationships" xmlns:p="http://schemas.openxmlformats.org/presentationml/2006/main">
+  <p:cSld>
+    <p:spTree>
+      <p:nvGrpSpPr>
+        <p:cNvPr id="1" name=""/>
+        <p:cNvGrpSpPr/>
+        <p:nvPr/>
+      </p:nvGrpSpPr>
+      <p:grpSpPr>
+        <a:xfrm>
+          <a:off x="0" y="0"/>
+          <a:ext cx="0" cy="0"/>
+          <a:chOff x="0" y="0"/>
+          <a:chExt cx="0" cy="0"/>
+        </a:xfrm>
+      </p:grpSpPr>
+      <p:sp>
+        <p:nvSpPr>
+          <p:cNvPr id="2" name="Title 1"/>
+          <p:cNvSpPr>
+            <a:spLocks noGrp="1"/>
+          </p:cNvSpPr>
+          <p:nvPr>
+            <p:ph type="title"/>
+          </p:nvPr>
+        </p:nvSpPr>
+        <p:spPr/>
+        <p:txBody>
+          <a:bodyPr/>
+          <a:lstStyle/>
+          <a:p>
+            <a:r>
+              <a:rPr lang="en-US" dirty="0" smtClean="0"/>
+              <a:t>Challenges</a:t>
+            </a:r>
+            <a:endParaRPr lang="en-US" dirty="0"/>
+          </a:p>
+        </p:txBody>
+      </p:sp>
+      <p:sp>
+        <p:nvSpPr>
+          <p:cNvPr id="3" name="Content Placeholder 2"/>
+          <p:cNvSpPr>
+            <a:spLocks noGrp="1"/>
+          </p:cNvSpPr>
+          <p:nvPr>
+            <p:ph idx="1"/>
+          </p:nvPr>
+        </p:nvSpPr>
+        <p:spPr>
+          <a:xfrm>
+            <a:off x="457200" y="1447800"/>
+            <a:ext cx="8229600" cy="5181600"/>
+          </a:xfrm>
+        </p:spPr>
+        <p:txBody>
+          <a:bodyPr>
+            <a:noAutofit/>
+          </a:bodyPr>
+          <a:lstStyle/>
+          <a:p>
+            <a:pPr marL="514350" indent="-514350">
+              <a:buAutoNum type="arabicPeriod"/>
+            </a:pPr>
+            <a:r>
+              <a:rPr lang="en-US" sz="1800" dirty="0" smtClean="0"/>
+              <a:t>Device SCPI (</a:t>
+            </a:r>
+            <a:r>
+              <a:rPr lang="en-US" sz="1800" dirty="0" err="1" smtClean="0"/>
+              <a:t>data_acquisition</a:t>
+            </a:r>
+            <a:r>
+              <a:rPr lang="en-US" sz="1800" dirty="0" smtClean="0"/>
+              <a:t>)</a:t>
+            </a:r>
+          </a:p>
+          <a:p>
+            <a:pPr marL="514350" indent="-514350">
+              <a:buNone/>
+            </a:pPr>
+            <a:r>
+              <a:rPr lang="en-US" sz="1800" dirty="0" smtClean="0"/>
+              <a:t>	</a:t>
+            </a:r>
+            <a:r>
+              <a:rPr lang="en-US" sz="1800" dirty="0" smtClean="0"/>
+              <a:t>	- Return ‘15’ error: does not help us detect if ‘junk’ was written</a:t>
+            </a:r>
+          </a:p>
+          <a:p>
+            <a:pPr marL="514350" indent="-514350">
+              <a:buNone/>
+            </a:pPr>
+            <a:endParaRPr lang="en-US" sz="1800" dirty="0" smtClean="0"/>
+          </a:p>
+          <a:p>
+            <a:pPr marL="514350" indent="-514350">
+              <a:buAutoNum type="arabicPeriod" startAt="2"/>
+            </a:pPr>
+            <a:r>
+              <a:rPr lang="en-US" sz="1800" dirty="0" smtClean="0"/>
+              <a:t>Inconsistency in the user manual</a:t>
+            </a:r>
+          </a:p>
+          <a:p>
+            <a:pPr marL="914400" lvl="1" indent="-514350">
+              <a:buNone/>
+            </a:pPr>
+            <a:r>
+              <a:rPr lang="en-US" sz="1800" dirty="0" smtClean="0"/>
+              <a:t>	-</a:t>
+            </a:r>
+            <a:r>
+              <a:rPr lang="en-US" sz="1800" dirty="0" smtClean="0"/>
+              <a:t>Time Scale </a:t>
+            </a:r>
+            <a:r>
+              <a:rPr lang="en-US" sz="1800" dirty="0" smtClean="0"/>
+              <a:t>issue for oscilloscope: </a:t>
+            </a:r>
+            <a:r>
+              <a:rPr lang="en-US" sz="1800" dirty="0" smtClean="0"/>
+              <a:t>only goes from 2ns to 50s instead </a:t>
+            </a:r>
+            <a:r>
+              <a:rPr lang="en-US" sz="1800" dirty="0" smtClean="0"/>
+              <a:t>of 500ps </a:t>
+            </a:r>
+            <a:r>
+              <a:rPr lang="en-US" sz="1800" dirty="0" smtClean="0"/>
+              <a:t>to 50s</a:t>
+            </a:r>
+          </a:p>
+          <a:p>
+            <a:pPr marL="914400" lvl="1" indent="-514350">
+              <a:buAutoNum type="arabicPeriod" startAt="2"/>
+            </a:pPr>
+            <a:endParaRPr lang="en-US" sz="1800" dirty="0" smtClean="0"/>
+          </a:p>
+          <a:p>
+            <a:pPr marL="514350" indent="-514350">
+              <a:buAutoNum type="arabicPeriod" startAt="2"/>
+            </a:pPr>
+            <a:r>
+              <a:rPr lang="en-US" sz="1800" dirty="0" smtClean="0"/>
+              <a:t>Testing	</a:t>
+            </a:r>
+          </a:p>
+          <a:p>
+            <a:pPr marL="514350" indent="-514350">
+              <a:buNone/>
+            </a:pPr>
+            <a:r>
+              <a:rPr lang="en-US" sz="1800" dirty="0" smtClean="0"/>
+              <a:t>	</a:t>
+            </a:r>
+            <a:r>
+              <a:rPr lang="en-US" sz="1800" dirty="0" smtClean="0"/>
+              <a:t>-unit testing</a:t>
+            </a:r>
+          </a:p>
+          <a:p>
+            <a:pPr marL="514350" indent="-514350">
+              <a:buNone/>
+            </a:pPr>
+            <a:r>
+              <a:rPr lang="en-US" sz="1800" dirty="0" smtClean="0"/>
+              <a:t>	</a:t>
+            </a:r>
+            <a:r>
+              <a:rPr lang="en-US" sz="1800" dirty="0" smtClean="0"/>
+              <a:t>-user testing	</a:t>
+            </a:r>
+          </a:p>
+          <a:p>
+            <a:pPr marL="514350" indent="-514350">
+              <a:buNone/>
+            </a:pPr>
+            <a:endParaRPr lang="en-US" sz="1800" dirty="0" smtClean="0"/>
+          </a:p>
+          <a:p>
+            <a:pPr marL="514350" indent="-514350">
+              <a:buAutoNum type="arabicPeriod" startAt="4"/>
+            </a:pPr>
+            <a:r>
+              <a:rPr lang="en-US" sz="1800" dirty="0" smtClean="0"/>
+              <a:t>Building software with dumb user expectation</a:t>
+            </a:r>
+          </a:p>
+          <a:p>
+            <a:pPr marL="514350" indent="-514350">
+              <a:buNone/>
+            </a:pPr>
+            <a:endParaRPr lang="en-US" sz="1800" dirty="0" smtClean="0"/>
+          </a:p>
+          <a:p>
+            <a:pPr marL="514350" indent="-514350">
+              <a:buAutoNum type="arabicPeriod" startAt="5"/>
+            </a:pPr>
+            <a:r>
+              <a:rPr lang="en-US" sz="1800" dirty="0" smtClean="0"/>
+              <a:t>Security</a:t>
+            </a:r>
+          </a:p>
+          <a:p>
+            <a:pPr marL="514350" indent="-514350">
+              <a:buAutoNum type="arabicPeriod" startAt="5"/>
+            </a:pPr>
+            <a:endParaRPr lang="en-US" sz="1800" dirty="0" smtClean="0"/>
+          </a:p>
+          <a:p>
+            <a:pPr marL="514350" indent="-514350">
+              <a:buAutoNum type="arabicPeriod" startAt="5"/>
+            </a:pPr>
+            <a:r>
+              <a:rPr lang="en-US" sz="1800" dirty="0" smtClean="0"/>
+              <a:t>Dealing with failing hardware</a:t>
+            </a:r>
+            <a:endParaRPr lang="en-US" sz="1800" dirty="0" smtClean="0"/>
+          </a:p>
+          <a:p>
+            <a:pPr marL="514350" indent="-514350">
+              <a:buFont typeface="+mj-lt"/>
+              <a:buAutoNum type="arabicPeriod"/>
+            </a:pPr>
+            <a:endParaRPr lang="en-US" sz="1800" dirty="0"/>
+          </a:p>
+        </p:txBody>
+      </p:sp>
+    </p:spTree>
+  </p:cSld>
+  <p:clrMapOvr>
+    <a:masterClrMapping/>
+  </p:clrMapOvr>
+  <p:timing>
+    <p:tnLst>
+      <p:par>
+        <p:cTn id="1" dur="indefinite" restart="never" nodeType="tmRoot"/>
+      </p:par>
+    </p:tnLst>
+  </p:timing>
 </p:sld>
 </file>
 
@@ -4998,10 +5695,6 @@
               <a:rPr lang="en-US" sz="2800" dirty="0" smtClean="0"/>
               <a:t>Customer/Sponsor: </a:t>
             </a:r>
-            <a:r>
-              <a:rPr lang="en-US" sz="2800" dirty="0" smtClean="0"/>
-              <a:t/>
-            </a:r>
             <a:br>
               <a:rPr lang="en-US" sz="2800" dirty="0" smtClean="0"/>
             </a:br>
@@ -5031,6 +5724,222 @@
               <a:t>Prof. Daniel Loveless, Research/Develop Engineer</a:t>
             </a:r>
             <a:endParaRPr lang="en-US" sz="2800" dirty="0"/>
+          </a:p>
+        </p:txBody>
+      </p:sp>
+    </p:spTree>
+  </p:cSld>
+  <p:clrMapOvr>
+    <a:masterClrMapping/>
+  </p:clrMapOvr>
+  <p:timing>
+    <p:tnLst>
+      <p:par>
+        <p:cTn id="1" dur="indefinite" restart="never" nodeType="tmRoot"/>
+      </p:par>
+    </p:tnLst>
+  </p:timing>
+</p:sld>
+</file>
+
+<file path=ppt/slides/slide20.xml><?xml version="1.0" encoding="utf-8"?>
+<p:sld xmlns:a="http://schemas.openxmlformats.org/drawingml/2006/main" xmlns:r="http://schemas.openxmlformats.org/officeDocument/2006/relationships" xmlns:p="http://schemas.openxmlformats.org/presentationml/2006/main">
+  <p:cSld>
+    <p:spTree>
+      <p:nvGrpSpPr>
+        <p:cNvPr id="1" name=""/>
+        <p:cNvGrpSpPr/>
+        <p:nvPr/>
+      </p:nvGrpSpPr>
+      <p:grpSpPr>
+        <a:xfrm>
+          <a:off x="0" y="0"/>
+          <a:ext cx="0" cy="0"/>
+          <a:chOff x="0" y="0"/>
+          <a:chExt cx="0" cy="0"/>
+        </a:xfrm>
+      </p:grpSpPr>
+      <p:sp>
+        <p:nvSpPr>
+          <p:cNvPr id="2" name="Title 1"/>
+          <p:cNvSpPr>
+            <a:spLocks noGrp="1"/>
+          </p:cNvSpPr>
+          <p:nvPr>
+            <p:ph type="title"/>
+          </p:nvPr>
+        </p:nvSpPr>
+        <p:spPr/>
+        <p:txBody>
+          <a:bodyPr/>
+          <a:lstStyle/>
+          <a:p>
+            <a:r>
+              <a:rPr lang="en-US" dirty="0" smtClean="0"/>
+              <a:t>Testing</a:t>
+            </a:r>
+            <a:endParaRPr lang="en-US" dirty="0"/>
+          </a:p>
+        </p:txBody>
+      </p:sp>
+      <p:sp>
+        <p:nvSpPr>
+          <p:cNvPr id="3" name="Content Placeholder 2"/>
+          <p:cNvSpPr>
+            <a:spLocks noGrp="1"/>
+          </p:cNvSpPr>
+          <p:nvPr>
+            <p:ph idx="1"/>
+          </p:nvPr>
+        </p:nvSpPr>
+        <p:spPr/>
+        <p:txBody>
+          <a:bodyPr>
+            <a:normAutofit/>
+          </a:bodyPr>
+          <a:lstStyle/>
+          <a:p>
+            <a:r>
+              <a:rPr lang="en-US" sz="2400" dirty="0" smtClean="0"/>
+              <a:t>Unit testing: need to figure out how to do this</a:t>
+            </a:r>
+          </a:p>
+          <a:p>
+            <a:pPr>
+              <a:buNone/>
+            </a:pPr>
+            <a:endParaRPr lang="en-US" sz="2400" dirty="0" smtClean="0"/>
+          </a:p>
+          <a:p>
+            <a:r>
+              <a:rPr lang="en-US" sz="2400" dirty="0" smtClean="0"/>
+              <a:t>User Testing: Trial </a:t>
+            </a:r>
+            <a:r>
+              <a:rPr lang="en-US" sz="2400" dirty="0" smtClean="0"/>
+              <a:t>period for candidates to use it for two weeks</a:t>
+            </a:r>
+          </a:p>
+          <a:p>
+            <a:pPr marL="457200" indent="-457200">
+              <a:buNone/>
+            </a:pPr>
+            <a:r>
+              <a:rPr lang="en-US" sz="2400" dirty="0" smtClean="0"/>
+              <a:t>	- 	user manual (after GUI is complete)</a:t>
+            </a:r>
+          </a:p>
+          <a:p>
+            <a:pPr marL="457200" indent="-457200">
+              <a:buNone/>
+            </a:pPr>
+            <a:r>
+              <a:rPr lang="en-US" sz="2400" dirty="0" smtClean="0"/>
+              <a:t>	- 	developers manual (</a:t>
+            </a:r>
+            <a:r>
+              <a:rPr lang="en-US" sz="2400" dirty="0" smtClean="0"/>
+              <a:t>ongoing)</a:t>
+            </a:r>
+          </a:p>
+          <a:p>
+            <a:pPr marL="457200" indent="-457200">
+              <a:buNone/>
+            </a:pPr>
+            <a:r>
+              <a:rPr lang="en-US" sz="2400" dirty="0" smtClean="0"/>
+              <a:t>	</a:t>
+            </a:r>
+            <a:r>
+              <a:rPr lang="en-US" sz="2400" dirty="0" smtClean="0"/>
+              <a:t>- 	</a:t>
+            </a:r>
+            <a:r>
+              <a:rPr lang="en-US" sz="2400" dirty="0" smtClean="0"/>
+              <a:t>Receive </a:t>
+            </a:r>
+            <a:r>
+              <a:rPr lang="en-US" sz="2400" dirty="0" smtClean="0"/>
+              <a:t>feedback from candidates</a:t>
+            </a:r>
+          </a:p>
+          <a:p>
+            <a:pPr>
+              <a:buNone/>
+            </a:pPr>
+            <a:r>
+              <a:rPr lang="en-US" sz="2400" dirty="0" smtClean="0"/>
+              <a:t>	  - 	</a:t>
+            </a:r>
+            <a:r>
+              <a:rPr lang="en-US" sz="2400" dirty="0" smtClean="0"/>
+              <a:t>Use </a:t>
+            </a:r>
+            <a:r>
+              <a:rPr lang="en-US" sz="2400" dirty="0" smtClean="0"/>
+              <a:t>feedback for improvising the program in the future</a:t>
+            </a:r>
+            <a:endParaRPr lang="en-US" sz="2400" dirty="0"/>
+          </a:p>
+        </p:txBody>
+      </p:sp>
+    </p:spTree>
+  </p:cSld>
+  <p:clrMapOvr>
+    <a:masterClrMapping/>
+  </p:clrMapOvr>
+  <p:timing>
+    <p:tnLst>
+      <p:par>
+        <p:cTn id="1" dur="indefinite" restart="never" nodeType="tmRoot"/>
+      </p:par>
+    </p:tnLst>
+  </p:timing>
+</p:sld>
+</file>
+
+<file path=ppt/slides/slide21.xml><?xml version="1.0" encoding="utf-8"?>
+<p:sld xmlns:a="http://schemas.openxmlformats.org/drawingml/2006/main" xmlns:r="http://schemas.openxmlformats.org/officeDocument/2006/relationships" xmlns:p="http://schemas.openxmlformats.org/presentationml/2006/main">
+  <p:cSld>
+    <p:spTree>
+      <p:nvGrpSpPr>
+        <p:cNvPr id="1" name=""/>
+        <p:cNvGrpSpPr/>
+        <p:nvPr/>
+      </p:nvGrpSpPr>
+      <p:grpSpPr>
+        <a:xfrm>
+          <a:off x="0" y="0"/>
+          <a:ext cx="0" cy="0"/>
+          <a:chOff x="0" y="0"/>
+          <a:chExt cx="0" cy="0"/>
+        </a:xfrm>
+      </p:grpSpPr>
+      <p:sp>
+        <p:nvSpPr>
+          <p:cNvPr id="2" name="Title 1"/>
+          <p:cNvSpPr>
+            <a:spLocks noGrp="1"/>
+          </p:cNvSpPr>
+          <p:nvPr>
+            <p:ph type="title"/>
+          </p:nvPr>
+        </p:nvSpPr>
+        <p:spPr>
+          <a:xfrm>
+            <a:off x="609600" y="2438400"/>
+            <a:ext cx="8229600" cy="1143000"/>
+          </a:xfrm>
+        </p:spPr>
+        <p:txBody>
+          <a:bodyPr/>
+          <a:lstStyle/>
+          <a:p>
+            <a:r>
+              <a:rPr lang="en-US" dirty="0" smtClean="0"/>
+              <a:t>Questions? </a:t>
+            </a:r>
+            <a:endParaRPr lang="en-US" dirty="0"/>
           </a:p>
         </p:txBody>
       </p:sp>
@@ -5101,7 +6010,9 @@
         </p:nvSpPr>
         <p:spPr/>
         <p:txBody>
-          <a:bodyPr/>
+          <a:bodyPr>
+            <a:normAutofit lnSpcReduction="10000"/>
+          </a:bodyPr>
           <a:lstStyle/>
           <a:p>
             <a:pPr algn="ctr">
@@ -5109,8 +6020,9 @@
             </a:pPr>
             <a:r>
               <a:rPr lang="en-US" dirty="0" smtClean="0"/>
-              <a:t>Overview</a:t>
-            </a:r>
+              <a:t>Overview (j)</a:t>
+            </a:r>
+            <a:endParaRPr lang="en-US" dirty="0" smtClean="0"/>
           </a:p>
           <a:p>
             <a:pPr algn="ctr">
@@ -5118,7 +6030,11 @@
             </a:pPr>
             <a:r>
               <a:rPr lang="en-US" dirty="0" smtClean="0"/>
-              <a:t>Graphical User Interface Design</a:t>
+              <a:t>Graphical User Interface </a:t>
+            </a:r>
+            <a:r>
+              <a:rPr lang="en-US" dirty="0" smtClean="0"/>
+              <a:t>Design (j and a)</a:t>
             </a:r>
           </a:p>
           <a:p>
@@ -5127,7 +6043,15 @@
             </a:pPr>
             <a:r>
               <a:rPr lang="en-US" dirty="0" smtClean="0"/>
-              <a:t>Hardware Control</a:t>
+              <a:t>Hardware Control (a </a:t>
+            </a:r>
+            <a:r>
+              <a:rPr lang="en-US" dirty="0" smtClean="0"/>
+              <a:t>and </a:t>
+            </a:r>
+            <a:r>
+              <a:rPr lang="en-US" dirty="0" smtClean="0"/>
+              <a:t>n)</a:t>
             </a:r>
           </a:p>
           <a:p>
@@ -5136,7 +6060,15 @@
             </a:pPr>
             <a:r>
               <a:rPr lang="en-US" dirty="0" smtClean="0"/>
-              <a:t>Software Design</a:t>
+              <a:t>Modularity (</a:t>
+            </a:r>
+            <a:r>
+              <a:rPr lang="en-US" dirty="0" err="1" smtClean="0"/>
+              <a:t>anas</a:t>
+            </a:r>
+            <a:r>
+              <a:rPr lang="en-US" dirty="0" smtClean="0"/>
+              <a:t>)</a:t>
             </a:r>
           </a:p>
           <a:p>
@@ -5145,7 +6077,26 @@
             </a:pPr>
             <a:r>
               <a:rPr lang="en-US" dirty="0" smtClean="0"/>
-              <a:t>Robustness</a:t>
+              <a:t>API (j)</a:t>
+            </a:r>
+            <a:endParaRPr lang="en-US" dirty="0" smtClean="0"/>
+          </a:p>
+          <a:p>
+            <a:pPr algn="ctr">
+              <a:buNone/>
+            </a:pPr>
+            <a:r>
+              <a:rPr lang="en-US" dirty="0" smtClean="0"/>
+              <a:t>Robustness (a)</a:t>
+            </a:r>
+          </a:p>
+          <a:p>
+            <a:pPr algn="ctr">
+              <a:buNone/>
+            </a:pPr>
+            <a:r>
+              <a:rPr lang="en-US" dirty="0" smtClean="0"/>
+              <a:t>Testing (n)</a:t>
             </a:r>
             <a:endParaRPr lang="en-US" dirty="0"/>
           </a:p>
@@ -5155,7 +6106,7 @@
             </a:pPr>
             <a:r>
               <a:rPr lang="en-US" dirty="0" smtClean="0"/>
-              <a:t>Testing</a:t>
+              <a:t>Challenges (n and j)</a:t>
             </a:r>
           </a:p>
         </p:txBody>
@@ -5263,8 +6214,49 @@
             </a:pPr>
             <a:r>
               <a:rPr lang="en-US" sz="2400" dirty="0" smtClean="0"/>
-              <a:t>Why does it have to be in real time?</a:t>
-            </a:r>
+              <a:t>Why does it have to be in real time</a:t>
+            </a:r>
+            <a:r>
+              <a:rPr lang="en-US" sz="2400" dirty="0" smtClean="0"/>
+              <a:t>?</a:t>
+            </a:r>
+          </a:p>
+          <a:p>
+            <a:pPr lvl="1">
+              <a:buFontTx/>
+              <a:buChar char="-"/>
+            </a:pPr>
+            <a:r>
+              <a:rPr lang="en-US" sz="2000" dirty="0" smtClean="0"/>
+              <a:t>Detect any kind of error at early stage</a:t>
+            </a:r>
+          </a:p>
+          <a:p>
+            <a:pPr lvl="2">
+              <a:buFontTx/>
+              <a:buChar char="-"/>
+            </a:pPr>
+            <a:r>
+              <a:rPr lang="en-US" sz="1600" dirty="0" smtClean="0"/>
+              <a:t>Device under testing</a:t>
+            </a:r>
+          </a:p>
+          <a:p>
+            <a:pPr lvl="2">
+              <a:buFontTx/>
+              <a:buChar char="-"/>
+            </a:pPr>
+            <a:r>
+              <a:rPr lang="en-US" sz="1600" dirty="0" smtClean="0"/>
+              <a:t>Equipment malfunction</a:t>
+            </a:r>
+          </a:p>
+          <a:p>
+            <a:pPr lvl="2">
+              <a:buFontTx/>
+              <a:buChar char="-"/>
+            </a:pPr>
+            <a:endParaRPr lang="en-US" sz="1600" dirty="0" smtClean="0"/>
           </a:p>
           <a:p>
             <a:pPr>
@@ -5273,9 +6265,33 @@
             </a:pPr>
             <a:r>
               <a:rPr lang="en-US" sz="2400" dirty="0" smtClean="0"/>
-              <a:t>What are the advantages of using this software?</a:t>
-            </a:r>
-            <a:endParaRPr lang="en-US" sz="2400" dirty="0"/>
+              <a:t>What are the advantages of using this software</a:t>
+            </a:r>
+            <a:r>
+              <a:rPr lang="en-US" sz="2400" dirty="0" smtClean="0"/>
+              <a:t>?</a:t>
+            </a:r>
+          </a:p>
+          <a:p>
+            <a:pPr lvl="1">
+              <a:buFontTx/>
+              <a:buChar char="-"/>
+            </a:pPr>
+            <a:r>
+              <a:rPr lang="en-US" sz="2000" dirty="0" smtClean="0"/>
+              <a:t>Save time</a:t>
+            </a:r>
+          </a:p>
+          <a:p>
+            <a:pPr lvl="1">
+              <a:buFontTx/>
+              <a:buChar char="-"/>
+            </a:pPr>
+            <a:r>
+              <a:rPr lang="en-US" sz="2000" dirty="0" smtClean="0"/>
+              <a:t>Save $$$$</a:t>
+            </a:r>
+            <a:endParaRPr lang="en-US" sz="2000" dirty="0"/>
           </a:p>
         </p:txBody>
       </p:sp>
@@ -5365,20 +6381,70 @@
           <a:p>
             <a:r>
               <a:rPr lang="en-US" sz="2400" dirty="0" smtClean="0"/>
-              <a:t>Be able to access data from hardware testing done in real time and plot in real time</a:t>
-            </a:r>
-          </a:p>
-          <a:p>
+              <a:t>Be able </a:t>
+            </a:r>
             <a:r>
               <a:rPr lang="en-US" sz="2400" dirty="0" smtClean="0"/>
-              <a:t>Be able to load in configuration of experiments done in the past</a:t>
-            </a:r>
+              <a:t>to poll active hardware [DONE]</a:t>
+            </a:r>
+            <a:endParaRPr lang="en-US" sz="2400" dirty="0" smtClean="0"/>
           </a:p>
           <a:p>
             <a:r>
               <a:rPr lang="en-US" sz="2400" dirty="0" smtClean="0"/>
-              <a:t>Be able to access data from experiments done</a:t>
-            </a:r>
+              <a:t>Be able to plot </a:t>
+            </a:r>
+            <a:r>
+              <a:rPr lang="en-US" sz="2400" dirty="0" smtClean="0"/>
+              <a:t>in real </a:t>
+            </a:r>
+            <a:r>
+              <a:rPr lang="en-US" sz="2400" dirty="0" smtClean="0"/>
+              <a:t>time while accessing data [~DONE]</a:t>
+            </a:r>
+            <a:endParaRPr lang="en-US" sz="2400" dirty="0" smtClean="0"/>
+          </a:p>
+          <a:p>
+            <a:r>
+              <a:rPr lang="en-US" sz="2400" dirty="0" smtClean="0"/>
+              <a:t>Be able to load in configuration </a:t>
+            </a:r>
+            <a:r>
+              <a:rPr lang="en-US" sz="2400" dirty="0" smtClean="0"/>
+              <a:t>of previous experiments</a:t>
+            </a:r>
+            <a:endParaRPr lang="en-US" sz="2400" dirty="0" smtClean="0"/>
+          </a:p>
+          <a:p>
+            <a:r>
+              <a:rPr lang="en-US" sz="2400" dirty="0" smtClean="0"/>
+              <a:t>Be able to access data from </a:t>
+            </a:r>
+            <a:r>
+              <a:rPr lang="en-US" sz="2400" dirty="0" smtClean="0"/>
+              <a:t>previous experiments [DONE]</a:t>
+            </a:r>
+          </a:p>
+          <a:p>
+            <a:r>
+              <a:rPr lang="en-US" sz="2400" dirty="0" smtClean="0"/>
+              <a:t>Be able to integrate GPIB control with FPGA scripts</a:t>
+            </a:r>
+          </a:p>
+          <a:p>
+            <a:r>
+              <a:rPr lang="en-US" sz="2400" dirty="0" smtClean="0"/>
+              <a:t>Fully implement power supply, digital </a:t>
+            </a:r>
+            <a:r>
+              <a:rPr lang="en-US" sz="2400" dirty="0" err="1" smtClean="0"/>
+              <a:t>multimeter</a:t>
+            </a:r>
+            <a:r>
+              <a:rPr lang="en-US" sz="2400" dirty="0" smtClean="0"/>
+              <a:t>, oscilloscope [~DONE]</a:t>
+            </a:r>
+            <a:endParaRPr lang="en-US" sz="2400" dirty="0" smtClean="0"/>
           </a:p>
         </p:txBody>
       </p:sp>
@@ -5927,15 +6993,7 @@
                   <a:schemeClr val="tx1"/>
                 </a:solidFill>
               </a:rPr>
-              <a:t>Data of </a:t>
-            </a:r>
-            <a:r>
-              <a:rPr lang="en-US" dirty="0" smtClean="0">
-                <a:solidFill>
-                  <a:schemeClr val="tx1"/>
-                </a:solidFill>
-              </a:rPr>
-              <a:t>experiment</a:t>
+              <a:t>Data of experiment</a:t>
             </a:r>
           </a:p>
           <a:p>
@@ -6602,40 +7660,67 @@
         </p:nvSpPr>
         <p:spPr/>
         <p:txBody>
-          <a:bodyPr>
-            <a:normAutofit fontScale="90000"/>
-          </a:bodyPr>
+          <a:bodyPr/>
           <a:lstStyle/>
           <a:p>
             <a:r>
               <a:rPr lang="en-US" dirty="0" smtClean="0"/>
-              <a:t>GUI Design-11 slides or how do we display this?</a:t>
-            </a:r>
+              <a:t>Current GUI progress</a:t>
+            </a:r>
+            <a:endParaRPr lang="en-US" dirty="0"/>
+          </a:p>
+        </p:txBody>
+      </p:sp>
+      <p:sp>
+        <p:nvSpPr>
+          <p:cNvPr id="5" name="Content Placeholder 4"/>
+          <p:cNvSpPr>
+            <a:spLocks noGrp="1"/>
+          </p:cNvSpPr>
+          <p:nvPr>
+            <p:ph idx="1"/>
+          </p:nvPr>
+        </p:nvSpPr>
+        <p:spPr/>
+        <p:txBody>
+          <a:bodyPr/>
+          <a:lstStyle/>
+          <a:p>
             <a:endParaRPr lang="en-US" dirty="0"/>
           </a:p>
         </p:txBody>
       </p:sp>
       <p:pic>
         <p:nvPicPr>
-          <p:cNvPr id="7" name="Content Placeholder 6" descr="welcome.png"/>
+          <p:cNvPr id="2050" name="Picture 2"/>
           <p:cNvPicPr>
-            <a:picLocks noGrp="1" noChangeAspect="1"/>
+            <a:picLocks noChangeAspect="1" noChangeArrowheads="1"/>
           </p:cNvPicPr>
-          <p:nvPr>
-            <p:ph idx="1"/>
-          </p:nvPr>
+          <p:nvPr/>
         </p:nvPicPr>
         <p:blipFill>
           <a:blip r:embed="rId2" cstate="print"/>
+          <a:srcRect/>
           <a:stretch>
             <a:fillRect/>
           </a:stretch>
         </p:blipFill>
-        <p:spPr>
+        <p:spPr bwMode="auto">
           <a:xfrm>
-            <a:off x="2419772" y="1600200"/>
-            <a:ext cx="4304455" cy="4525963"/>
+            <a:off x="381000" y="1219200"/>
+            <a:ext cx="8595360" cy="5372100"/>
           </a:xfrm>
+          <a:prstGeom prst="rect">
+            <a:avLst/>
+          </a:prstGeom>
+          <a:noFill/>
+          <a:ln w="9525">
+            <a:noFill/>
+            <a:miter lim="800000"/>
+            <a:headEnd/>
+            <a:tailEnd/>
+          </a:ln>
+          <a:effectLst/>
         </p:spPr>
       </p:pic>
     </p:spTree>
@@ -6687,35 +7772,68 @@
           <a:p>
             <a:r>
               <a:rPr lang="en-US" dirty="0" smtClean="0"/>
-              <a:t>GUI Design</a:t>
+              <a:t>Hardware Control</a:t>
             </a:r>
             <a:endParaRPr lang="en-US" dirty="0"/>
           </a:p>
         </p:txBody>
       </p:sp>
-      <p:pic>
-        <p:nvPicPr>
-          <p:cNvPr id="6" name="Content Placeholder 5" descr="experiment.png"/>
-          <p:cNvPicPr>
-            <a:picLocks noGrp="1" noChangeAspect="1"/>
-          </p:cNvPicPr>
+      <p:sp>
+        <p:nvSpPr>
+          <p:cNvPr id="3" name="Content Placeholder 2"/>
+          <p:cNvSpPr>
+            <a:spLocks noGrp="1"/>
+          </p:cNvSpPr>
           <p:nvPr>
             <p:ph idx="1"/>
           </p:nvPr>
-        </p:nvPicPr>
-        <p:blipFill>
-          <a:blip r:embed="rId2" cstate="print"/>
-          <a:stretch>
-            <a:fillRect/>
-          </a:stretch>
-        </p:blipFill>
+        </p:nvSpPr>
         <p:spPr>
           <a:xfrm>
-            <a:off x="2419772" y="1600200"/>
-            <a:ext cx="4304455" cy="4525963"/>
+            <a:off x="457200" y="1600200"/>
+            <a:ext cx="8229600" cy="2590799"/>
           </a:xfrm>
         </p:spPr>
-      </p:pic>
+        <p:txBody>
+          <a:bodyPr>
+            <a:normAutofit fontScale="85000" lnSpcReduction="20000"/>
+          </a:bodyPr>
+          <a:lstStyle/>
+          <a:p>
+            <a:r>
+              <a:rPr lang="en-US" dirty="0" smtClean="0"/>
+              <a:t>So how does the software communicate with the hardware?</a:t>
+            </a:r>
+          </a:p>
+          <a:p>
+            <a:pPr>
+              <a:buNone/>
+            </a:pPr>
+            <a:endParaRPr lang="en-US" dirty="0" smtClean="0"/>
+          </a:p>
+          <a:p>
+            <a:r>
+              <a:rPr lang="en-US" dirty="0" smtClean="0"/>
+              <a:t>Series of commands using the GPIB</a:t>
+            </a:r>
+          </a:p>
+          <a:p>
+            <a:endParaRPr lang="en-US" dirty="0" smtClean="0"/>
+          </a:p>
+          <a:p>
+            <a:r>
+              <a:rPr lang="en-US" dirty="0" smtClean="0"/>
+              <a:t>Series of tools using the FPGA</a:t>
+            </a:r>
+          </a:p>
+          <a:p>
+            <a:endParaRPr lang="en-US" dirty="0" smtClean="0"/>
+          </a:p>
+          <a:p>
+            <a:endParaRPr lang="en-US" dirty="0"/>
+          </a:p>
+        </p:txBody>
+      </p:sp>
     </p:spTree>
   </p:cSld>
   <p:clrMapOvr>
@@ -6765,7 +7883,7 @@
           <a:p>
             <a:r>
               <a:rPr lang="en-US" dirty="0" smtClean="0"/>
-              <a:t>Current GUI progress</a:t>
+              <a:t>FPGA control</a:t>
             </a:r>
             <a:endParaRPr lang="en-US" dirty="0"/>
           </a:p>
@@ -6773,20 +7891,460 @@
       </p:sp>
       <p:sp>
         <p:nvSpPr>
-          <p:cNvPr id="3" name="Content Placeholder 2"/>
-          <p:cNvSpPr>
-            <a:spLocks noGrp="1"/>
-          </p:cNvSpPr>
-          <p:nvPr>
-            <p:ph idx="1"/>
-          </p:nvPr>
-        </p:nvSpPr>
-        <p:spPr/>
+          <p:cNvPr id="4" name="Rectangle 4"/>
+          <p:cNvSpPr>
+            <a:spLocks noChangeArrowheads="1"/>
+          </p:cNvSpPr>
+          <p:nvPr/>
+        </p:nvSpPr>
+        <p:spPr bwMode="auto">
+          <a:xfrm>
+            <a:off x="2374900" y="2362200"/>
+            <a:ext cx="2376488" cy="2628900"/>
+          </a:xfrm>
+          <a:prstGeom prst="rect">
+            <a:avLst/>
+          </a:prstGeom>
+          <a:solidFill>
+            <a:schemeClr val="accent1"/>
+          </a:solidFill>
+          <a:ln w="50800">
+            <a:solidFill>
+              <a:schemeClr val="tx1"/>
+            </a:solidFill>
+            <a:miter lim="800000"/>
+            <a:headEnd/>
+            <a:tailEnd/>
+          </a:ln>
+        </p:spPr>
+        <p:txBody>
+          <a:bodyPr wrap="none" anchor="ctr"/>
+          <a:lstStyle/>
+          <a:p>
+            <a:pPr algn="ctr"/>
+            <a:r>
+              <a:rPr lang="en-US" sz="2000" b="1" dirty="0"/>
+              <a:t>SE Test System</a:t>
+            </a:r>
+            <a:br>
+              <a:rPr lang="en-US" sz="2000" b="1" dirty="0"/>
+            </a:br>
+            <a:r>
+              <a:rPr lang="en-US" sz="2000" b="1" dirty="0"/>
+              <a:t>(made of several</a:t>
+            </a:r>
+            <a:br>
+              <a:rPr lang="en-US" sz="2000" b="1" dirty="0"/>
+            </a:br>
+            <a:r>
+              <a:rPr lang="en-US" sz="2000" b="1" dirty="0"/>
+              <a:t>components)</a:t>
+            </a:r>
+          </a:p>
+        </p:txBody>
+      </p:sp>
+      <p:sp>
+        <p:nvSpPr>
+          <p:cNvPr id="5" name="Line 5"/>
+          <p:cNvSpPr>
+            <a:spLocks noChangeShapeType="1"/>
+          </p:cNvSpPr>
+          <p:nvPr/>
+        </p:nvSpPr>
+        <p:spPr bwMode="auto">
+          <a:xfrm flipH="1">
+            <a:off x="1619250" y="2651125"/>
+            <a:ext cx="757238" cy="0"/>
+          </a:xfrm>
+          <a:prstGeom prst="line">
+            <a:avLst/>
+          </a:prstGeom>
+          <a:noFill/>
+          <a:ln w="38100">
+            <a:solidFill>
+              <a:schemeClr val="tx1"/>
+            </a:solidFill>
+            <a:round/>
+            <a:headEnd/>
+            <a:tailEnd/>
+          </a:ln>
+        </p:spPr>
         <p:txBody>
           <a:bodyPr/>
           <a:lstStyle/>
           <a:p>
-            <a:endParaRPr lang="en-US"/>
+            <a:endParaRPr lang="en-US" dirty="0"/>
+          </a:p>
+        </p:txBody>
+      </p:sp>
+      <p:sp>
+        <p:nvSpPr>
+          <p:cNvPr id="6" name="Line 6"/>
+          <p:cNvSpPr>
+            <a:spLocks noChangeShapeType="1"/>
+          </p:cNvSpPr>
+          <p:nvPr/>
+        </p:nvSpPr>
+        <p:spPr bwMode="auto">
+          <a:xfrm flipH="1">
+            <a:off x="1619250" y="3011488"/>
+            <a:ext cx="757238" cy="0"/>
+          </a:xfrm>
+          <a:prstGeom prst="line">
+            <a:avLst/>
+          </a:prstGeom>
+          <a:noFill/>
+          <a:ln w="38100">
+            <a:solidFill>
+              <a:schemeClr val="tx1"/>
+            </a:solidFill>
+            <a:round/>
+            <a:headEnd/>
+            <a:tailEnd/>
+          </a:ln>
+        </p:spPr>
+        <p:txBody>
+          <a:bodyPr/>
+          <a:lstStyle/>
+          <a:p>
+            <a:endParaRPr lang="en-US" dirty="0"/>
+          </a:p>
+        </p:txBody>
+      </p:sp>
+      <p:sp>
+        <p:nvSpPr>
+          <p:cNvPr id="7" name="Text Box 7"/>
+          <p:cNvSpPr txBox="1">
+            <a:spLocks noChangeArrowheads="1"/>
+          </p:cNvSpPr>
+          <p:nvPr/>
+        </p:nvSpPr>
+        <p:spPr bwMode="auto">
+          <a:xfrm>
+            <a:off x="938213" y="2398713"/>
+            <a:ext cx="717550" cy="366712"/>
+          </a:xfrm>
+          <a:prstGeom prst="rect">
+            <a:avLst/>
+          </a:prstGeom>
+          <a:noFill/>
+          <a:ln w="9525">
+            <a:noFill/>
+            <a:miter lim="800000"/>
+            <a:headEnd/>
+            <a:tailEnd/>
+          </a:ln>
+        </p:spPr>
+        <p:txBody>
+          <a:bodyPr wrap="none">
+            <a:spAutoFit/>
+          </a:bodyPr>
+          <a:lstStyle/>
+          <a:p>
+            <a:r>
+              <a:rPr lang="en-US" dirty="0"/>
+              <a:t>3.3 V</a:t>
+            </a:r>
+          </a:p>
+        </p:txBody>
+      </p:sp>
+      <p:sp>
+        <p:nvSpPr>
+          <p:cNvPr id="8" name="Text Box 8"/>
+          <p:cNvSpPr txBox="1">
+            <a:spLocks noChangeArrowheads="1"/>
+          </p:cNvSpPr>
+          <p:nvPr/>
+        </p:nvSpPr>
+        <p:spPr bwMode="auto">
+          <a:xfrm>
+            <a:off x="938213" y="2795588"/>
+            <a:ext cx="692150" cy="366712"/>
+          </a:xfrm>
+          <a:prstGeom prst="rect">
+            <a:avLst/>
+          </a:prstGeom>
+          <a:noFill/>
+          <a:ln w="9525">
+            <a:noFill/>
+            <a:miter lim="800000"/>
+            <a:headEnd/>
+            <a:tailEnd/>
+          </a:ln>
+        </p:spPr>
+        <p:txBody>
+          <a:bodyPr wrap="none">
+            <a:spAutoFit/>
+          </a:bodyPr>
+          <a:lstStyle/>
+          <a:p>
+            <a:r>
+              <a:rPr lang="en-US" dirty="0"/>
+              <a:t>GND</a:t>
+            </a:r>
+          </a:p>
+        </p:txBody>
+      </p:sp>
+      <p:sp>
+        <p:nvSpPr>
+          <p:cNvPr id="9" name="Line 9"/>
+          <p:cNvSpPr>
+            <a:spLocks noChangeShapeType="1"/>
+          </p:cNvSpPr>
+          <p:nvPr/>
+        </p:nvSpPr>
+        <p:spPr bwMode="auto">
+          <a:xfrm flipH="1">
+            <a:off x="4754563" y="2867025"/>
+            <a:ext cx="1046162" cy="0"/>
+          </a:xfrm>
+          <a:prstGeom prst="line">
+            <a:avLst/>
+          </a:prstGeom>
+          <a:noFill/>
+          <a:ln w="38100">
+            <a:solidFill>
+              <a:schemeClr val="tx1"/>
+            </a:solidFill>
+            <a:round/>
+            <a:headEnd/>
+            <a:tailEnd/>
+          </a:ln>
+        </p:spPr>
+        <p:txBody>
+          <a:bodyPr/>
+          <a:lstStyle/>
+          <a:p>
+            <a:endParaRPr lang="en-US" dirty="0"/>
+          </a:p>
+        </p:txBody>
+      </p:sp>
+      <p:sp>
+        <p:nvSpPr>
+          <p:cNvPr id="10" name="Rectangle 9"/>
+          <p:cNvSpPr>
+            <a:spLocks noChangeArrowheads="1"/>
+          </p:cNvSpPr>
+          <p:nvPr/>
+        </p:nvSpPr>
+        <p:spPr bwMode="auto">
+          <a:xfrm>
+            <a:off x="5800725" y="2362200"/>
+            <a:ext cx="1692275" cy="1009650"/>
+          </a:xfrm>
+          <a:prstGeom prst="rect">
+            <a:avLst/>
+          </a:prstGeom>
+          <a:solidFill>
+            <a:schemeClr val="accent1"/>
+          </a:solidFill>
+          <a:ln w="50800">
+            <a:solidFill>
+              <a:schemeClr val="tx1"/>
+            </a:solidFill>
+            <a:miter lim="800000"/>
+            <a:headEnd/>
+            <a:tailEnd/>
+          </a:ln>
+        </p:spPr>
+        <p:txBody>
+          <a:bodyPr wrap="none" anchor="ctr"/>
+          <a:lstStyle/>
+          <a:p>
+            <a:pPr algn="ctr"/>
+            <a:r>
+              <a:rPr lang="en-US" sz="2000" b="1" dirty="0"/>
+              <a:t>FPGA</a:t>
+            </a:r>
+          </a:p>
+        </p:txBody>
+      </p:sp>
+      <p:sp>
+        <p:nvSpPr>
+          <p:cNvPr id="11" name="Text Box 12"/>
+          <p:cNvSpPr txBox="1">
+            <a:spLocks noChangeArrowheads="1"/>
+          </p:cNvSpPr>
+          <p:nvPr/>
+        </p:nvSpPr>
+        <p:spPr bwMode="auto">
+          <a:xfrm>
+            <a:off x="5176838" y="2398713"/>
+            <a:ext cx="552450" cy="366712"/>
+          </a:xfrm>
+          <a:prstGeom prst="rect">
+            <a:avLst/>
+          </a:prstGeom>
+          <a:noFill/>
+          <a:ln w="9525">
+            <a:noFill/>
+            <a:miter lim="800000"/>
+            <a:headEnd/>
+            <a:tailEnd/>
+          </a:ln>
+        </p:spPr>
+        <p:txBody>
+          <a:bodyPr wrap="none">
+            <a:spAutoFit/>
+          </a:bodyPr>
+          <a:lstStyle/>
+          <a:p>
+            <a:pPr algn="ctr"/>
+            <a:r>
+              <a:rPr lang="en-US" dirty="0"/>
+              <a:t>I/O </a:t>
+            </a:r>
+          </a:p>
+        </p:txBody>
+      </p:sp>
+      <p:sp>
+        <p:nvSpPr>
+          <p:cNvPr id="12" name="Rectangle 11"/>
+          <p:cNvSpPr>
+            <a:spLocks noChangeArrowheads="1"/>
+          </p:cNvSpPr>
+          <p:nvPr/>
+        </p:nvSpPr>
+        <p:spPr bwMode="auto">
+          <a:xfrm>
+            <a:off x="2917825" y="4306888"/>
+            <a:ext cx="1223963" cy="431800"/>
+          </a:xfrm>
+          <a:prstGeom prst="rect">
+            <a:avLst/>
+          </a:prstGeom>
+          <a:solidFill>
+            <a:schemeClr val="bg1"/>
+          </a:solidFill>
+          <a:ln w="38100">
+            <a:solidFill>
+              <a:schemeClr val="tx1"/>
+            </a:solidFill>
+            <a:miter lim="800000"/>
+            <a:headEnd/>
+            <a:tailEnd/>
+          </a:ln>
+        </p:spPr>
+        <p:txBody>
+          <a:bodyPr wrap="none" anchor="ctr"/>
+          <a:lstStyle/>
+          <a:p>
+            <a:pPr algn="ctr"/>
+            <a:r>
+              <a:rPr lang="en-US" dirty="0"/>
+              <a:t>DUT</a:t>
+            </a:r>
+          </a:p>
+        </p:txBody>
+      </p:sp>
+      <p:sp>
+        <p:nvSpPr>
+          <p:cNvPr id="13" name="Line 15"/>
+          <p:cNvSpPr>
+            <a:spLocks noChangeShapeType="1"/>
+          </p:cNvSpPr>
+          <p:nvPr/>
+        </p:nvSpPr>
+        <p:spPr bwMode="auto">
+          <a:xfrm>
+            <a:off x="6592888" y="3371850"/>
+            <a:ext cx="0" cy="863600"/>
+          </a:xfrm>
+          <a:prstGeom prst="line">
+            <a:avLst/>
+          </a:prstGeom>
+          <a:noFill/>
+          <a:ln w="38100">
+            <a:solidFill>
+              <a:schemeClr val="tx1"/>
+            </a:solidFill>
+            <a:round/>
+            <a:headEnd/>
+            <a:tailEnd/>
+          </a:ln>
+        </p:spPr>
+        <p:txBody>
+          <a:bodyPr/>
+          <a:lstStyle/>
+          <a:p>
+            <a:endParaRPr lang="en-US" dirty="0"/>
+          </a:p>
+        </p:txBody>
+      </p:sp>
+      <p:sp>
+        <p:nvSpPr>
+          <p:cNvPr id="14" name="Rectangle 13"/>
+          <p:cNvSpPr>
+            <a:spLocks noChangeArrowheads="1"/>
+          </p:cNvSpPr>
+          <p:nvPr/>
+        </p:nvSpPr>
+        <p:spPr bwMode="auto">
+          <a:xfrm>
+            <a:off x="5548313" y="4056063"/>
+            <a:ext cx="2376487" cy="1417637"/>
+          </a:xfrm>
+          <a:prstGeom prst="rect">
+            <a:avLst/>
+          </a:prstGeom>
+          <a:solidFill>
+            <a:schemeClr val="accent1"/>
+          </a:solidFill>
+          <a:ln w="50800">
+            <a:solidFill>
+              <a:schemeClr val="tx1"/>
+            </a:solidFill>
+            <a:miter lim="800000"/>
+            <a:headEnd/>
+            <a:tailEnd/>
+          </a:ln>
+        </p:spPr>
+        <p:txBody>
+          <a:bodyPr wrap="none" anchor="ctr"/>
+          <a:lstStyle/>
+          <a:p>
+            <a:pPr algn="ctr"/>
+            <a:r>
+              <a:rPr lang="en-US" sz="2000" b="1" dirty="0"/>
+              <a:t>Computer</a:t>
+            </a:r>
+          </a:p>
+        </p:txBody>
+      </p:sp>
+      <p:sp>
+        <p:nvSpPr>
+          <p:cNvPr id="15" name="Text Box 17"/>
+          <p:cNvSpPr txBox="1">
+            <a:spLocks noChangeArrowheads="1"/>
+          </p:cNvSpPr>
+          <p:nvPr/>
+        </p:nvSpPr>
+        <p:spPr bwMode="auto">
+          <a:xfrm>
+            <a:off x="6589713" y="3498850"/>
+            <a:ext cx="1263650" cy="366713"/>
+          </a:xfrm>
+          <a:prstGeom prst="rect">
+            <a:avLst/>
+          </a:prstGeom>
+          <a:noFill/>
+          <a:ln w="9525">
+            <a:noFill/>
+            <a:miter lim="800000"/>
+            <a:headEnd/>
+            <a:tailEnd/>
+          </a:ln>
+        </p:spPr>
+        <p:txBody>
+          <a:bodyPr wrap="none">
+            <a:spAutoFit/>
+          </a:bodyPr>
+          <a:lstStyle/>
+          <a:p>
+            <a:r>
+              <a:rPr lang="en-US" dirty="0"/>
+              <a:t>USB/serial</a:t>
+            </a:r>
           </a:p>
         </p:txBody>
       </p:sp>
@@ -7086,4 +8644,330 @@
   <a:objectDefaults/>
   <a:extraClrSchemeLst/>
 </a:theme>
+</file>
+
+<file path=ppt/theme/theme2.xml><?xml version="1.0" encoding="utf-8"?>
+<a:theme xmlns:a="http://schemas.openxmlformats.org/drawingml/2006/main" name="Office Theme">
+  <a:themeElements>
+    <a:clrScheme name="Office">
+      <a:dk1>
+        <a:sysClr val="windowText" lastClr="000000"/>
+      </a:dk1>
+      <a:lt1>
+        <a:sysClr val="window" lastClr="FFFFFF"/>
+      </a:lt1>
+      <a:dk2>
+        <a:srgbClr val="1F497D"/>
+      </a:dk2>
+      <a:lt2>
+        <a:srgbClr val="EEECE1"/>
+      </a:lt2>
+      <a:accent1>
+        <a:srgbClr val="4F81BD"/>
+      </a:accent1>
+      <a:accent2>
+        <a:srgbClr val="C0504D"/>
+      </a:accent2>
+      <a:accent3>
+        <a:srgbClr val="9BBB59"/>
+      </a:accent3>
+      <a:accent4>
+        <a:srgbClr val="8064A2"/>
+      </a:accent4>
+      <a:accent5>
+        <a:srgbClr val="4BACC6"/>
+      </a:accent5>
+      <a:accent6>
+        <a:srgbClr val="F79646"/>
+      </a:accent6>
+      <a:hlink>
+        <a:srgbClr val="0000FF"/>
+      </a:hlink>
+      <a:folHlink>
+        <a:srgbClr val="800080"/>
+      </a:folHlink>
+    </a:clrScheme>
+    <a:fontScheme name="Office">
+      <a:majorFont>
+        <a:latin typeface="Calibri"/>
+        <a:ea typeface=""/>
+        <a:cs typeface=""/>
+        <a:font script="Jpan" typeface="ＭＳ Ｐゴシック"/>
+        <a:font script="Hang" typeface="맑은 고딕"/>
+        <a:font script="Hans" typeface="宋体"/>
+        <a:font script="Hant" typeface="新細明體"/>
+        <a:font script="Arab" typeface="Times New Roman"/>
+        <a:font script="Hebr" typeface="Times New Roman"/>
+        <a:font script="Thai" typeface="Angsana New"/>
+        <a:font script="Ethi" typeface="Nyala"/>
+        <a:font script="Beng" typeface="Vrinda"/>
+        <a:font script="Gujr" typeface="Shruti"/>
+        <a:font script="Khmr" typeface="MoolBoran"/>
+        <a:font script="Knda" typeface="Tunga"/>
+        <a:font script="Guru" typeface="Raavi"/>
+        <a:font script="Cans" typeface="Euphemia"/>
+        <a:font script="Cher" typeface="Plantagenet Cherokee"/>
+        <a:font script="Yiii" typeface="Microsoft Yi Baiti"/>
+        <a:font script="Tibt" typeface="Microsoft Himalaya"/>
+        <a:font script="Thaa" typeface="MV Boli"/>
+        <a:font script="Deva" typeface="Mangal"/>
+        <a:font script="Telu" typeface="Gautami"/>
+        <a:font script="Taml" typeface="Latha"/>
+        <a:font script="Syrc" typeface="Estrangelo Edessa"/>
+        <a:font script="Orya" typeface="Kalinga"/>
+        <a:font script="Mlym" typeface="Kartika"/>
+        <a:font script="Laoo" typeface="DokChampa"/>
+        <a:font script="Sinh" typeface="Iskoola Pota"/>
+        <a:font script="Mong" typeface="Mongolian Baiti"/>
+        <a:font script="Viet" typeface="Times New Roman"/>
+        <a:font script="Uigh" typeface="Microsoft Uighur"/>
+      </a:majorFont>
+      <a:minorFont>
+        <a:latin typeface="Calibri"/>
+        <a:ea typeface=""/>
+        <a:cs typeface=""/>
+        <a:font script="Jpan" typeface="ＭＳ Ｐゴシック"/>
+        <a:font script="Hang" typeface="맑은 고딕"/>
+        <a:font script="Hans" typeface="宋体"/>
+        <a:font script="Hant" typeface="新細明體"/>
+        <a:font script="Arab" typeface="Arial"/>
+        <a:font script="Hebr" typeface="Arial"/>
+        <a:font script="Thai" typeface="Cordia New"/>
+        <a:font script="Ethi" typeface="Nyala"/>
+        <a:font script="Beng" typeface="Vrinda"/>
+        <a:font script="Gujr" typeface="Shruti"/>
+        <a:font script="Khmr" typeface="DaunPenh"/>
+        <a:font script="Knda" typeface="Tunga"/>
+        <a:font script="Guru" typeface="Raavi"/>
+        <a:font script="Cans" typeface="Euphemia"/>
+        <a:font script="Cher" typeface="Plantagenet Cherokee"/>
+        <a:font script="Yiii" typeface="Microsoft Yi Baiti"/>
+        <a:font script="Tibt" typeface="Microsoft Himalaya"/>
+        <a:font script="Thaa" typeface="MV Boli"/>
+        <a:font script="Deva" typeface="Mangal"/>
+        <a:font script="Telu" typeface="Gautami"/>
+        <a:font script="Taml" typeface="Latha"/>
+        <a:font script="Syrc" typeface="Estrangelo Edessa"/>
+        <a:font script="Orya" typeface="Kalinga"/>
+        <a:font script="Mlym" typeface="Kartika"/>
+        <a:font script="Laoo" typeface="DokChampa"/>
+        <a:font script="Sinh" typeface="Iskoola Pota"/>
+        <a:font script="Mong" typeface="Mongolian Baiti"/>
+        <a:font script="Viet" typeface="Arial"/>
+        <a:font script="Uigh" typeface="Microsoft Uighur"/>
+      </a:minorFont>
+    </a:fontScheme>
+    <a:fmtScheme name="Office">
+      <a:fillStyleLst>
+        <a:solidFill>
+          <a:schemeClr val="phClr"/>
+        </a:solidFill>
+        <a:gradFill rotWithShape="1">
+          <a:gsLst>
+            <a:gs pos="0">
+              <a:schemeClr val="phClr">
+                <a:tint val="50000"/>
+                <a:satMod val="300000"/>
+              </a:schemeClr>
+            </a:gs>
+            <a:gs pos="35000">
+              <a:schemeClr val="phClr">
+                <a:tint val="37000"/>
+                <a:satMod val="300000"/>
+              </a:schemeClr>
+            </a:gs>
+            <a:gs pos="100000">
+              <a:schemeClr val="phClr">
+                <a:tint val="15000"/>
+                <a:satMod val="350000"/>
+              </a:schemeClr>
+            </a:gs>
+          </a:gsLst>
+          <a:lin ang="16200000" scaled="1"/>
+        </a:gradFill>
+        <a:gradFill rotWithShape="1">
+          <a:gsLst>
+            <a:gs pos="0">
+              <a:schemeClr val="phClr">
+                <a:shade val="51000"/>
+                <a:satMod val="130000"/>
+              </a:schemeClr>
+            </a:gs>
+            <a:gs pos="80000">
+              <a:schemeClr val="phClr">
+                <a:shade val="93000"/>
+                <a:satMod val="130000"/>
+              </a:schemeClr>
+            </a:gs>
+            <a:gs pos="100000">
+              <a:schemeClr val="phClr">
+                <a:shade val="94000"/>
+                <a:satMod val="135000"/>
+              </a:schemeClr>
+            </a:gs>
+          </a:gsLst>
+          <a:lin ang="16200000" scaled="0"/>
+        </a:gradFill>
+      </a:fillStyleLst>
+      <a:lnStyleLst>
+        <a:ln w="9525" cap="flat" cmpd="sng" algn="ctr">
+          <a:solidFill>
+            <a:schemeClr val="phClr">
+              <a:shade val="95000"/>
+              <a:satMod val="105000"/>
+            </a:schemeClr>
+          </a:solidFill>
+          <a:prstDash val="solid"/>
+        </a:ln>
+        <a:ln w="25400" cap="flat" cmpd="sng" algn="ctr">
+          <a:solidFill>
+            <a:schemeClr val="phClr"/>
+          </a:solidFill>
+          <a:prstDash val="solid"/>
+        </a:ln>
+        <a:ln w="38100" cap="flat" cmpd="sng" algn="ctr">
+          <a:solidFill>
+            <a:schemeClr val="phClr"/>
+          </a:solidFill>
+          <a:prstDash val="solid"/>
+        </a:ln>
+      </a:lnStyleLst>
+      <a:effectStyleLst>
+        <a:effectStyle>
+          <a:effectLst>
+            <a:outerShdw blurRad="40000" dist="20000" dir="5400000" rotWithShape="0">
+              <a:srgbClr val="000000">
+                <a:alpha val="38000"/>
+              </a:srgbClr>
+            </a:outerShdw>
+          </a:effectLst>
+        </a:effectStyle>
+        <a:effectStyle>
+          <a:effectLst>
+            <a:outerShdw blurRad="40000" dist="23000" dir="5400000" rotWithShape="0">
+              <a:srgbClr val="000000">
+                <a:alpha val="35000"/>
+              </a:srgbClr>
+            </a:outerShdw>
+          </a:effectLst>
+        </a:effectStyle>
+        <a:effectStyle>
+          <a:effectLst>
+            <a:outerShdw blurRad="40000" dist="23000" dir="5400000" rotWithShape="0">
+              <a:srgbClr val="000000">
+                <a:alpha val="35000"/>
+              </a:srgbClr>
+            </a:outerShdw>
+          </a:effectLst>
+          <a:scene3d>
+            <a:camera prst="orthographicFront">
+              <a:rot lat="0" lon="0" rev="0"/>
+            </a:camera>
+            <a:lightRig rig="threePt" dir="t">
+              <a:rot lat="0" lon="0" rev="1200000"/>
+            </a:lightRig>
+          </a:scene3d>
+          <a:sp3d>
+            <a:bevelT w="63500" h="25400"/>
+          </a:sp3d>
+        </a:effectStyle>
+      </a:effectStyleLst>
+      <a:bgFillStyleLst>
+        <a:solidFill>
+          <a:schemeClr val="phClr"/>
+        </a:solidFill>
+        <a:gradFill rotWithShape="1">
+          <a:gsLst>
+            <a:gs pos="0">
+              <a:schemeClr val="phClr">
+                <a:tint val="40000"/>
+                <a:satMod val="350000"/>
+              </a:schemeClr>
+            </a:gs>
+            <a:gs pos="40000">
+              <a:schemeClr val="phClr">
+                <a:tint val="45000"/>
+                <a:shade val="99000"/>
+                <a:satMod val="350000"/>
+              </a:schemeClr>
+            </a:gs>
+            <a:gs pos="100000">
+              <a:schemeClr val="phClr">
+                <a:shade val="20000"/>
+                <a:satMod val="255000"/>
+              </a:schemeClr>
+            </a:gs>
+          </a:gsLst>
+          <a:path path="circle">
+            <a:fillToRect l="50000" t="-80000" r="50000" b="180000"/>
+          </a:path>
+        </a:gradFill>
+        <a:gradFill rotWithShape="1">
+          <a:gsLst>
+            <a:gs pos="0">
+              <a:schemeClr val="phClr">
+                <a:tint val="80000"/>
+                <a:satMod val="300000"/>
+              </a:schemeClr>
+            </a:gs>
+            <a:gs pos="100000">
+              <a:schemeClr val="phClr">
+                <a:shade val="30000"/>
+                <a:satMod val="200000"/>
+              </a:schemeClr>
+            </a:gs>
+          </a:gsLst>
+          <a:path path="circle">
+            <a:fillToRect l="50000" t="50000" r="50000" b="50000"/>
+          </a:path>
+        </a:gradFill>
+      </a:bgFillStyleLst>
+    </a:fmtScheme>
+  </a:themeElements>
+  <a:objectDefaults/>
+  <a:extraClrSchemeLst/>
+</a:theme>
+</file>
+
+<file path=ppt/theme/themeOverride1.xml><?xml version="1.0" encoding="utf-8"?>
+<a:themeOverride xmlns:a="http://schemas.openxmlformats.org/drawingml/2006/main">
+  <a:clrScheme name="Office">
+    <a:dk1>
+      <a:sysClr val="windowText" lastClr="000000"/>
+    </a:dk1>
+    <a:lt1>
+      <a:sysClr val="window" lastClr="FFFFFF"/>
+    </a:lt1>
+    <a:dk2>
+      <a:srgbClr val="1F497D"/>
+    </a:dk2>
+    <a:lt2>
+      <a:srgbClr val="EEECE1"/>
+    </a:lt2>
+    <a:accent1>
+      <a:srgbClr val="4F81BD"/>
+    </a:accent1>
+    <a:accent2>
+      <a:srgbClr val="C0504D"/>
+    </a:accent2>
+    <a:accent3>
+      <a:srgbClr val="9BBB59"/>
+    </a:accent3>
+    <a:accent4>
+      <a:srgbClr val="8064A2"/>
+    </a:accent4>
+    <a:accent5>
+      <a:srgbClr val="4BACC6"/>
+    </a:accent5>
+    <a:accent6>
+      <a:srgbClr val="F79646"/>
+    </a:accent6>
+    <a:hlink>
+      <a:srgbClr val="0000FF"/>
+    </a:hlink>
+    <a:folHlink>
+      <a:srgbClr val="800080"/>
+    </a:folHlink>
+  </a:clrScheme>
+</a:themeOverride>
 </file>
</xml_diff>